<commit_message>
second csg tree and external part done
</commit_message>
<xml_diff>
--- a/CG.pptx
+++ b/CG.pptx
@@ -7,6 +7,7 @@
   <p:sldIdLst>
     <p:sldId id="257" r:id="rId2"/>
     <p:sldId id="256" r:id="rId3"/>
+    <p:sldId id="258" r:id="rId4"/>
   </p:sldIdLst>
   <p:sldSz cx="12192000" cy="6858000"/>
   <p:notesSz cx="6858000" cy="9144000"/>
@@ -244,7 +245,7 @@
           <a:p>
             <a:fld id="{D64F2477-06A2-4512-8AC4-C1FB9F468FA8}" type="datetimeFigureOut">
               <a:rPr lang="pt-BR" smtClean="0"/>
-              <a:t>19/03/2017</a:t>
+              <a:t>20/03/2017</a:t>
             </a:fld>
             <a:endParaRPr lang="pt-BR"/>
           </a:p>
@@ -414,7 +415,7 @@
           <a:p>
             <a:fld id="{D64F2477-06A2-4512-8AC4-C1FB9F468FA8}" type="datetimeFigureOut">
               <a:rPr lang="pt-BR" smtClean="0"/>
-              <a:t>19/03/2017</a:t>
+              <a:t>20/03/2017</a:t>
             </a:fld>
             <a:endParaRPr lang="pt-BR"/>
           </a:p>
@@ -594,7 +595,7 @@
           <a:p>
             <a:fld id="{D64F2477-06A2-4512-8AC4-C1FB9F468FA8}" type="datetimeFigureOut">
               <a:rPr lang="pt-BR" smtClean="0"/>
-              <a:t>19/03/2017</a:t>
+              <a:t>20/03/2017</a:t>
             </a:fld>
             <a:endParaRPr lang="pt-BR"/>
           </a:p>
@@ -764,7 +765,7 @@
           <a:p>
             <a:fld id="{D64F2477-06A2-4512-8AC4-C1FB9F468FA8}" type="datetimeFigureOut">
               <a:rPr lang="pt-BR" smtClean="0"/>
-              <a:t>19/03/2017</a:t>
+              <a:t>20/03/2017</a:t>
             </a:fld>
             <a:endParaRPr lang="pt-BR"/>
           </a:p>
@@ -1010,7 +1011,7 @@
           <a:p>
             <a:fld id="{D64F2477-06A2-4512-8AC4-C1FB9F468FA8}" type="datetimeFigureOut">
               <a:rPr lang="pt-BR" smtClean="0"/>
-              <a:t>19/03/2017</a:t>
+              <a:t>20/03/2017</a:t>
             </a:fld>
             <a:endParaRPr lang="pt-BR"/>
           </a:p>
@@ -1242,7 +1243,7 @@
           <a:p>
             <a:fld id="{D64F2477-06A2-4512-8AC4-C1FB9F468FA8}" type="datetimeFigureOut">
               <a:rPr lang="pt-BR" smtClean="0"/>
-              <a:t>19/03/2017</a:t>
+              <a:t>20/03/2017</a:t>
             </a:fld>
             <a:endParaRPr lang="pt-BR"/>
           </a:p>
@@ -1609,7 +1610,7 @@
           <a:p>
             <a:fld id="{D64F2477-06A2-4512-8AC4-C1FB9F468FA8}" type="datetimeFigureOut">
               <a:rPr lang="pt-BR" smtClean="0"/>
-              <a:t>19/03/2017</a:t>
+              <a:t>20/03/2017</a:t>
             </a:fld>
             <a:endParaRPr lang="pt-BR"/>
           </a:p>
@@ -1727,7 +1728,7 @@
           <a:p>
             <a:fld id="{D64F2477-06A2-4512-8AC4-C1FB9F468FA8}" type="datetimeFigureOut">
               <a:rPr lang="pt-BR" smtClean="0"/>
-              <a:t>19/03/2017</a:t>
+              <a:t>20/03/2017</a:t>
             </a:fld>
             <a:endParaRPr lang="pt-BR"/>
           </a:p>
@@ -1822,7 +1823,7 @@
           <a:p>
             <a:fld id="{D64F2477-06A2-4512-8AC4-C1FB9F468FA8}" type="datetimeFigureOut">
               <a:rPr lang="pt-BR" smtClean="0"/>
-              <a:t>19/03/2017</a:t>
+              <a:t>20/03/2017</a:t>
             </a:fld>
             <a:endParaRPr lang="pt-BR"/>
           </a:p>
@@ -2099,7 +2100,7 @@
           <a:p>
             <a:fld id="{D64F2477-06A2-4512-8AC4-C1FB9F468FA8}" type="datetimeFigureOut">
               <a:rPr lang="pt-BR" smtClean="0"/>
-              <a:t>19/03/2017</a:t>
+              <a:t>20/03/2017</a:t>
             </a:fld>
             <a:endParaRPr lang="pt-BR"/>
           </a:p>
@@ -2352,7 +2353,7 @@
           <a:p>
             <a:fld id="{D64F2477-06A2-4512-8AC4-C1FB9F468FA8}" type="datetimeFigureOut">
               <a:rPr lang="pt-BR" smtClean="0"/>
-              <a:t>19/03/2017</a:t>
+              <a:t>20/03/2017</a:t>
             </a:fld>
             <a:endParaRPr lang="pt-BR"/>
           </a:p>
@@ -2565,7 +2566,7 @@
           <a:p>
             <a:fld id="{D64F2477-06A2-4512-8AC4-C1FB9F468FA8}" type="datetimeFigureOut">
               <a:rPr lang="pt-BR" smtClean="0"/>
-              <a:t>19/03/2017</a:t>
+              <a:t>20/03/2017</a:t>
             </a:fld>
             <a:endParaRPr lang="pt-BR"/>
           </a:p>
@@ -2966,13 +2967,13 @@
                 <a:lumOff val="95000"/>
               </a:schemeClr>
             </a:gs>
-            <a:gs pos="74000">
+            <a:gs pos="100000">
               <a:schemeClr val="accent6">
                 <a:lumMod val="45000"/>
                 <a:lumOff val="55000"/>
               </a:schemeClr>
             </a:gs>
-            <a:gs pos="83000">
+            <a:gs pos="100000">
               <a:schemeClr val="accent6">
                 <a:lumMod val="45000"/>
                 <a:lumOff val="55000"/>
@@ -4802,6 +4803,1775 @@
       </p:par>
     </p:tnLst>
   </p:timing>
+</p:sld>
+</file>
+
+<file path=ppt/slides/slide3.xml><?xml version="1.0" encoding="utf-8"?>
+<p:sld xmlns:a="http://schemas.openxmlformats.org/drawingml/2006/main" xmlns:r="http://schemas.openxmlformats.org/officeDocument/2006/relationships" xmlns:p="http://schemas.openxmlformats.org/presentationml/2006/main">
+  <p:cSld>
+    <p:bg>
+      <p:bgPr>
+        <a:gradFill flip="none" rotWithShape="1">
+          <a:gsLst>
+            <a:gs pos="0">
+              <a:schemeClr val="accent6">
+                <a:lumMod val="5000"/>
+                <a:lumOff val="95000"/>
+              </a:schemeClr>
+            </a:gs>
+            <a:gs pos="74000">
+              <a:schemeClr val="accent6">
+                <a:lumMod val="45000"/>
+                <a:lumOff val="55000"/>
+              </a:schemeClr>
+            </a:gs>
+            <a:gs pos="83000">
+              <a:schemeClr val="accent6">
+                <a:lumMod val="45000"/>
+                <a:lumOff val="55000"/>
+              </a:schemeClr>
+            </a:gs>
+            <a:gs pos="100000">
+              <a:schemeClr val="accent6">
+                <a:lumMod val="30000"/>
+                <a:lumOff val="70000"/>
+              </a:schemeClr>
+            </a:gs>
+          </a:gsLst>
+          <a:lin ang="5400000" scaled="1"/>
+          <a:tileRect/>
+        </a:gradFill>
+        <a:effectLst/>
+      </p:bgPr>
+    </p:bg>
+    <p:spTree>
+      <p:nvGrpSpPr>
+        <p:cNvPr id="1" name=""/>
+        <p:cNvGrpSpPr/>
+        <p:nvPr/>
+      </p:nvGrpSpPr>
+      <p:grpSpPr>
+        <a:xfrm>
+          <a:off x="0" y="0"/>
+          <a:ext cx="0" cy="0"/>
+          <a:chOff x="0" y="0"/>
+          <a:chExt cx="0" cy="0"/>
+        </a:xfrm>
+      </p:grpSpPr>
+      <p:sp>
+        <p:nvSpPr>
+          <p:cNvPr id="4" name="Retângulo 3"/>
+          <p:cNvSpPr/>
+          <p:nvPr/>
+        </p:nvSpPr>
+        <p:spPr>
+          <a:xfrm>
+            <a:off x="197064" y="239877"/>
+            <a:ext cx="2183611" cy="923330"/>
+          </a:xfrm>
+          <a:prstGeom prst="rect">
+            <a:avLst/>
+          </a:prstGeom>
+        </p:spPr>
+        <p:txBody>
+          <a:bodyPr wrap="none">
+            <a:spAutoFit/>
+          </a:bodyPr>
+          <a:lstStyle/>
+          <a:p>
+            <a:pPr algn="ctr"/>
+            <a:r>
+              <a:rPr lang="pt-BR" sz="5400" dirty="0" smtClean="0">
+                <a:ln w="0"/>
+                <a:effectLst>
+                  <a:outerShdw blurRad="38100" dist="19050" dir="2700000" algn="tl" rotWithShape="0">
+                    <a:schemeClr val="dk1">
+                      <a:alpha val="40000"/>
+                    </a:schemeClr>
+                  </a:outerShdw>
+                </a:effectLst>
+                <a:latin typeface="Comic Sans MS" panose="030F0702030302020204" pitchFamily="66" charset="0"/>
+              </a:rPr>
+              <a:t>CSG 2</a:t>
+            </a:r>
+            <a:endParaRPr lang="pt-BR" sz="5400" dirty="0">
+              <a:ln w="0"/>
+              <a:effectLst>
+                <a:outerShdw blurRad="38100" dist="19050" dir="2700000" algn="tl" rotWithShape="0">
+                  <a:schemeClr val="dk1">
+                    <a:alpha val="40000"/>
+                  </a:schemeClr>
+                </a:outerShdw>
+              </a:effectLst>
+              <a:latin typeface="Comic Sans MS" panose="030F0702030302020204" pitchFamily="66" charset="0"/>
+            </a:endParaRPr>
+          </a:p>
+        </p:txBody>
+      </p:sp>
+      <p:pic>
+        <p:nvPicPr>
+          <p:cNvPr id="6" name="Imagem 5"/>
+          <p:cNvPicPr>
+            <a:picLocks noChangeAspect="1"/>
+          </p:cNvPicPr>
+          <p:nvPr/>
+        </p:nvPicPr>
+        <p:blipFill rotWithShape="1">
+          <a:blip r:embed="rId2" cstate="print">
+            <a:extLst>
+              <a:ext uri="{28A0092B-C50C-407E-A947-70E740481C1C}">
+                <a14:useLocalDpi xmlns:a14="http://schemas.microsoft.com/office/drawing/2010/main" val="0"/>
+              </a:ext>
+            </a:extLst>
+          </a:blip>
+          <a:srcRect l="28231" t="9808" r="27448" b="11060"/>
+          <a:stretch/>
+        </p:blipFill>
+        <p:spPr>
+          <a:xfrm>
+            <a:off x="1398483" y="5982789"/>
+            <a:ext cx="786809" cy="817949"/>
+          </a:xfrm>
+          <a:prstGeom prst="rect">
+            <a:avLst/>
+          </a:prstGeom>
+        </p:spPr>
+      </p:pic>
+      <p:pic>
+        <p:nvPicPr>
+          <p:cNvPr id="7" name="Imagem 6"/>
+          <p:cNvPicPr>
+            <a:picLocks noChangeAspect="1"/>
+          </p:cNvPicPr>
+          <p:nvPr/>
+        </p:nvPicPr>
+        <p:blipFill rotWithShape="1">
+          <a:blip r:embed="rId3" cstate="print">
+            <a:extLst>
+              <a:ext uri="{28A0092B-C50C-407E-A947-70E740481C1C}">
+                <a14:useLocalDpi xmlns:a14="http://schemas.microsoft.com/office/drawing/2010/main" val="0"/>
+              </a:ext>
+            </a:extLst>
+          </a:blip>
+          <a:srcRect l="28195" r="28506"/>
+          <a:stretch/>
+        </p:blipFill>
+        <p:spPr>
+          <a:xfrm>
+            <a:off x="2614747" y="5936495"/>
+            <a:ext cx="586918" cy="864243"/>
+          </a:xfrm>
+          <a:prstGeom prst="rect">
+            <a:avLst/>
+          </a:prstGeom>
+        </p:spPr>
+      </p:pic>
+      <p:pic>
+        <p:nvPicPr>
+          <p:cNvPr id="8" name="Imagem 7"/>
+          <p:cNvPicPr>
+            <a:picLocks noChangeAspect="1"/>
+          </p:cNvPicPr>
+          <p:nvPr/>
+        </p:nvPicPr>
+        <p:blipFill rotWithShape="1">
+          <a:blip r:embed="rId4" cstate="print">
+            <a:extLst>
+              <a:ext uri="{28A0092B-C50C-407E-A947-70E740481C1C}">
+                <a14:useLocalDpi xmlns:a14="http://schemas.microsoft.com/office/drawing/2010/main" val="0"/>
+              </a:ext>
+            </a:extLst>
+          </a:blip>
+          <a:srcRect l="33629" t="3686" r="29942" b="26357"/>
+          <a:stretch/>
+        </p:blipFill>
+        <p:spPr>
+          <a:xfrm>
+            <a:off x="2013335" y="4454434"/>
+            <a:ext cx="894871" cy="966652"/>
+          </a:xfrm>
+          <a:prstGeom prst="rect">
+            <a:avLst/>
+          </a:prstGeom>
+        </p:spPr>
+      </p:pic>
+      <p:sp>
+        <p:nvSpPr>
+          <p:cNvPr id="9" name="Retângulo 8"/>
+          <p:cNvSpPr/>
+          <p:nvPr/>
+        </p:nvSpPr>
+        <p:spPr>
+          <a:xfrm>
+            <a:off x="2247608" y="5587763"/>
+            <a:ext cx="304823" cy="348732"/>
+          </a:xfrm>
+          <a:prstGeom prst="rect">
+            <a:avLst/>
+          </a:prstGeom>
+          <a:noFill/>
+        </p:spPr>
+        <p:txBody>
+          <a:bodyPr wrap="square" lIns="91440" tIns="45720" rIns="91440" bIns="45720">
+            <a:spAutoFit/>
+          </a:bodyPr>
+          <a:lstStyle/>
+          <a:p>
+            <a:pPr algn="ctr"/>
+            <a:r>
+              <a:rPr lang="pt-BR" sz="1600" b="0" cap="none" spc="0" dirty="0" smtClean="0">
+                <a:ln w="0"/>
+                <a:solidFill>
+                  <a:schemeClr val="tx1"/>
+                </a:solidFill>
+                <a:effectLst>
+                  <a:outerShdw blurRad="38100" dist="19050" dir="2700000" algn="tl" rotWithShape="0">
+                    <a:schemeClr val="dk1">
+                      <a:alpha val="40000"/>
+                    </a:schemeClr>
+                  </a:outerShdw>
+                </a:effectLst>
+              </a:rPr>
+              <a:t>U</a:t>
+            </a:r>
+            <a:endParaRPr lang="pt-BR" sz="1600" b="0" cap="none" spc="0" dirty="0">
+              <a:ln w="0"/>
+              <a:solidFill>
+                <a:schemeClr val="tx1"/>
+              </a:solidFill>
+              <a:effectLst>
+                <a:outerShdw blurRad="38100" dist="19050" dir="2700000" algn="tl" rotWithShape="0">
+                  <a:schemeClr val="dk1">
+                    <a:alpha val="40000"/>
+                  </a:schemeClr>
+                </a:outerShdw>
+              </a:effectLst>
+            </a:endParaRPr>
+          </a:p>
+        </p:txBody>
+      </p:sp>
+      <p:cxnSp>
+        <p:nvCxnSpPr>
+          <p:cNvPr id="11" name="Conector de Seta Reta 10"/>
+          <p:cNvCxnSpPr>
+            <a:stCxn id="6" idx="0"/>
+            <a:endCxn id="8" idx="2"/>
+          </p:cNvCxnSpPr>
+          <p:nvPr/>
+        </p:nvCxnSpPr>
+        <p:spPr>
+          <a:xfrm flipV="1">
+            <a:off x="1791888" y="5421086"/>
+            <a:ext cx="668883" cy="561703"/>
+          </a:xfrm>
+          <a:prstGeom prst="straightConnector1">
+            <a:avLst/>
+          </a:prstGeom>
+          <a:ln>
+            <a:tailEnd type="triangle"/>
+          </a:ln>
+        </p:spPr>
+        <p:style>
+          <a:lnRef idx="1">
+            <a:schemeClr val="accent1"/>
+          </a:lnRef>
+          <a:fillRef idx="0">
+            <a:schemeClr val="accent1"/>
+          </a:fillRef>
+          <a:effectRef idx="0">
+            <a:schemeClr val="accent1"/>
+          </a:effectRef>
+          <a:fontRef idx="minor">
+            <a:schemeClr val="tx1"/>
+          </a:fontRef>
+        </p:style>
+      </p:cxnSp>
+      <p:cxnSp>
+        <p:nvCxnSpPr>
+          <p:cNvPr id="13" name="Conector de Seta Reta 12"/>
+          <p:cNvCxnSpPr>
+            <a:stCxn id="7" idx="0"/>
+            <a:endCxn id="8" idx="2"/>
+          </p:cNvCxnSpPr>
+          <p:nvPr/>
+        </p:nvCxnSpPr>
+        <p:spPr>
+          <a:xfrm flipH="1" flipV="1">
+            <a:off x="2460771" y="5421086"/>
+            <a:ext cx="447435" cy="515409"/>
+          </a:xfrm>
+          <a:prstGeom prst="straightConnector1">
+            <a:avLst/>
+          </a:prstGeom>
+          <a:ln>
+            <a:tailEnd type="triangle"/>
+          </a:ln>
+        </p:spPr>
+        <p:style>
+          <a:lnRef idx="1">
+            <a:schemeClr val="accent1"/>
+          </a:lnRef>
+          <a:fillRef idx="0">
+            <a:schemeClr val="accent1"/>
+          </a:fillRef>
+          <a:effectRef idx="0">
+            <a:schemeClr val="accent1"/>
+          </a:effectRef>
+          <a:fontRef idx="minor">
+            <a:schemeClr val="tx1"/>
+          </a:fontRef>
+        </p:style>
+      </p:cxnSp>
+      <p:pic>
+        <p:nvPicPr>
+          <p:cNvPr id="17" name="Imagem 16"/>
+          <p:cNvPicPr>
+            <a:picLocks noChangeAspect="1"/>
+          </p:cNvPicPr>
+          <p:nvPr/>
+        </p:nvPicPr>
+        <p:blipFill rotWithShape="1">
+          <a:blip r:embed="rId2" cstate="print">
+            <a:extLst>
+              <a:ext uri="{28A0092B-C50C-407E-A947-70E740481C1C}">
+                <a14:useLocalDpi xmlns:a14="http://schemas.microsoft.com/office/drawing/2010/main" val="0"/>
+              </a:ext>
+            </a:extLst>
+          </a:blip>
+          <a:srcRect l="28231" t="9808" r="27448" b="11060"/>
+          <a:stretch/>
+        </p:blipFill>
+        <p:spPr>
+          <a:xfrm>
+            <a:off x="465147" y="4528785"/>
+            <a:ext cx="786809" cy="817949"/>
+          </a:xfrm>
+          <a:prstGeom prst="rect">
+            <a:avLst/>
+          </a:prstGeom>
+        </p:spPr>
+      </p:pic>
+      <p:sp>
+        <p:nvSpPr>
+          <p:cNvPr id="18" name="Retângulo 17"/>
+          <p:cNvSpPr/>
+          <p:nvPr/>
+        </p:nvSpPr>
+        <p:spPr>
+          <a:xfrm>
+            <a:off x="1487064" y="4162046"/>
+            <a:ext cx="304823" cy="584775"/>
+          </a:xfrm>
+          <a:prstGeom prst="rect">
+            <a:avLst/>
+          </a:prstGeom>
+          <a:noFill/>
+        </p:spPr>
+        <p:txBody>
+          <a:bodyPr wrap="square" lIns="91440" tIns="45720" rIns="91440" bIns="45720">
+            <a:spAutoFit/>
+          </a:bodyPr>
+          <a:lstStyle/>
+          <a:p>
+            <a:pPr algn="ctr"/>
+            <a:r>
+              <a:rPr lang="pt-BR" sz="1600" b="0" cap="none" spc="0" dirty="0" smtClean="0">
+                <a:ln w="0"/>
+                <a:solidFill>
+                  <a:schemeClr val="tx1"/>
+                </a:solidFill>
+                <a:effectLst>
+                  <a:outerShdw blurRad="38100" dist="19050" dir="2700000" algn="tl" rotWithShape="0">
+                    <a:schemeClr val="dk1">
+                      <a:alpha val="40000"/>
+                    </a:schemeClr>
+                  </a:outerShdw>
+                </a:effectLst>
+              </a:rPr>
+              <a:t>-</a:t>
+            </a:r>
+          </a:p>
+          <a:p>
+            <a:pPr algn="ctr"/>
+            <a:endParaRPr lang="pt-BR" sz="1600" b="0" cap="none" spc="0" dirty="0">
+              <a:ln w="0"/>
+              <a:solidFill>
+                <a:schemeClr val="tx1"/>
+              </a:solidFill>
+              <a:effectLst>
+                <a:outerShdw blurRad="38100" dist="19050" dir="2700000" algn="tl" rotWithShape="0">
+                  <a:schemeClr val="dk1">
+                    <a:alpha val="40000"/>
+                  </a:schemeClr>
+                </a:outerShdw>
+              </a:effectLst>
+            </a:endParaRPr>
+          </a:p>
+        </p:txBody>
+      </p:sp>
+      <p:pic>
+        <p:nvPicPr>
+          <p:cNvPr id="19" name="Imagem 18"/>
+          <p:cNvPicPr>
+            <a:picLocks noChangeAspect="1"/>
+          </p:cNvPicPr>
+          <p:nvPr/>
+        </p:nvPicPr>
+        <p:blipFill rotWithShape="1">
+          <a:blip r:embed="rId5">
+            <a:extLst>
+              <a:ext uri="{28A0092B-C50C-407E-A947-70E740481C1C}">
+                <a14:useLocalDpi xmlns:a14="http://schemas.microsoft.com/office/drawing/2010/main" val="0"/>
+              </a:ext>
+            </a:extLst>
+          </a:blip>
+          <a:srcRect l="40188" t="23197" r="33644" b="35476"/>
+          <a:stretch/>
+        </p:blipFill>
+        <p:spPr>
+          <a:xfrm>
+            <a:off x="1159450" y="2986961"/>
+            <a:ext cx="1088158" cy="966652"/>
+          </a:xfrm>
+          <a:prstGeom prst="rect">
+            <a:avLst/>
+          </a:prstGeom>
+        </p:spPr>
+      </p:pic>
+      <p:cxnSp>
+        <p:nvCxnSpPr>
+          <p:cNvPr id="21" name="Conector de Seta Reta 20"/>
+          <p:cNvCxnSpPr>
+            <a:stCxn id="17" idx="0"/>
+            <a:endCxn id="19" idx="2"/>
+          </p:cNvCxnSpPr>
+          <p:nvPr/>
+        </p:nvCxnSpPr>
+        <p:spPr>
+          <a:xfrm flipV="1">
+            <a:off x="858552" y="3953613"/>
+            <a:ext cx="844977" cy="575172"/>
+          </a:xfrm>
+          <a:prstGeom prst="straightConnector1">
+            <a:avLst/>
+          </a:prstGeom>
+          <a:ln>
+            <a:tailEnd type="triangle"/>
+          </a:ln>
+        </p:spPr>
+        <p:style>
+          <a:lnRef idx="1">
+            <a:schemeClr val="accent1"/>
+          </a:lnRef>
+          <a:fillRef idx="0">
+            <a:schemeClr val="accent1"/>
+          </a:fillRef>
+          <a:effectRef idx="0">
+            <a:schemeClr val="accent1"/>
+          </a:effectRef>
+          <a:fontRef idx="minor">
+            <a:schemeClr val="tx1"/>
+          </a:fontRef>
+        </p:style>
+      </p:cxnSp>
+      <p:cxnSp>
+        <p:nvCxnSpPr>
+          <p:cNvPr id="23" name="Conector de Seta Reta 22"/>
+          <p:cNvCxnSpPr>
+            <a:stCxn id="8" idx="0"/>
+            <a:endCxn id="19" idx="2"/>
+          </p:cNvCxnSpPr>
+          <p:nvPr/>
+        </p:nvCxnSpPr>
+        <p:spPr>
+          <a:xfrm flipH="1" flipV="1">
+            <a:off x="1703529" y="3953613"/>
+            <a:ext cx="757242" cy="500821"/>
+          </a:xfrm>
+          <a:prstGeom prst="straightConnector1">
+            <a:avLst/>
+          </a:prstGeom>
+          <a:ln>
+            <a:tailEnd type="triangle"/>
+          </a:ln>
+        </p:spPr>
+        <p:style>
+          <a:lnRef idx="1">
+            <a:schemeClr val="accent1"/>
+          </a:lnRef>
+          <a:fillRef idx="0">
+            <a:schemeClr val="accent1"/>
+          </a:fillRef>
+          <a:effectRef idx="0">
+            <a:schemeClr val="accent1"/>
+          </a:effectRef>
+          <a:fontRef idx="minor">
+            <a:schemeClr val="tx1"/>
+          </a:fontRef>
+        </p:style>
+      </p:cxnSp>
+      <p:pic>
+        <p:nvPicPr>
+          <p:cNvPr id="24" name="Imagem 23"/>
+          <p:cNvPicPr>
+            <a:picLocks noChangeAspect="1"/>
+          </p:cNvPicPr>
+          <p:nvPr/>
+        </p:nvPicPr>
+        <p:blipFill rotWithShape="1">
+          <a:blip r:embed="rId3" cstate="print">
+            <a:extLst>
+              <a:ext uri="{28A0092B-C50C-407E-A947-70E740481C1C}">
+                <a14:useLocalDpi xmlns:a14="http://schemas.microsoft.com/office/drawing/2010/main" val="0"/>
+              </a:ext>
+            </a:extLst>
+          </a:blip>
+          <a:srcRect l="28195" r="28506"/>
+          <a:stretch/>
+        </p:blipFill>
+        <p:spPr>
+          <a:xfrm>
+            <a:off x="2823297" y="3028488"/>
+            <a:ext cx="586918" cy="864243"/>
+          </a:xfrm>
+          <a:prstGeom prst="rect">
+            <a:avLst/>
+          </a:prstGeom>
+        </p:spPr>
+      </p:pic>
+      <p:pic>
+        <p:nvPicPr>
+          <p:cNvPr id="25" name="Imagem 24"/>
+          <p:cNvPicPr>
+            <a:picLocks noChangeAspect="1"/>
+          </p:cNvPicPr>
+          <p:nvPr/>
+        </p:nvPicPr>
+        <p:blipFill rotWithShape="1">
+          <a:blip r:embed="rId6" cstate="print">
+            <a:extLst>
+              <a:ext uri="{28A0092B-C50C-407E-A947-70E740481C1C}">
+                <a14:useLocalDpi xmlns:a14="http://schemas.microsoft.com/office/drawing/2010/main" val="0"/>
+              </a:ext>
+            </a:extLst>
+          </a:blip>
+          <a:srcRect l="34473" t="-1039" r="5463" b="10196"/>
+          <a:stretch/>
+        </p:blipFill>
+        <p:spPr>
+          <a:xfrm>
+            <a:off x="2072638" y="1723895"/>
+            <a:ext cx="1084217" cy="922387"/>
+          </a:xfrm>
+          <a:prstGeom prst="rect">
+            <a:avLst/>
+          </a:prstGeom>
+        </p:spPr>
+      </p:pic>
+      <p:sp>
+        <p:nvSpPr>
+          <p:cNvPr id="26" name="Retângulo 25"/>
+          <p:cNvSpPr/>
+          <p:nvPr/>
+        </p:nvSpPr>
+        <p:spPr>
+          <a:xfrm>
+            <a:off x="2380675" y="2788460"/>
+            <a:ext cx="304823" cy="348732"/>
+          </a:xfrm>
+          <a:prstGeom prst="rect">
+            <a:avLst/>
+          </a:prstGeom>
+          <a:noFill/>
+        </p:spPr>
+        <p:txBody>
+          <a:bodyPr wrap="square" lIns="91440" tIns="45720" rIns="91440" bIns="45720">
+            <a:spAutoFit/>
+          </a:bodyPr>
+          <a:lstStyle/>
+          <a:p>
+            <a:pPr algn="ctr"/>
+            <a:r>
+              <a:rPr lang="pt-BR" sz="1600" b="0" cap="none" spc="0" dirty="0" smtClean="0">
+                <a:ln w="0"/>
+                <a:solidFill>
+                  <a:schemeClr val="tx1"/>
+                </a:solidFill>
+                <a:effectLst>
+                  <a:outerShdw blurRad="38100" dist="19050" dir="2700000" algn="tl" rotWithShape="0">
+                    <a:schemeClr val="dk1">
+                      <a:alpha val="40000"/>
+                    </a:schemeClr>
+                  </a:outerShdw>
+                </a:effectLst>
+              </a:rPr>
+              <a:t>U</a:t>
+            </a:r>
+            <a:endParaRPr lang="pt-BR" sz="1600" b="0" cap="none" spc="0" dirty="0">
+              <a:ln w="0"/>
+              <a:solidFill>
+                <a:schemeClr val="tx1"/>
+              </a:solidFill>
+              <a:effectLst>
+                <a:outerShdw blurRad="38100" dist="19050" dir="2700000" algn="tl" rotWithShape="0">
+                  <a:schemeClr val="dk1">
+                    <a:alpha val="40000"/>
+                  </a:schemeClr>
+                </a:outerShdw>
+              </a:effectLst>
+            </a:endParaRPr>
+          </a:p>
+        </p:txBody>
+      </p:sp>
+      <p:cxnSp>
+        <p:nvCxnSpPr>
+          <p:cNvPr id="28" name="Conector de Seta Reta 27"/>
+          <p:cNvCxnSpPr>
+            <a:stCxn id="19" idx="0"/>
+            <a:endCxn id="25" idx="2"/>
+          </p:cNvCxnSpPr>
+          <p:nvPr/>
+        </p:nvCxnSpPr>
+        <p:spPr>
+          <a:xfrm flipV="1">
+            <a:off x="1703529" y="2646282"/>
+            <a:ext cx="911218" cy="340679"/>
+          </a:xfrm>
+          <a:prstGeom prst="straightConnector1">
+            <a:avLst/>
+          </a:prstGeom>
+          <a:ln>
+            <a:tailEnd type="triangle"/>
+          </a:ln>
+        </p:spPr>
+        <p:style>
+          <a:lnRef idx="1">
+            <a:schemeClr val="accent1"/>
+          </a:lnRef>
+          <a:fillRef idx="0">
+            <a:schemeClr val="accent1"/>
+          </a:fillRef>
+          <a:effectRef idx="0">
+            <a:schemeClr val="accent1"/>
+          </a:effectRef>
+          <a:fontRef idx="minor">
+            <a:schemeClr val="tx1"/>
+          </a:fontRef>
+        </p:style>
+      </p:cxnSp>
+      <p:cxnSp>
+        <p:nvCxnSpPr>
+          <p:cNvPr id="30" name="Conector de Seta Reta 29"/>
+          <p:cNvCxnSpPr>
+            <a:stCxn id="24" idx="0"/>
+            <a:endCxn id="25" idx="2"/>
+          </p:cNvCxnSpPr>
+          <p:nvPr/>
+        </p:nvCxnSpPr>
+        <p:spPr>
+          <a:xfrm flipH="1" flipV="1">
+            <a:off x="2614747" y="2646282"/>
+            <a:ext cx="502009" cy="382206"/>
+          </a:xfrm>
+          <a:prstGeom prst="straightConnector1">
+            <a:avLst/>
+          </a:prstGeom>
+          <a:ln>
+            <a:tailEnd type="triangle"/>
+          </a:ln>
+        </p:spPr>
+        <p:style>
+          <a:lnRef idx="1">
+            <a:schemeClr val="accent1"/>
+          </a:lnRef>
+          <a:fillRef idx="0">
+            <a:schemeClr val="accent1"/>
+          </a:fillRef>
+          <a:effectRef idx="0">
+            <a:schemeClr val="accent1"/>
+          </a:effectRef>
+          <a:fontRef idx="minor">
+            <a:schemeClr val="tx1"/>
+          </a:fontRef>
+        </p:style>
+      </p:cxnSp>
+      <p:sp>
+        <p:nvSpPr>
+          <p:cNvPr id="31" name="Retângulo 30"/>
+          <p:cNvSpPr/>
+          <p:nvPr/>
+        </p:nvSpPr>
+        <p:spPr>
+          <a:xfrm>
+            <a:off x="1487064" y="2050579"/>
+            <a:ext cx="457457" cy="338554"/>
+          </a:xfrm>
+          <a:prstGeom prst="rect">
+            <a:avLst/>
+          </a:prstGeom>
+          <a:noFill/>
+        </p:spPr>
+        <p:txBody>
+          <a:bodyPr wrap="square" lIns="91440" tIns="45720" rIns="91440" bIns="45720">
+            <a:spAutoFit/>
+          </a:bodyPr>
+          <a:lstStyle/>
+          <a:p>
+            <a:pPr algn="ctr"/>
+            <a:r>
+              <a:rPr lang="pt-BR" sz="1600" b="0" cap="none" spc="0" dirty="0" smtClean="0">
+                <a:ln w="0"/>
+                <a:solidFill>
+                  <a:schemeClr val="tx1"/>
+                </a:solidFill>
+                <a:effectLst>
+                  <a:outerShdw blurRad="38100" dist="19050" dir="2700000" algn="tl" rotWithShape="0">
+                    <a:schemeClr val="dk1">
+                      <a:alpha val="40000"/>
+                    </a:schemeClr>
+                  </a:outerShdw>
+                </a:effectLst>
+              </a:rPr>
+              <a:t>3x</a:t>
+            </a:r>
+            <a:endParaRPr lang="pt-BR" sz="1600" b="0" cap="none" spc="0" dirty="0">
+              <a:ln w="0"/>
+              <a:solidFill>
+                <a:schemeClr val="tx1"/>
+              </a:solidFill>
+              <a:effectLst>
+                <a:outerShdw blurRad="38100" dist="19050" dir="2700000" algn="tl" rotWithShape="0">
+                  <a:schemeClr val="dk1">
+                    <a:alpha val="40000"/>
+                  </a:schemeClr>
+                </a:outerShdw>
+              </a:effectLst>
+            </a:endParaRPr>
+          </a:p>
+        </p:txBody>
+      </p:sp>
+      <p:pic>
+        <p:nvPicPr>
+          <p:cNvPr id="32" name="Imagem 31"/>
+          <p:cNvPicPr>
+            <a:picLocks noChangeAspect="1"/>
+          </p:cNvPicPr>
+          <p:nvPr/>
+        </p:nvPicPr>
+        <p:blipFill rotWithShape="1">
+          <a:blip r:embed="rId7" cstate="print">
+            <a:extLst>
+              <a:ext uri="{28A0092B-C50C-407E-A947-70E740481C1C}">
+                <a14:useLocalDpi xmlns:a14="http://schemas.microsoft.com/office/drawing/2010/main" val="0"/>
+              </a:ext>
+            </a:extLst>
+          </a:blip>
+          <a:srcRect l="28175" t="11652" r="28644" b="13197"/>
+          <a:stretch/>
+        </p:blipFill>
+        <p:spPr>
+          <a:xfrm>
+            <a:off x="9084512" y="5847343"/>
+            <a:ext cx="916114" cy="896828"/>
+          </a:xfrm>
+          <a:prstGeom prst="rect">
+            <a:avLst/>
+          </a:prstGeom>
+        </p:spPr>
+      </p:pic>
+      <p:pic>
+        <p:nvPicPr>
+          <p:cNvPr id="34" name="Imagem 33"/>
+          <p:cNvPicPr>
+            <a:picLocks noChangeAspect="1"/>
+          </p:cNvPicPr>
+          <p:nvPr/>
+        </p:nvPicPr>
+        <p:blipFill rotWithShape="1">
+          <a:blip r:embed="rId8" cstate="print">
+            <a:extLst>
+              <a:ext uri="{28A0092B-C50C-407E-A947-70E740481C1C}">
+                <a14:useLocalDpi xmlns:a14="http://schemas.microsoft.com/office/drawing/2010/main" val="0"/>
+              </a:ext>
+            </a:extLst>
+          </a:blip>
+          <a:srcRect l="17497" t="45771" r="37513" b="-18417"/>
+          <a:stretch/>
+        </p:blipFill>
+        <p:spPr>
+          <a:xfrm>
+            <a:off x="10392097" y="5897307"/>
+            <a:ext cx="1102319" cy="1001218"/>
+          </a:xfrm>
+          <a:prstGeom prst="rect">
+            <a:avLst/>
+          </a:prstGeom>
+        </p:spPr>
+      </p:pic>
+      <p:sp>
+        <p:nvSpPr>
+          <p:cNvPr id="35" name="Retângulo 34"/>
+          <p:cNvSpPr/>
+          <p:nvPr/>
+        </p:nvSpPr>
+        <p:spPr>
+          <a:xfrm>
+            <a:off x="11428430" y="6176444"/>
+            <a:ext cx="457457" cy="338554"/>
+          </a:xfrm>
+          <a:prstGeom prst="rect">
+            <a:avLst/>
+          </a:prstGeom>
+          <a:noFill/>
+        </p:spPr>
+        <p:txBody>
+          <a:bodyPr wrap="square" lIns="91440" tIns="45720" rIns="91440" bIns="45720">
+            <a:spAutoFit/>
+          </a:bodyPr>
+          <a:lstStyle/>
+          <a:p>
+            <a:pPr algn="ctr"/>
+            <a:r>
+              <a:rPr lang="pt-BR" sz="1600" dirty="0">
+                <a:ln w="0"/>
+                <a:effectLst>
+                  <a:outerShdw blurRad="38100" dist="19050" dir="2700000" algn="tl" rotWithShape="0">
+                    <a:schemeClr val="dk1">
+                      <a:alpha val="40000"/>
+                    </a:schemeClr>
+                  </a:outerShdw>
+                </a:effectLst>
+              </a:rPr>
+              <a:t>2</a:t>
+            </a:r>
+            <a:r>
+              <a:rPr lang="pt-BR" sz="1600" b="0" cap="none" spc="0" dirty="0" smtClean="0">
+                <a:ln w="0"/>
+                <a:solidFill>
+                  <a:schemeClr val="tx1"/>
+                </a:solidFill>
+                <a:effectLst>
+                  <a:outerShdw blurRad="38100" dist="19050" dir="2700000" algn="tl" rotWithShape="0">
+                    <a:schemeClr val="dk1">
+                      <a:alpha val="40000"/>
+                    </a:schemeClr>
+                  </a:outerShdw>
+                </a:effectLst>
+              </a:rPr>
+              <a:t>x</a:t>
+            </a:r>
+            <a:endParaRPr lang="pt-BR" sz="1600" b="0" cap="none" spc="0" dirty="0">
+              <a:ln w="0"/>
+              <a:solidFill>
+                <a:schemeClr val="tx1"/>
+              </a:solidFill>
+              <a:effectLst>
+                <a:outerShdw blurRad="38100" dist="19050" dir="2700000" algn="tl" rotWithShape="0">
+                  <a:schemeClr val="dk1">
+                    <a:alpha val="40000"/>
+                  </a:schemeClr>
+                </a:outerShdw>
+              </a:effectLst>
+            </a:endParaRPr>
+          </a:p>
+        </p:txBody>
+      </p:sp>
+      <p:sp>
+        <p:nvSpPr>
+          <p:cNvPr id="36" name="Retângulo 35"/>
+          <p:cNvSpPr/>
+          <p:nvPr/>
+        </p:nvSpPr>
+        <p:spPr>
+          <a:xfrm>
+            <a:off x="10021868" y="6137037"/>
+            <a:ext cx="479299" cy="338554"/>
+          </a:xfrm>
+          <a:prstGeom prst="rect">
+            <a:avLst/>
+          </a:prstGeom>
+          <a:noFill/>
+        </p:spPr>
+        <p:txBody>
+          <a:bodyPr wrap="square" lIns="91440" tIns="45720" rIns="91440" bIns="45720">
+            <a:spAutoFit/>
+          </a:bodyPr>
+          <a:lstStyle/>
+          <a:p>
+            <a:pPr algn="ctr"/>
+            <a:r>
+              <a:rPr lang="pt-BR" sz="1600" dirty="0">
+                <a:ln w="0"/>
+                <a:effectLst>
+                  <a:outerShdw blurRad="38100" dist="19050" dir="2700000" algn="tl" rotWithShape="0">
+                    <a:schemeClr val="dk1">
+                      <a:alpha val="40000"/>
+                    </a:schemeClr>
+                  </a:outerShdw>
+                </a:effectLst>
+              </a:rPr>
+              <a:t>2</a:t>
+            </a:r>
+            <a:r>
+              <a:rPr lang="pt-BR" sz="1600" b="0" cap="none" spc="0" dirty="0" smtClean="0">
+                <a:ln w="0"/>
+                <a:solidFill>
+                  <a:schemeClr val="tx1"/>
+                </a:solidFill>
+                <a:effectLst>
+                  <a:outerShdw blurRad="38100" dist="19050" dir="2700000" algn="tl" rotWithShape="0">
+                    <a:schemeClr val="dk1">
+                      <a:alpha val="40000"/>
+                    </a:schemeClr>
+                  </a:outerShdw>
+                </a:effectLst>
+              </a:rPr>
+              <a:t>x</a:t>
+            </a:r>
+            <a:endParaRPr lang="pt-BR" sz="1600" b="0" cap="none" spc="0" dirty="0">
+              <a:ln w="0"/>
+              <a:solidFill>
+                <a:schemeClr val="tx1"/>
+              </a:solidFill>
+              <a:effectLst>
+                <a:outerShdw blurRad="38100" dist="19050" dir="2700000" algn="tl" rotWithShape="0">
+                  <a:schemeClr val="dk1">
+                    <a:alpha val="40000"/>
+                  </a:schemeClr>
+                </a:outerShdw>
+              </a:effectLst>
+            </a:endParaRPr>
+          </a:p>
+        </p:txBody>
+      </p:sp>
+      <p:sp>
+        <p:nvSpPr>
+          <p:cNvPr id="37" name="Retângulo 36"/>
+          <p:cNvSpPr/>
+          <p:nvPr/>
+        </p:nvSpPr>
+        <p:spPr>
+          <a:xfrm>
+            <a:off x="10109105" y="5365371"/>
+            <a:ext cx="304823" cy="348732"/>
+          </a:xfrm>
+          <a:prstGeom prst="rect">
+            <a:avLst/>
+          </a:prstGeom>
+          <a:noFill/>
+        </p:spPr>
+        <p:txBody>
+          <a:bodyPr wrap="square" lIns="91440" tIns="45720" rIns="91440" bIns="45720">
+            <a:spAutoFit/>
+          </a:bodyPr>
+          <a:lstStyle/>
+          <a:p>
+            <a:pPr algn="ctr"/>
+            <a:r>
+              <a:rPr lang="pt-BR" sz="1600" b="0" cap="none" spc="0" dirty="0" smtClean="0">
+                <a:ln w="0"/>
+                <a:solidFill>
+                  <a:schemeClr val="tx1"/>
+                </a:solidFill>
+                <a:effectLst>
+                  <a:outerShdw blurRad="38100" dist="19050" dir="2700000" algn="tl" rotWithShape="0">
+                    <a:schemeClr val="dk1">
+                      <a:alpha val="40000"/>
+                    </a:schemeClr>
+                  </a:outerShdw>
+                </a:effectLst>
+              </a:rPr>
+              <a:t>U</a:t>
+            </a:r>
+            <a:endParaRPr lang="pt-BR" sz="1600" b="0" cap="none" spc="0" dirty="0">
+              <a:ln w="0"/>
+              <a:solidFill>
+                <a:schemeClr val="tx1"/>
+              </a:solidFill>
+              <a:effectLst>
+                <a:outerShdw blurRad="38100" dist="19050" dir="2700000" algn="tl" rotWithShape="0">
+                  <a:schemeClr val="dk1">
+                    <a:alpha val="40000"/>
+                  </a:schemeClr>
+                </a:outerShdw>
+              </a:effectLst>
+            </a:endParaRPr>
+          </a:p>
+        </p:txBody>
+      </p:sp>
+      <p:pic>
+        <p:nvPicPr>
+          <p:cNvPr id="38" name="Imagem 37"/>
+          <p:cNvPicPr>
+            <a:picLocks noChangeAspect="1"/>
+          </p:cNvPicPr>
+          <p:nvPr/>
+        </p:nvPicPr>
+        <p:blipFill rotWithShape="1">
+          <a:blip r:embed="rId9">
+            <a:extLst>
+              <a:ext uri="{28A0092B-C50C-407E-A947-70E740481C1C}">
+                <a14:useLocalDpi xmlns:a14="http://schemas.microsoft.com/office/drawing/2010/main" val="0"/>
+              </a:ext>
+            </a:extLst>
+          </a:blip>
+          <a:srcRect l="45771" r="38320" b="33745"/>
+          <a:stretch/>
+        </p:blipFill>
+        <p:spPr>
+          <a:xfrm>
+            <a:off x="9902059" y="3416988"/>
+            <a:ext cx="718914" cy="1684121"/>
+          </a:xfrm>
+          <a:prstGeom prst="rect">
+            <a:avLst/>
+          </a:prstGeom>
+        </p:spPr>
+      </p:pic>
+      <p:cxnSp>
+        <p:nvCxnSpPr>
+          <p:cNvPr id="40" name="Conector de Seta Reta 39"/>
+          <p:cNvCxnSpPr>
+            <a:stCxn id="32" idx="0"/>
+            <a:endCxn id="38" idx="2"/>
+          </p:cNvCxnSpPr>
+          <p:nvPr/>
+        </p:nvCxnSpPr>
+        <p:spPr>
+          <a:xfrm flipV="1">
+            <a:off x="9542569" y="5101109"/>
+            <a:ext cx="718947" cy="746234"/>
+          </a:xfrm>
+          <a:prstGeom prst="straightConnector1">
+            <a:avLst/>
+          </a:prstGeom>
+          <a:ln>
+            <a:tailEnd type="triangle"/>
+          </a:ln>
+        </p:spPr>
+        <p:style>
+          <a:lnRef idx="1">
+            <a:schemeClr val="accent1"/>
+          </a:lnRef>
+          <a:fillRef idx="0">
+            <a:schemeClr val="accent1"/>
+          </a:fillRef>
+          <a:effectRef idx="0">
+            <a:schemeClr val="accent1"/>
+          </a:effectRef>
+          <a:fontRef idx="minor">
+            <a:schemeClr val="tx1"/>
+          </a:fontRef>
+        </p:style>
+      </p:cxnSp>
+      <p:cxnSp>
+        <p:nvCxnSpPr>
+          <p:cNvPr id="42" name="Conector de Seta Reta 41"/>
+          <p:cNvCxnSpPr>
+            <a:stCxn id="34" idx="0"/>
+            <a:endCxn id="38" idx="2"/>
+          </p:cNvCxnSpPr>
+          <p:nvPr/>
+        </p:nvCxnSpPr>
+        <p:spPr>
+          <a:xfrm flipH="1" flipV="1">
+            <a:off x="10261516" y="5101109"/>
+            <a:ext cx="681741" cy="796198"/>
+          </a:xfrm>
+          <a:prstGeom prst="straightConnector1">
+            <a:avLst/>
+          </a:prstGeom>
+          <a:ln>
+            <a:tailEnd type="triangle"/>
+          </a:ln>
+        </p:spPr>
+        <p:style>
+          <a:lnRef idx="1">
+            <a:schemeClr val="accent1"/>
+          </a:lnRef>
+          <a:fillRef idx="0">
+            <a:schemeClr val="accent1"/>
+          </a:fillRef>
+          <a:effectRef idx="0">
+            <a:schemeClr val="accent1"/>
+          </a:effectRef>
+          <a:fontRef idx="minor">
+            <a:schemeClr val="tx1"/>
+          </a:fontRef>
+        </p:style>
+      </p:cxnSp>
+      <p:pic>
+        <p:nvPicPr>
+          <p:cNvPr id="45" name="Imagem 44"/>
+          <p:cNvPicPr>
+            <a:picLocks noChangeAspect="1"/>
+          </p:cNvPicPr>
+          <p:nvPr/>
+        </p:nvPicPr>
+        <p:blipFill rotWithShape="1">
+          <a:blip r:embed="rId7" cstate="print">
+            <a:extLst>
+              <a:ext uri="{28A0092B-C50C-407E-A947-70E740481C1C}">
+                <a14:useLocalDpi xmlns:a14="http://schemas.microsoft.com/office/drawing/2010/main" val="0"/>
+              </a:ext>
+            </a:extLst>
+          </a:blip>
+          <a:srcRect l="28175" t="11652" r="28644" b="13197"/>
+          <a:stretch/>
+        </p:blipFill>
+        <p:spPr>
+          <a:xfrm>
+            <a:off x="3748153" y="5926411"/>
+            <a:ext cx="916114" cy="896828"/>
+          </a:xfrm>
+          <a:prstGeom prst="rect">
+            <a:avLst/>
+          </a:prstGeom>
+        </p:spPr>
+      </p:pic>
+      <p:pic>
+        <p:nvPicPr>
+          <p:cNvPr id="55" name="Imagem 54"/>
+          <p:cNvPicPr>
+            <a:picLocks noChangeAspect="1"/>
+          </p:cNvPicPr>
+          <p:nvPr/>
+        </p:nvPicPr>
+        <p:blipFill rotWithShape="1">
+          <a:blip r:embed="rId8" cstate="print">
+            <a:extLst>
+              <a:ext uri="{28A0092B-C50C-407E-A947-70E740481C1C}">
+                <a14:useLocalDpi xmlns:a14="http://schemas.microsoft.com/office/drawing/2010/main" val="0"/>
+              </a:ext>
+            </a:extLst>
+          </a:blip>
+          <a:srcRect l="17497" t="45771" r="37513" b="-18417"/>
+          <a:stretch/>
+        </p:blipFill>
+        <p:spPr>
+          <a:xfrm>
+            <a:off x="5063736" y="5926411"/>
+            <a:ext cx="1102319" cy="1001218"/>
+          </a:xfrm>
+          <a:prstGeom prst="rect">
+            <a:avLst/>
+          </a:prstGeom>
+        </p:spPr>
+      </p:pic>
+      <p:sp>
+        <p:nvSpPr>
+          <p:cNvPr id="56" name="Retângulo 55"/>
+          <p:cNvSpPr/>
+          <p:nvPr/>
+        </p:nvSpPr>
+        <p:spPr>
+          <a:xfrm>
+            <a:off x="6100069" y="6205548"/>
+            <a:ext cx="457457" cy="338554"/>
+          </a:xfrm>
+          <a:prstGeom prst="rect">
+            <a:avLst/>
+          </a:prstGeom>
+          <a:noFill/>
+        </p:spPr>
+        <p:txBody>
+          <a:bodyPr wrap="square" lIns="91440" tIns="45720" rIns="91440" bIns="45720">
+            <a:spAutoFit/>
+          </a:bodyPr>
+          <a:lstStyle/>
+          <a:p>
+            <a:pPr algn="ctr"/>
+            <a:r>
+              <a:rPr lang="pt-BR" sz="1600" dirty="0">
+                <a:ln w="0"/>
+                <a:effectLst>
+                  <a:outerShdw blurRad="38100" dist="19050" dir="2700000" algn="tl" rotWithShape="0">
+                    <a:schemeClr val="dk1">
+                      <a:alpha val="40000"/>
+                    </a:schemeClr>
+                  </a:outerShdw>
+                </a:effectLst>
+              </a:rPr>
+              <a:t>2</a:t>
+            </a:r>
+            <a:r>
+              <a:rPr lang="pt-BR" sz="1600" b="0" cap="none" spc="0" dirty="0" smtClean="0">
+                <a:ln w="0"/>
+                <a:solidFill>
+                  <a:schemeClr val="tx1"/>
+                </a:solidFill>
+                <a:effectLst>
+                  <a:outerShdw blurRad="38100" dist="19050" dir="2700000" algn="tl" rotWithShape="0">
+                    <a:schemeClr val="dk1">
+                      <a:alpha val="40000"/>
+                    </a:schemeClr>
+                  </a:outerShdw>
+                </a:effectLst>
+              </a:rPr>
+              <a:t>x</a:t>
+            </a:r>
+            <a:endParaRPr lang="pt-BR" sz="1600" b="0" cap="none" spc="0" dirty="0">
+              <a:ln w="0"/>
+              <a:solidFill>
+                <a:schemeClr val="tx1"/>
+              </a:solidFill>
+              <a:effectLst>
+                <a:outerShdw blurRad="38100" dist="19050" dir="2700000" algn="tl" rotWithShape="0">
+                  <a:schemeClr val="dk1">
+                    <a:alpha val="40000"/>
+                  </a:schemeClr>
+                </a:outerShdw>
+              </a:effectLst>
+            </a:endParaRPr>
+          </a:p>
+        </p:txBody>
+      </p:sp>
+      <p:sp>
+        <p:nvSpPr>
+          <p:cNvPr id="57" name="Retângulo 56"/>
+          <p:cNvSpPr/>
+          <p:nvPr/>
+        </p:nvSpPr>
+        <p:spPr>
+          <a:xfrm>
+            <a:off x="4685736" y="5498611"/>
+            <a:ext cx="304823" cy="348732"/>
+          </a:xfrm>
+          <a:prstGeom prst="rect">
+            <a:avLst/>
+          </a:prstGeom>
+          <a:noFill/>
+        </p:spPr>
+        <p:txBody>
+          <a:bodyPr wrap="square" lIns="91440" tIns="45720" rIns="91440" bIns="45720">
+            <a:spAutoFit/>
+          </a:bodyPr>
+          <a:lstStyle/>
+          <a:p>
+            <a:pPr algn="ctr"/>
+            <a:r>
+              <a:rPr lang="pt-BR" sz="1600" b="0" cap="none" spc="0" dirty="0" smtClean="0">
+                <a:ln w="0"/>
+                <a:solidFill>
+                  <a:schemeClr val="tx1"/>
+                </a:solidFill>
+                <a:effectLst>
+                  <a:outerShdw blurRad="38100" dist="19050" dir="2700000" algn="tl" rotWithShape="0">
+                    <a:schemeClr val="dk1">
+                      <a:alpha val="40000"/>
+                    </a:schemeClr>
+                  </a:outerShdw>
+                </a:effectLst>
+              </a:rPr>
+              <a:t>U</a:t>
+            </a:r>
+            <a:endParaRPr lang="pt-BR" sz="1600" b="0" cap="none" spc="0" dirty="0">
+              <a:ln w="0"/>
+              <a:solidFill>
+                <a:schemeClr val="tx1"/>
+              </a:solidFill>
+              <a:effectLst>
+                <a:outerShdw blurRad="38100" dist="19050" dir="2700000" algn="tl" rotWithShape="0">
+                  <a:schemeClr val="dk1">
+                    <a:alpha val="40000"/>
+                  </a:schemeClr>
+                </a:outerShdw>
+              </a:effectLst>
+            </a:endParaRPr>
+          </a:p>
+        </p:txBody>
+      </p:sp>
+      <p:pic>
+        <p:nvPicPr>
+          <p:cNvPr id="58" name="Imagem 57"/>
+          <p:cNvPicPr>
+            <a:picLocks noChangeAspect="1"/>
+          </p:cNvPicPr>
+          <p:nvPr/>
+        </p:nvPicPr>
+        <p:blipFill rotWithShape="1">
+          <a:blip r:embed="rId10" cstate="print">
+            <a:extLst>
+              <a:ext uri="{28A0092B-C50C-407E-A947-70E740481C1C}">
+                <a14:useLocalDpi xmlns:a14="http://schemas.microsoft.com/office/drawing/2010/main" val="0"/>
+              </a:ext>
+            </a:extLst>
+          </a:blip>
+          <a:srcRect l="29083" t="-808" r="32540" b="15505"/>
+          <a:stretch/>
+        </p:blipFill>
+        <p:spPr>
+          <a:xfrm>
+            <a:off x="4281173" y="3892731"/>
+            <a:ext cx="1143000" cy="1429107"/>
+          </a:xfrm>
+          <a:prstGeom prst="rect">
+            <a:avLst/>
+          </a:prstGeom>
+        </p:spPr>
+      </p:pic>
+      <p:cxnSp>
+        <p:nvCxnSpPr>
+          <p:cNvPr id="60" name="Conector de Seta Reta 59"/>
+          <p:cNvCxnSpPr>
+            <a:stCxn id="45" idx="0"/>
+            <a:endCxn id="58" idx="2"/>
+          </p:cNvCxnSpPr>
+          <p:nvPr/>
+        </p:nvCxnSpPr>
+        <p:spPr>
+          <a:xfrm flipV="1">
+            <a:off x="4206210" y="5321838"/>
+            <a:ext cx="646463" cy="604573"/>
+          </a:xfrm>
+          <a:prstGeom prst="straightConnector1">
+            <a:avLst/>
+          </a:prstGeom>
+          <a:ln>
+            <a:tailEnd type="triangle"/>
+          </a:ln>
+        </p:spPr>
+        <p:style>
+          <a:lnRef idx="1">
+            <a:schemeClr val="accent1"/>
+          </a:lnRef>
+          <a:fillRef idx="0">
+            <a:schemeClr val="accent1"/>
+          </a:fillRef>
+          <a:effectRef idx="0">
+            <a:schemeClr val="accent1"/>
+          </a:effectRef>
+          <a:fontRef idx="minor">
+            <a:schemeClr val="tx1"/>
+          </a:fontRef>
+        </p:style>
+      </p:cxnSp>
+      <p:cxnSp>
+        <p:nvCxnSpPr>
+          <p:cNvPr id="62" name="Conector de Seta Reta 61"/>
+          <p:cNvCxnSpPr>
+            <a:stCxn id="55" idx="0"/>
+            <a:endCxn id="58" idx="2"/>
+          </p:cNvCxnSpPr>
+          <p:nvPr/>
+        </p:nvCxnSpPr>
+        <p:spPr>
+          <a:xfrm flipH="1" flipV="1">
+            <a:off x="4852673" y="5321838"/>
+            <a:ext cx="762223" cy="604573"/>
+          </a:xfrm>
+          <a:prstGeom prst="straightConnector1">
+            <a:avLst/>
+          </a:prstGeom>
+          <a:ln>
+            <a:tailEnd type="triangle"/>
+          </a:ln>
+        </p:spPr>
+        <p:style>
+          <a:lnRef idx="1">
+            <a:schemeClr val="accent1"/>
+          </a:lnRef>
+          <a:fillRef idx="0">
+            <a:schemeClr val="accent1"/>
+          </a:fillRef>
+          <a:effectRef idx="0">
+            <a:schemeClr val="accent1"/>
+          </a:effectRef>
+          <a:fontRef idx="minor">
+            <a:schemeClr val="tx1"/>
+          </a:fontRef>
+        </p:style>
+      </p:cxnSp>
+      <p:pic>
+        <p:nvPicPr>
+          <p:cNvPr id="63" name="Imagem 62"/>
+          <p:cNvPicPr>
+            <a:picLocks noChangeAspect="1"/>
+          </p:cNvPicPr>
+          <p:nvPr/>
+        </p:nvPicPr>
+        <p:blipFill rotWithShape="1">
+          <a:blip r:embed="rId7" cstate="print">
+            <a:extLst>
+              <a:ext uri="{28A0092B-C50C-407E-A947-70E740481C1C}">
+                <a14:useLocalDpi xmlns:a14="http://schemas.microsoft.com/office/drawing/2010/main" val="0"/>
+              </a:ext>
+            </a:extLst>
+          </a:blip>
+          <a:srcRect l="28175" t="11652" r="28644" b="13197"/>
+          <a:stretch/>
+        </p:blipFill>
+        <p:spPr>
+          <a:xfrm>
+            <a:off x="6109200" y="4080371"/>
+            <a:ext cx="916114" cy="896828"/>
+          </a:xfrm>
+          <a:prstGeom prst="rect">
+            <a:avLst/>
+          </a:prstGeom>
+        </p:spPr>
+      </p:pic>
+      <p:sp>
+        <p:nvSpPr>
+          <p:cNvPr id="65" name="Retângulo 64"/>
+          <p:cNvSpPr/>
+          <p:nvPr/>
+        </p:nvSpPr>
+        <p:spPr>
+          <a:xfrm>
+            <a:off x="5565630" y="3491164"/>
+            <a:ext cx="304823" cy="584775"/>
+          </a:xfrm>
+          <a:prstGeom prst="rect">
+            <a:avLst/>
+          </a:prstGeom>
+          <a:noFill/>
+        </p:spPr>
+        <p:txBody>
+          <a:bodyPr wrap="square" lIns="91440" tIns="45720" rIns="91440" bIns="45720">
+            <a:spAutoFit/>
+          </a:bodyPr>
+          <a:lstStyle/>
+          <a:p>
+            <a:pPr algn="ctr"/>
+            <a:r>
+              <a:rPr lang="pt-BR" sz="1600" b="0" cap="none" spc="0" dirty="0" smtClean="0">
+                <a:ln w="0"/>
+                <a:solidFill>
+                  <a:schemeClr val="tx1"/>
+                </a:solidFill>
+                <a:effectLst>
+                  <a:outerShdw blurRad="38100" dist="19050" dir="2700000" algn="tl" rotWithShape="0">
+                    <a:schemeClr val="dk1">
+                      <a:alpha val="40000"/>
+                    </a:schemeClr>
+                  </a:outerShdw>
+                </a:effectLst>
+              </a:rPr>
+              <a:t>-</a:t>
+            </a:r>
+          </a:p>
+          <a:p>
+            <a:pPr algn="ctr"/>
+            <a:endParaRPr lang="pt-BR" sz="1600" b="0" cap="none" spc="0" dirty="0">
+              <a:ln w="0"/>
+              <a:solidFill>
+                <a:schemeClr val="tx1"/>
+              </a:solidFill>
+              <a:effectLst>
+                <a:outerShdw blurRad="38100" dist="19050" dir="2700000" algn="tl" rotWithShape="0">
+                  <a:schemeClr val="dk1">
+                    <a:alpha val="40000"/>
+                  </a:schemeClr>
+                </a:outerShdw>
+              </a:effectLst>
+            </a:endParaRPr>
+          </a:p>
+        </p:txBody>
+      </p:sp>
+      <p:pic>
+        <p:nvPicPr>
+          <p:cNvPr id="66" name="Imagem 65"/>
+          <p:cNvPicPr>
+            <a:picLocks noChangeAspect="1"/>
+          </p:cNvPicPr>
+          <p:nvPr/>
+        </p:nvPicPr>
+        <p:blipFill rotWithShape="1">
+          <a:blip r:embed="rId11" cstate="print">
+            <a:extLst>
+              <a:ext uri="{28A0092B-C50C-407E-A947-70E740481C1C}">
+                <a14:useLocalDpi xmlns:a14="http://schemas.microsoft.com/office/drawing/2010/main" val="0"/>
+              </a:ext>
+            </a:extLst>
+          </a:blip>
+          <a:srcRect l="31226" r="33969" b="16775"/>
+          <a:stretch/>
+        </p:blipFill>
+        <p:spPr>
+          <a:xfrm>
+            <a:off x="5240686" y="2004047"/>
+            <a:ext cx="954710" cy="1284111"/>
+          </a:xfrm>
+          <a:prstGeom prst="rect">
+            <a:avLst/>
+          </a:prstGeom>
+        </p:spPr>
+      </p:pic>
+      <p:cxnSp>
+        <p:nvCxnSpPr>
+          <p:cNvPr id="68" name="Conector de Seta Reta 67"/>
+          <p:cNvCxnSpPr>
+            <a:stCxn id="58" idx="0"/>
+            <a:endCxn id="66" idx="2"/>
+          </p:cNvCxnSpPr>
+          <p:nvPr/>
+        </p:nvCxnSpPr>
+        <p:spPr>
+          <a:xfrm flipV="1">
+            <a:off x="4852673" y="3288158"/>
+            <a:ext cx="865368" cy="604573"/>
+          </a:xfrm>
+          <a:prstGeom prst="straightConnector1">
+            <a:avLst/>
+          </a:prstGeom>
+          <a:ln>
+            <a:tailEnd type="triangle"/>
+          </a:ln>
+        </p:spPr>
+        <p:style>
+          <a:lnRef idx="1">
+            <a:schemeClr val="accent1"/>
+          </a:lnRef>
+          <a:fillRef idx="0">
+            <a:schemeClr val="accent1"/>
+          </a:fillRef>
+          <a:effectRef idx="0">
+            <a:schemeClr val="accent1"/>
+          </a:effectRef>
+          <a:fontRef idx="minor">
+            <a:schemeClr val="tx1"/>
+          </a:fontRef>
+        </p:style>
+      </p:cxnSp>
+      <p:cxnSp>
+        <p:nvCxnSpPr>
+          <p:cNvPr id="70" name="Conector de Seta Reta 69"/>
+          <p:cNvCxnSpPr>
+            <a:stCxn id="63" idx="0"/>
+            <a:endCxn id="66" idx="2"/>
+          </p:cNvCxnSpPr>
+          <p:nvPr/>
+        </p:nvCxnSpPr>
+        <p:spPr>
+          <a:xfrm flipH="1" flipV="1">
+            <a:off x="5718041" y="3288158"/>
+            <a:ext cx="849216" cy="792213"/>
+          </a:xfrm>
+          <a:prstGeom prst="straightConnector1">
+            <a:avLst/>
+          </a:prstGeom>
+          <a:ln>
+            <a:tailEnd type="triangle"/>
+          </a:ln>
+        </p:spPr>
+        <p:style>
+          <a:lnRef idx="1">
+            <a:schemeClr val="accent1"/>
+          </a:lnRef>
+          <a:fillRef idx="0">
+            <a:schemeClr val="accent1"/>
+          </a:fillRef>
+          <a:effectRef idx="0">
+            <a:schemeClr val="accent1"/>
+          </a:effectRef>
+          <a:fontRef idx="minor">
+            <a:schemeClr val="tx1"/>
+          </a:fontRef>
+        </p:style>
+      </p:cxnSp>
+      <p:pic>
+        <p:nvPicPr>
+          <p:cNvPr id="71" name="Imagem 70"/>
+          <p:cNvPicPr>
+            <a:picLocks noChangeAspect="1"/>
+          </p:cNvPicPr>
+          <p:nvPr/>
+        </p:nvPicPr>
+        <p:blipFill rotWithShape="1">
+          <a:blip r:embed="rId12">
+            <a:extLst>
+              <a:ext uri="{28A0092B-C50C-407E-A947-70E740481C1C}">
+                <a14:useLocalDpi xmlns:a14="http://schemas.microsoft.com/office/drawing/2010/main" val="0"/>
+              </a:ext>
+            </a:extLst>
+          </a:blip>
+          <a:srcRect l="45902" t="27235" r="40137" b="39287"/>
+          <a:stretch/>
+        </p:blipFill>
+        <p:spPr>
+          <a:xfrm>
+            <a:off x="7491548" y="653142"/>
+            <a:ext cx="1404257" cy="1894115"/>
+          </a:xfrm>
+          <a:prstGeom prst="rect">
+            <a:avLst/>
+          </a:prstGeom>
+        </p:spPr>
+      </p:pic>
+      <p:cxnSp>
+        <p:nvCxnSpPr>
+          <p:cNvPr id="73" name="Conector de Seta Reta 72"/>
+          <p:cNvCxnSpPr>
+            <a:stCxn id="25" idx="3"/>
+            <a:endCxn id="71" idx="1"/>
+          </p:cNvCxnSpPr>
+          <p:nvPr/>
+        </p:nvCxnSpPr>
+        <p:spPr>
+          <a:xfrm flipV="1">
+            <a:off x="3156855" y="1600200"/>
+            <a:ext cx="4334693" cy="584889"/>
+          </a:xfrm>
+          <a:prstGeom prst="straightConnector1">
+            <a:avLst/>
+          </a:prstGeom>
+          <a:ln>
+            <a:tailEnd type="triangle"/>
+          </a:ln>
+        </p:spPr>
+        <p:style>
+          <a:lnRef idx="1">
+            <a:schemeClr val="accent1"/>
+          </a:lnRef>
+          <a:fillRef idx="0">
+            <a:schemeClr val="accent1"/>
+          </a:fillRef>
+          <a:effectRef idx="0">
+            <a:schemeClr val="accent1"/>
+          </a:effectRef>
+          <a:fontRef idx="minor">
+            <a:schemeClr val="tx1"/>
+          </a:fontRef>
+        </p:style>
+      </p:cxnSp>
+      <p:cxnSp>
+        <p:nvCxnSpPr>
+          <p:cNvPr id="75" name="Conector de Seta Reta 74"/>
+          <p:cNvCxnSpPr>
+            <a:stCxn id="66" idx="3"/>
+            <a:endCxn id="71" idx="1"/>
+          </p:cNvCxnSpPr>
+          <p:nvPr/>
+        </p:nvCxnSpPr>
+        <p:spPr>
+          <a:xfrm flipV="1">
+            <a:off x="6195396" y="1600200"/>
+            <a:ext cx="1296152" cy="1045903"/>
+          </a:xfrm>
+          <a:prstGeom prst="straightConnector1">
+            <a:avLst/>
+          </a:prstGeom>
+          <a:ln>
+            <a:tailEnd type="triangle"/>
+          </a:ln>
+        </p:spPr>
+        <p:style>
+          <a:lnRef idx="1">
+            <a:schemeClr val="accent1"/>
+          </a:lnRef>
+          <a:fillRef idx="0">
+            <a:schemeClr val="accent1"/>
+          </a:fillRef>
+          <a:effectRef idx="0">
+            <a:schemeClr val="accent1"/>
+          </a:effectRef>
+          <a:fontRef idx="minor">
+            <a:schemeClr val="tx1"/>
+          </a:fontRef>
+        </p:style>
+      </p:cxnSp>
+      <p:cxnSp>
+        <p:nvCxnSpPr>
+          <p:cNvPr id="77" name="Conector de Seta Reta 76"/>
+          <p:cNvCxnSpPr>
+            <a:stCxn id="38" idx="0"/>
+            <a:endCxn id="71" idx="3"/>
+          </p:cNvCxnSpPr>
+          <p:nvPr/>
+        </p:nvCxnSpPr>
+        <p:spPr>
+          <a:xfrm flipH="1" flipV="1">
+            <a:off x="8895805" y="1600200"/>
+            <a:ext cx="1365711" cy="1816788"/>
+          </a:xfrm>
+          <a:prstGeom prst="straightConnector1">
+            <a:avLst/>
+          </a:prstGeom>
+          <a:ln>
+            <a:tailEnd type="triangle"/>
+          </a:ln>
+        </p:spPr>
+        <p:style>
+          <a:lnRef idx="1">
+            <a:schemeClr val="accent1"/>
+          </a:lnRef>
+          <a:fillRef idx="0">
+            <a:schemeClr val="accent1"/>
+          </a:fillRef>
+          <a:effectRef idx="0">
+            <a:schemeClr val="accent1"/>
+          </a:effectRef>
+          <a:fontRef idx="minor">
+            <a:schemeClr val="tx1"/>
+          </a:fontRef>
+        </p:style>
+      </p:cxnSp>
+      <p:sp>
+        <p:nvSpPr>
+          <p:cNvPr id="78" name="Retângulo 77"/>
+          <p:cNvSpPr/>
+          <p:nvPr/>
+        </p:nvSpPr>
+        <p:spPr>
+          <a:xfrm>
+            <a:off x="8026282" y="2786010"/>
+            <a:ext cx="304823" cy="348732"/>
+          </a:xfrm>
+          <a:prstGeom prst="rect">
+            <a:avLst/>
+          </a:prstGeom>
+          <a:noFill/>
+        </p:spPr>
+        <p:txBody>
+          <a:bodyPr wrap="square" lIns="91440" tIns="45720" rIns="91440" bIns="45720">
+            <a:spAutoFit/>
+          </a:bodyPr>
+          <a:lstStyle/>
+          <a:p>
+            <a:pPr algn="ctr"/>
+            <a:r>
+              <a:rPr lang="pt-BR" sz="1600" b="0" cap="none" spc="0" dirty="0" smtClean="0">
+                <a:ln w="0"/>
+                <a:solidFill>
+                  <a:schemeClr val="tx1"/>
+                </a:solidFill>
+                <a:effectLst>
+                  <a:outerShdw blurRad="38100" dist="19050" dir="2700000" algn="tl" rotWithShape="0">
+                    <a:schemeClr val="dk1">
+                      <a:alpha val="40000"/>
+                    </a:schemeClr>
+                  </a:outerShdw>
+                </a:effectLst>
+              </a:rPr>
+              <a:t>U</a:t>
+            </a:r>
+            <a:endParaRPr lang="pt-BR" sz="1600" b="0" cap="none" spc="0" dirty="0">
+              <a:ln w="0"/>
+              <a:solidFill>
+                <a:schemeClr val="tx1"/>
+              </a:solidFill>
+              <a:effectLst>
+                <a:outerShdw blurRad="38100" dist="19050" dir="2700000" algn="tl" rotWithShape="0">
+                  <a:schemeClr val="dk1">
+                    <a:alpha val="40000"/>
+                  </a:schemeClr>
+                </a:outerShdw>
+              </a:effectLst>
+            </a:endParaRPr>
+          </a:p>
+        </p:txBody>
+      </p:sp>
+    </p:spTree>
+    <p:extLst>
+      <p:ext uri="{BB962C8B-B14F-4D97-AF65-F5344CB8AC3E}">
+        <p14:creationId xmlns:p14="http://schemas.microsoft.com/office/powerpoint/2010/main" val="3167849982"/>
+      </p:ext>
+    </p:extLst>
+  </p:cSld>
+  <p:clrMapOvr>
+    <a:masterClrMapping/>
+  </p:clrMapOvr>
 </p:sld>
 </file>
 

</xml_diff>

<commit_message>
Done up to second layer and updated csg trees
</commit_message>
<xml_diff>
--- a/CG.pptx
+++ b/CG.pptx
@@ -245,7 +245,7 @@
           <a:p>
             <a:fld id="{D64F2477-06A2-4512-8AC4-C1FB9F468FA8}" type="datetimeFigureOut">
               <a:rPr lang="pt-BR" smtClean="0"/>
-              <a:t>20/03/2017</a:t>
+              <a:t>25/03/2017</a:t>
             </a:fld>
             <a:endParaRPr lang="pt-BR"/>
           </a:p>
@@ -415,7 +415,7 @@
           <a:p>
             <a:fld id="{D64F2477-06A2-4512-8AC4-C1FB9F468FA8}" type="datetimeFigureOut">
               <a:rPr lang="pt-BR" smtClean="0"/>
-              <a:t>20/03/2017</a:t>
+              <a:t>25/03/2017</a:t>
             </a:fld>
             <a:endParaRPr lang="pt-BR"/>
           </a:p>
@@ -595,7 +595,7 @@
           <a:p>
             <a:fld id="{D64F2477-06A2-4512-8AC4-C1FB9F468FA8}" type="datetimeFigureOut">
               <a:rPr lang="pt-BR" smtClean="0"/>
-              <a:t>20/03/2017</a:t>
+              <a:t>25/03/2017</a:t>
             </a:fld>
             <a:endParaRPr lang="pt-BR"/>
           </a:p>
@@ -765,7 +765,7 @@
           <a:p>
             <a:fld id="{D64F2477-06A2-4512-8AC4-C1FB9F468FA8}" type="datetimeFigureOut">
               <a:rPr lang="pt-BR" smtClean="0"/>
-              <a:t>20/03/2017</a:t>
+              <a:t>25/03/2017</a:t>
             </a:fld>
             <a:endParaRPr lang="pt-BR"/>
           </a:p>
@@ -1011,7 +1011,7 @@
           <a:p>
             <a:fld id="{D64F2477-06A2-4512-8AC4-C1FB9F468FA8}" type="datetimeFigureOut">
               <a:rPr lang="pt-BR" smtClean="0"/>
-              <a:t>20/03/2017</a:t>
+              <a:t>25/03/2017</a:t>
             </a:fld>
             <a:endParaRPr lang="pt-BR"/>
           </a:p>
@@ -1243,7 +1243,7 @@
           <a:p>
             <a:fld id="{D64F2477-06A2-4512-8AC4-C1FB9F468FA8}" type="datetimeFigureOut">
               <a:rPr lang="pt-BR" smtClean="0"/>
-              <a:t>20/03/2017</a:t>
+              <a:t>25/03/2017</a:t>
             </a:fld>
             <a:endParaRPr lang="pt-BR"/>
           </a:p>
@@ -1610,7 +1610,7 @@
           <a:p>
             <a:fld id="{D64F2477-06A2-4512-8AC4-C1FB9F468FA8}" type="datetimeFigureOut">
               <a:rPr lang="pt-BR" smtClean="0"/>
-              <a:t>20/03/2017</a:t>
+              <a:t>25/03/2017</a:t>
             </a:fld>
             <a:endParaRPr lang="pt-BR"/>
           </a:p>
@@ -1728,7 +1728,7 @@
           <a:p>
             <a:fld id="{D64F2477-06A2-4512-8AC4-C1FB9F468FA8}" type="datetimeFigureOut">
               <a:rPr lang="pt-BR" smtClean="0"/>
-              <a:t>20/03/2017</a:t>
+              <a:t>25/03/2017</a:t>
             </a:fld>
             <a:endParaRPr lang="pt-BR"/>
           </a:p>
@@ -1823,7 +1823,7 @@
           <a:p>
             <a:fld id="{D64F2477-06A2-4512-8AC4-C1FB9F468FA8}" type="datetimeFigureOut">
               <a:rPr lang="pt-BR" smtClean="0"/>
-              <a:t>20/03/2017</a:t>
+              <a:t>25/03/2017</a:t>
             </a:fld>
             <a:endParaRPr lang="pt-BR"/>
           </a:p>
@@ -2100,7 +2100,7 @@
           <a:p>
             <a:fld id="{D64F2477-06A2-4512-8AC4-C1FB9F468FA8}" type="datetimeFigureOut">
               <a:rPr lang="pt-BR" smtClean="0"/>
-              <a:t>20/03/2017</a:t>
+              <a:t>25/03/2017</a:t>
             </a:fld>
             <a:endParaRPr lang="pt-BR"/>
           </a:p>
@@ -2353,7 +2353,7 @@
           <a:p>
             <a:fld id="{D64F2477-06A2-4512-8AC4-C1FB9F468FA8}" type="datetimeFigureOut">
               <a:rPr lang="pt-BR" smtClean="0"/>
-              <a:t>20/03/2017</a:t>
+              <a:t>25/03/2017</a:t>
             </a:fld>
             <a:endParaRPr lang="pt-BR"/>
           </a:p>
@@ -2566,7 +2566,7 @@
           <a:p>
             <a:fld id="{D64F2477-06A2-4512-8AC4-C1FB9F468FA8}" type="datetimeFigureOut">
               <a:rPr lang="pt-BR" smtClean="0"/>
-              <a:t>20/03/2017</a:t>
+              <a:t>25/03/2017</a:t>
             </a:fld>
             <a:endParaRPr lang="pt-BR"/>
           </a:p>
@@ -3226,7 +3226,7 @@
         </p:blipFill>
         <p:spPr>
           <a:xfrm>
-            <a:off x="608182" y="5181060"/>
+            <a:off x="1863568" y="5181060"/>
             <a:ext cx="786809" cy="790186"/>
           </a:xfrm>
           <a:prstGeom prst="rect">
@@ -3242,7 +3242,7 @@
         </p:nvSpPr>
         <p:spPr>
           <a:xfrm>
-            <a:off x="1546670" y="4850844"/>
+            <a:off x="2839986" y="4837621"/>
             <a:ext cx="304823" cy="348732"/>
           </a:xfrm>
           <a:prstGeom prst="rect">
@@ -3310,7 +3310,7 @@
         </p:blipFill>
         <p:spPr>
           <a:xfrm>
-            <a:off x="1325547" y="3909405"/>
+            <a:off x="2623985" y="3909404"/>
             <a:ext cx="758433" cy="790186"/>
           </a:xfrm>
           <a:prstGeom prst="rect">
@@ -3339,7 +3339,7 @@
         </p:blipFill>
         <p:spPr>
           <a:xfrm>
-            <a:off x="2083980" y="5144031"/>
+            <a:off x="3461508" y="5144031"/>
             <a:ext cx="586918" cy="864243"/>
           </a:xfrm>
           <a:prstGeom prst="rect">
@@ -3347,77 +3347,6 @@
           </a:prstGeom>
         </p:spPr>
       </p:pic>
-      <p:cxnSp>
-        <p:nvCxnSpPr>
-          <p:cNvPr id="9" name="Conector de Seta Reta 8"/>
-          <p:cNvCxnSpPr>
-            <a:endCxn id="6" idx="2"/>
-          </p:cNvCxnSpPr>
-          <p:nvPr/>
-        </p:nvCxnSpPr>
-        <p:spPr>
-          <a:xfrm flipV="1">
-            <a:off x="983511" y="4699591"/>
-            <a:ext cx="721253" cy="481470"/>
-          </a:xfrm>
-          <a:prstGeom prst="straightConnector1">
-            <a:avLst/>
-          </a:prstGeom>
-          <a:ln>
-            <a:tailEnd type="triangle"/>
-          </a:ln>
-        </p:spPr>
-        <p:style>
-          <a:lnRef idx="1">
-            <a:schemeClr val="accent1"/>
-          </a:lnRef>
-          <a:fillRef idx="0">
-            <a:schemeClr val="accent1"/>
-          </a:fillRef>
-          <a:effectRef idx="0">
-            <a:schemeClr val="accent1"/>
-          </a:effectRef>
-          <a:fontRef idx="minor">
-            <a:schemeClr val="tx1"/>
-          </a:fontRef>
-        </p:style>
-      </p:cxnSp>
-      <p:cxnSp>
-        <p:nvCxnSpPr>
-          <p:cNvPr id="11" name="Conector de Seta Reta 10"/>
-          <p:cNvCxnSpPr>
-            <a:stCxn id="7" idx="0"/>
-            <a:endCxn id="6" idx="2"/>
-          </p:cNvCxnSpPr>
-          <p:nvPr/>
-        </p:nvCxnSpPr>
-        <p:spPr>
-          <a:xfrm flipH="1" flipV="1">
-            <a:off x="1704764" y="4699591"/>
-            <a:ext cx="672675" cy="444440"/>
-          </a:xfrm>
-          <a:prstGeom prst="straightConnector1">
-            <a:avLst/>
-          </a:prstGeom>
-          <a:ln>
-            <a:tailEnd type="triangle"/>
-          </a:ln>
-        </p:spPr>
-        <p:style>
-          <a:lnRef idx="1">
-            <a:schemeClr val="accent1"/>
-          </a:lnRef>
-          <a:fillRef idx="0">
-            <a:schemeClr val="accent1"/>
-          </a:fillRef>
-          <a:effectRef idx="0">
-            <a:schemeClr val="accent1"/>
-          </a:effectRef>
-          <a:fontRef idx="minor">
-            <a:schemeClr val="tx1"/>
-          </a:fontRef>
-        </p:style>
-      </p:cxnSp>
       <p:pic>
         <p:nvPicPr>
           <p:cNvPr id="14" name="Imagem 13"/>
@@ -3439,7 +3368,7 @@
         </p:blipFill>
         <p:spPr>
           <a:xfrm>
-            <a:off x="2805233" y="3909405"/>
+            <a:off x="1339195" y="3909404"/>
             <a:ext cx="786809" cy="790186"/>
           </a:xfrm>
           <a:prstGeom prst="rect">
@@ -3505,42 +3434,6 @@
           </a:p>
         </p:txBody>
       </p:sp>
-      <p:cxnSp>
-        <p:nvCxnSpPr>
-          <p:cNvPr id="18" name="Conector de Seta Reta 17"/>
-          <p:cNvCxnSpPr>
-            <a:stCxn id="6" idx="0"/>
-            <a:endCxn id="19" idx="2"/>
-          </p:cNvCxnSpPr>
-          <p:nvPr/>
-        </p:nvCxnSpPr>
-        <p:spPr>
-          <a:xfrm flipV="1">
-            <a:off x="1704764" y="3373085"/>
-            <a:ext cx="754899" cy="536320"/>
-          </a:xfrm>
-          <a:prstGeom prst="straightConnector1">
-            <a:avLst/>
-          </a:prstGeom>
-          <a:ln>
-            <a:tailEnd type="triangle"/>
-          </a:ln>
-        </p:spPr>
-        <p:style>
-          <a:lnRef idx="1">
-            <a:schemeClr val="accent1"/>
-          </a:lnRef>
-          <a:fillRef idx="0">
-            <a:schemeClr val="accent1"/>
-          </a:fillRef>
-          <a:effectRef idx="0">
-            <a:schemeClr val="accent1"/>
-          </a:effectRef>
-          <a:fontRef idx="minor">
-            <a:schemeClr val="tx1"/>
-          </a:fontRef>
-        </p:style>
-      </p:cxnSp>
       <p:pic>
         <p:nvPicPr>
           <p:cNvPr id="19" name="Imagem 18"/>
@@ -3570,42 +3463,6 @@
           </a:prstGeom>
         </p:spPr>
       </p:pic>
-      <p:cxnSp>
-        <p:nvCxnSpPr>
-          <p:cNvPr id="26" name="Conector de Seta Reta 25"/>
-          <p:cNvCxnSpPr>
-            <a:stCxn id="14" idx="0"/>
-            <a:endCxn id="19" idx="2"/>
-          </p:cNvCxnSpPr>
-          <p:nvPr/>
-        </p:nvCxnSpPr>
-        <p:spPr>
-          <a:xfrm flipH="1" flipV="1">
-            <a:off x="2459663" y="3373085"/>
-            <a:ext cx="738975" cy="536320"/>
-          </a:xfrm>
-          <a:prstGeom prst="straightConnector1">
-            <a:avLst/>
-          </a:prstGeom>
-          <a:ln>
-            <a:tailEnd type="triangle"/>
-          </a:ln>
-        </p:spPr>
-        <p:style>
-          <a:lnRef idx="1">
-            <a:schemeClr val="accent1"/>
-          </a:lnRef>
-          <a:fillRef idx="0">
-            <a:schemeClr val="accent1"/>
-          </a:fillRef>
-          <a:effectRef idx="0">
-            <a:schemeClr val="accent1"/>
-          </a:effectRef>
-          <a:fontRef idx="minor">
-            <a:schemeClr val="tx1"/>
-          </a:fontRef>
-        </p:style>
-      </p:cxnSp>
       <p:pic>
         <p:nvPicPr>
           <p:cNvPr id="27" name="Imagem 26"/>
@@ -3871,78 +3728,6 @@
           </a:p>
         </p:txBody>
       </p:sp>
-      <p:cxnSp>
-        <p:nvCxnSpPr>
-          <p:cNvPr id="37" name="Conector de Seta Reta 36"/>
-          <p:cNvCxnSpPr>
-            <a:stCxn id="27" idx="0"/>
-            <a:endCxn id="30" idx="2"/>
-          </p:cNvCxnSpPr>
-          <p:nvPr/>
-        </p:nvCxnSpPr>
-        <p:spPr>
-          <a:xfrm flipV="1">
-            <a:off x="4473836" y="3373085"/>
-            <a:ext cx="702896" cy="536320"/>
-          </a:xfrm>
-          <a:prstGeom prst="straightConnector1">
-            <a:avLst/>
-          </a:prstGeom>
-          <a:ln>
-            <a:tailEnd type="triangle"/>
-          </a:ln>
-        </p:spPr>
-        <p:style>
-          <a:lnRef idx="1">
-            <a:schemeClr val="accent1"/>
-          </a:lnRef>
-          <a:fillRef idx="0">
-            <a:schemeClr val="accent1"/>
-          </a:fillRef>
-          <a:effectRef idx="0">
-            <a:schemeClr val="accent1"/>
-          </a:effectRef>
-          <a:fontRef idx="minor">
-            <a:schemeClr val="tx1"/>
-          </a:fontRef>
-        </p:style>
-      </p:cxnSp>
-      <p:cxnSp>
-        <p:nvCxnSpPr>
-          <p:cNvPr id="39" name="Conector de Seta Reta 38"/>
-          <p:cNvCxnSpPr>
-            <a:stCxn id="31" idx="0"/>
-            <a:endCxn id="30" idx="2"/>
-          </p:cNvCxnSpPr>
-          <p:nvPr/>
-        </p:nvCxnSpPr>
-        <p:spPr>
-          <a:xfrm flipH="1" flipV="1">
-            <a:off x="5176732" y="3373085"/>
-            <a:ext cx="814939" cy="566023"/>
-          </a:xfrm>
-          <a:prstGeom prst="straightConnector1">
-            <a:avLst/>
-          </a:prstGeom>
-          <a:ln>
-            <a:tailEnd type="triangle"/>
-          </a:ln>
-        </p:spPr>
-        <p:style>
-          <a:lnRef idx="1">
-            <a:schemeClr val="accent1"/>
-          </a:lnRef>
-          <a:fillRef idx="0">
-            <a:schemeClr val="accent1"/>
-          </a:fillRef>
-          <a:effectRef idx="0">
-            <a:schemeClr val="accent1"/>
-          </a:effectRef>
-          <a:fontRef idx="minor">
-            <a:schemeClr val="tx1"/>
-          </a:fontRef>
-        </p:style>
-      </p:cxnSp>
       <p:pic>
         <p:nvPicPr>
           <p:cNvPr id="41" name="Imagem 40"/>
@@ -4336,8 +4121,8 @@
         </p:blipFill>
         <p:spPr>
           <a:xfrm>
-            <a:off x="8934125" y="1682214"/>
-            <a:ext cx="613707" cy="1748872"/>
+            <a:off x="8934125" y="2122259"/>
+            <a:ext cx="613707" cy="1449883"/>
           </a:xfrm>
           <a:prstGeom prst="rect">
             <a:avLst/>
@@ -4352,7 +4137,7 @@
         </p:nvSpPr>
         <p:spPr>
           <a:xfrm>
-            <a:off x="9084338" y="3529238"/>
+            <a:off x="9079431" y="3571861"/>
             <a:ext cx="304823" cy="348732"/>
           </a:xfrm>
           <a:prstGeom prst="rect">
@@ -4399,150 +4184,6 @@
           </a:p>
         </p:txBody>
       </p:sp>
-      <p:cxnSp>
-        <p:nvCxnSpPr>
-          <p:cNvPr id="55" name="Conector de Seta Reta 54"/>
-          <p:cNvCxnSpPr>
-            <a:stCxn id="41" idx="0"/>
-            <a:endCxn id="50" idx="2"/>
-          </p:cNvCxnSpPr>
-          <p:nvPr/>
-        </p:nvCxnSpPr>
-        <p:spPr>
-          <a:xfrm flipV="1">
-            <a:off x="7621248" y="3431086"/>
-            <a:ext cx="1619731" cy="441290"/>
-          </a:xfrm>
-          <a:prstGeom prst="straightConnector1">
-            <a:avLst/>
-          </a:prstGeom>
-          <a:ln>
-            <a:tailEnd type="triangle"/>
-          </a:ln>
-        </p:spPr>
-        <p:style>
-          <a:lnRef idx="1">
-            <a:schemeClr val="accent1"/>
-          </a:lnRef>
-          <a:fillRef idx="0">
-            <a:schemeClr val="accent1"/>
-          </a:fillRef>
-          <a:effectRef idx="0">
-            <a:schemeClr val="accent1"/>
-          </a:effectRef>
-          <a:fontRef idx="minor">
-            <a:schemeClr val="tx1"/>
-          </a:fontRef>
-        </p:style>
-      </p:cxnSp>
-      <p:cxnSp>
-        <p:nvCxnSpPr>
-          <p:cNvPr id="57" name="Conector de Seta Reta 56"/>
-          <p:cNvCxnSpPr>
-            <a:stCxn id="43" idx="0"/>
-            <a:endCxn id="50" idx="2"/>
-          </p:cNvCxnSpPr>
-          <p:nvPr/>
-        </p:nvCxnSpPr>
-        <p:spPr>
-          <a:xfrm flipV="1">
-            <a:off x="8715271" y="3431086"/>
-            <a:ext cx="525708" cy="478319"/>
-          </a:xfrm>
-          <a:prstGeom prst="straightConnector1">
-            <a:avLst/>
-          </a:prstGeom>
-          <a:ln>
-            <a:tailEnd type="triangle"/>
-          </a:ln>
-        </p:spPr>
-        <p:style>
-          <a:lnRef idx="1">
-            <a:schemeClr val="accent1"/>
-          </a:lnRef>
-          <a:fillRef idx="0">
-            <a:schemeClr val="accent1"/>
-          </a:fillRef>
-          <a:effectRef idx="0">
-            <a:schemeClr val="accent1"/>
-          </a:effectRef>
-          <a:fontRef idx="minor">
-            <a:schemeClr val="tx1"/>
-          </a:fontRef>
-        </p:style>
-      </p:cxnSp>
-      <p:cxnSp>
-        <p:nvCxnSpPr>
-          <p:cNvPr id="59" name="Conector de Seta Reta 58"/>
-          <p:cNvCxnSpPr>
-            <a:stCxn id="46" idx="0"/>
-            <a:endCxn id="50" idx="2"/>
-          </p:cNvCxnSpPr>
-          <p:nvPr/>
-        </p:nvCxnSpPr>
-        <p:spPr>
-          <a:xfrm flipH="1" flipV="1">
-            <a:off x="9240979" y="3431086"/>
-            <a:ext cx="627313" cy="489507"/>
-          </a:xfrm>
-          <a:prstGeom prst="straightConnector1">
-            <a:avLst/>
-          </a:prstGeom>
-          <a:ln>
-            <a:tailEnd type="triangle"/>
-          </a:ln>
-        </p:spPr>
-        <p:style>
-          <a:lnRef idx="1">
-            <a:schemeClr val="accent1"/>
-          </a:lnRef>
-          <a:fillRef idx="0">
-            <a:schemeClr val="accent1"/>
-          </a:fillRef>
-          <a:effectRef idx="0">
-            <a:schemeClr val="accent1"/>
-          </a:effectRef>
-          <a:fontRef idx="minor">
-            <a:schemeClr val="tx1"/>
-          </a:fontRef>
-        </p:style>
-      </p:cxnSp>
-      <p:cxnSp>
-        <p:nvCxnSpPr>
-          <p:cNvPr id="61" name="Conector de Seta Reta 60"/>
-          <p:cNvCxnSpPr>
-            <a:stCxn id="48" idx="0"/>
-            <a:endCxn id="50" idx="2"/>
-          </p:cNvCxnSpPr>
-          <p:nvPr/>
-        </p:nvCxnSpPr>
-        <p:spPr>
-          <a:xfrm flipH="1" flipV="1">
-            <a:off x="9240979" y="3431086"/>
-            <a:ext cx="2049601" cy="489507"/>
-          </a:xfrm>
-          <a:prstGeom prst="straightConnector1">
-            <a:avLst/>
-          </a:prstGeom>
-          <a:ln>
-            <a:tailEnd type="triangle"/>
-          </a:ln>
-        </p:spPr>
-        <p:style>
-          <a:lnRef idx="1">
-            <a:schemeClr val="accent1"/>
-          </a:lnRef>
-          <a:fillRef idx="0">
-            <a:schemeClr val="accent1"/>
-          </a:fillRef>
-          <a:effectRef idx="0">
-            <a:schemeClr val="accent1"/>
-          </a:effectRef>
-          <a:fontRef idx="minor">
-            <a:schemeClr val="tx1"/>
-          </a:fontRef>
-        </p:style>
-      </p:cxnSp>
       <p:pic>
         <p:nvPicPr>
           <p:cNvPr id="76" name="Imagem 75"/>
@@ -4580,7 +4221,7 @@
         </p:nvSpPr>
         <p:spPr>
           <a:xfrm>
-            <a:off x="4825284" y="1900533"/>
+            <a:off x="4871908" y="1678734"/>
             <a:ext cx="304823" cy="348732"/>
           </a:xfrm>
           <a:prstGeom prst="rect">
@@ -4627,114 +4268,6 @@
           </a:p>
         </p:txBody>
       </p:sp>
-      <p:cxnSp>
-        <p:nvCxnSpPr>
-          <p:cNvPr id="79" name="Conector de Seta Reta 78"/>
-          <p:cNvCxnSpPr>
-            <a:stCxn id="19" idx="0"/>
-            <a:endCxn id="76" idx="2"/>
-          </p:cNvCxnSpPr>
-          <p:nvPr/>
-        </p:nvCxnSpPr>
-        <p:spPr>
-          <a:xfrm flipV="1">
-            <a:off x="2459663" y="1632373"/>
-            <a:ext cx="2717068" cy="810429"/>
-          </a:xfrm>
-          <a:prstGeom prst="straightConnector1">
-            <a:avLst/>
-          </a:prstGeom>
-          <a:ln>
-            <a:tailEnd type="triangle"/>
-          </a:ln>
-        </p:spPr>
-        <p:style>
-          <a:lnRef idx="1">
-            <a:schemeClr val="accent1"/>
-          </a:lnRef>
-          <a:fillRef idx="0">
-            <a:schemeClr val="accent1"/>
-          </a:fillRef>
-          <a:effectRef idx="0">
-            <a:schemeClr val="accent1"/>
-          </a:effectRef>
-          <a:fontRef idx="minor">
-            <a:schemeClr val="tx1"/>
-          </a:fontRef>
-        </p:style>
-      </p:cxnSp>
-      <p:cxnSp>
-        <p:nvCxnSpPr>
-          <p:cNvPr id="81" name="Conector de Seta Reta 80"/>
-          <p:cNvCxnSpPr>
-            <a:stCxn id="30" idx="0"/>
-            <a:endCxn id="76" idx="2"/>
-          </p:cNvCxnSpPr>
-          <p:nvPr/>
-        </p:nvCxnSpPr>
-        <p:spPr>
-          <a:xfrm flipH="1" flipV="1">
-            <a:off x="5176731" y="1632373"/>
-            <a:ext cx="1" cy="804480"/>
-          </a:xfrm>
-          <a:prstGeom prst="straightConnector1">
-            <a:avLst/>
-          </a:prstGeom>
-          <a:ln>
-            <a:tailEnd type="triangle"/>
-          </a:ln>
-        </p:spPr>
-        <p:style>
-          <a:lnRef idx="1">
-            <a:schemeClr val="accent1"/>
-          </a:lnRef>
-          <a:fillRef idx="0">
-            <a:schemeClr val="accent1"/>
-          </a:fillRef>
-          <a:effectRef idx="0">
-            <a:schemeClr val="accent1"/>
-          </a:effectRef>
-          <a:fontRef idx="minor">
-            <a:schemeClr val="tx1"/>
-          </a:fontRef>
-        </p:style>
-      </p:cxnSp>
-      <p:cxnSp>
-        <p:nvCxnSpPr>
-          <p:cNvPr id="85" name="Conector de Seta Reta 84"/>
-          <p:cNvCxnSpPr>
-            <a:stCxn id="50" idx="1"/>
-            <a:endCxn id="76" idx="2"/>
-          </p:cNvCxnSpPr>
-          <p:nvPr/>
-        </p:nvCxnSpPr>
-        <p:spPr>
-          <a:xfrm flipH="1" flipV="1">
-            <a:off x="5176731" y="1632373"/>
-            <a:ext cx="3757394" cy="924277"/>
-          </a:xfrm>
-          <a:prstGeom prst="straightConnector1">
-            <a:avLst/>
-          </a:prstGeom>
-          <a:ln>
-            <a:tailEnd type="triangle"/>
-          </a:ln>
-        </p:spPr>
-        <p:style>
-          <a:lnRef idx="1">
-            <a:schemeClr val="accent1"/>
-          </a:lnRef>
-          <a:fillRef idx="0">
-            <a:schemeClr val="accent1"/>
-          </a:fillRef>
-          <a:effectRef idx="0">
-            <a:schemeClr val="accent1"/>
-          </a:effectRef>
-          <a:fontRef idx="minor">
-            <a:schemeClr val="tx1"/>
-          </a:fontRef>
-        </p:style>
-      </p:cxnSp>
       <p:sp>
         <p:nvSpPr>
           <p:cNvPr id="86" name="Retângulo 85"/>
@@ -4786,6 +4319,435 @@
           </a:p>
         </p:txBody>
       </p:sp>
+      <p:cxnSp>
+        <p:nvCxnSpPr>
+          <p:cNvPr id="52" name="Conector reto 51"/>
+          <p:cNvCxnSpPr>
+            <a:stCxn id="7" idx="0"/>
+            <a:endCxn id="6" idx="2"/>
+          </p:cNvCxnSpPr>
+          <p:nvPr/>
+        </p:nvCxnSpPr>
+        <p:spPr>
+          <a:xfrm flipH="1" flipV="1">
+            <a:off x="3003202" y="4699590"/>
+            <a:ext cx="751765" cy="444441"/>
+          </a:xfrm>
+          <a:prstGeom prst="line">
+            <a:avLst/>
+          </a:prstGeom>
+        </p:spPr>
+        <p:style>
+          <a:lnRef idx="1">
+            <a:schemeClr val="dk1"/>
+          </a:lnRef>
+          <a:fillRef idx="0">
+            <a:schemeClr val="dk1"/>
+          </a:fillRef>
+          <a:effectRef idx="0">
+            <a:schemeClr val="dk1"/>
+          </a:effectRef>
+          <a:fontRef idx="minor">
+            <a:schemeClr val="tx1"/>
+          </a:fontRef>
+        </p:style>
+      </p:cxnSp>
+      <p:cxnSp>
+        <p:nvCxnSpPr>
+          <p:cNvPr id="53" name="Conector reto 52"/>
+          <p:cNvCxnSpPr>
+            <a:stCxn id="6" idx="2"/>
+            <a:endCxn id="4" idx="0"/>
+          </p:cNvCxnSpPr>
+          <p:nvPr/>
+        </p:nvCxnSpPr>
+        <p:spPr>
+          <a:xfrm flipH="1">
+            <a:off x="2256973" y="4699590"/>
+            <a:ext cx="746229" cy="481470"/>
+          </a:xfrm>
+          <a:prstGeom prst="line">
+            <a:avLst/>
+          </a:prstGeom>
+        </p:spPr>
+        <p:style>
+          <a:lnRef idx="1">
+            <a:schemeClr val="dk1"/>
+          </a:lnRef>
+          <a:fillRef idx="0">
+            <a:schemeClr val="dk1"/>
+          </a:fillRef>
+          <a:effectRef idx="0">
+            <a:schemeClr val="dk1"/>
+          </a:effectRef>
+          <a:fontRef idx="minor">
+            <a:schemeClr val="tx1"/>
+          </a:fontRef>
+        </p:style>
+      </p:cxnSp>
+      <p:cxnSp>
+        <p:nvCxnSpPr>
+          <p:cNvPr id="56" name="Conector reto 55"/>
+          <p:cNvCxnSpPr>
+            <a:stCxn id="6" idx="0"/>
+            <a:endCxn id="19" idx="2"/>
+          </p:cNvCxnSpPr>
+          <p:nvPr/>
+        </p:nvCxnSpPr>
+        <p:spPr>
+          <a:xfrm flipH="1" flipV="1">
+            <a:off x="2459663" y="3373085"/>
+            <a:ext cx="543539" cy="536319"/>
+          </a:xfrm>
+          <a:prstGeom prst="line">
+            <a:avLst/>
+          </a:prstGeom>
+        </p:spPr>
+        <p:style>
+          <a:lnRef idx="1">
+            <a:schemeClr val="dk1"/>
+          </a:lnRef>
+          <a:fillRef idx="0">
+            <a:schemeClr val="dk1"/>
+          </a:fillRef>
+          <a:effectRef idx="0">
+            <a:schemeClr val="dk1"/>
+          </a:effectRef>
+          <a:fontRef idx="minor">
+            <a:schemeClr val="tx1"/>
+          </a:fontRef>
+        </p:style>
+      </p:cxnSp>
+      <p:cxnSp>
+        <p:nvCxnSpPr>
+          <p:cNvPr id="60" name="Conector reto 59"/>
+          <p:cNvCxnSpPr>
+            <a:stCxn id="19" idx="2"/>
+            <a:endCxn id="14" idx="0"/>
+          </p:cNvCxnSpPr>
+          <p:nvPr/>
+        </p:nvCxnSpPr>
+        <p:spPr>
+          <a:xfrm flipH="1">
+            <a:off x="1732600" y="3373085"/>
+            <a:ext cx="727063" cy="536319"/>
+          </a:xfrm>
+          <a:prstGeom prst="line">
+            <a:avLst/>
+          </a:prstGeom>
+        </p:spPr>
+        <p:style>
+          <a:lnRef idx="1">
+            <a:schemeClr val="dk1"/>
+          </a:lnRef>
+          <a:fillRef idx="0">
+            <a:schemeClr val="dk1"/>
+          </a:fillRef>
+          <a:effectRef idx="0">
+            <a:schemeClr val="dk1"/>
+          </a:effectRef>
+          <a:fontRef idx="minor">
+            <a:schemeClr val="tx1"/>
+          </a:fontRef>
+        </p:style>
+      </p:cxnSp>
+      <p:cxnSp>
+        <p:nvCxnSpPr>
+          <p:cNvPr id="62" name="Conector reto 61"/>
+          <p:cNvCxnSpPr>
+            <a:stCxn id="27" idx="0"/>
+            <a:endCxn id="30" idx="2"/>
+          </p:cNvCxnSpPr>
+          <p:nvPr/>
+        </p:nvCxnSpPr>
+        <p:spPr>
+          <a:xfrm flipV="1">
+            <a:off x="4473836" y="3373085"/>
+            <a:ext cx="702896" cy="536320"/>
+          </a:xfrm>
+          <a:prstGeom prst="line">
+            <a:avLst/>
+          </a:prstGeom>
+        </p:spPr>
+        <p:style>
+          <a:lnRef idx="1">
+            <a:schemeClr val="dk1"/>
+          </a:lnRef>
+          <a:fillRef idx="0">
+            <a:schemeClr val="dk1"/>
+          </a:fillRef>
+          <a:effectRef idx="0">
+            <a:schemeClr val="dk1"/>
+          </a:effectRef>
+          <a:fontRef idx="minor">
+            <a:schemeClr val="tx1"/>
+          </a:fontRef>
+        </p:style>
+      </p:cxnSp>
+      <p:cxnSp>
+        <p:nvCxnSpPr>
+          <p:cNvPr id="65" name="Conector reto 64"/>
+          <p:cNvCxnSpPr>
+            <a:stCxn id="31" idx="0"/>
+            <a:endCxn id="30" idx="2"/>
+          </p:cNvCxnSpPr>
+          <p:nvPr/>
+        </p:nvCxnSpPr>
+        <p:spPr>
+          <a:xfrm flipH="1" flipV="1">
+            <a:off x="5176732" y="3373085"/>
+            <a:ext cx="814939" cy="566023"/>
+          </a:xfrm>
+          <a:prstGeom prst="line">
+            <a:avLst/>
+          </a:prstGeom>
+        </p:spPr>
+        <p:style>
+          <a:lnRef idx="1">
+            <a:schemeClr val="dk1"/>
+          </a:lnRef>
+          <a:fillRef idx="0">
+            <a:schemeClr val="dk1"/>
+          </a:fillRef>
+          <a:effectRef idx="0">
+            <a:schemeClr val="dk1"/>
+          </a:effectRef>
+          <a:fontRef idx="minor">
+            <a:schemeClr val="tx1"/>
+          </a:fontRef>
+        </p:style>
+      </p:cxnSp>
+      <p:cxnSp>
+        <p:nvCxnSpPr>
+          <p:cNvPr id="68" name="Conector reto 67"/>
+          <p:cNvCxnSpPr>
+            <a:stCxn id="41" idx="0"/>
+            <a:endCxn id="50" idx="2"/>
+          </p:cNvCxnSpPr>
+          <p:nvPr/>
+        </p:nvCxnSpPr>
+        <p:spPr>
+          <a:xfrm flipV="1">
+            <a:off x="7621248" y="3572142"/>
+            <a:ext cx="1619731" cy="300234"/>
+          </a:xfrm>
+          <a:prstGeom prst="line">
+            <a:avLst/>
+          </a:prstGeom>
+        </p:spPr>
+        <p:style>
+          <a:lnRef idx="1">
+            <a:schemeClr val="dk1"/>
+          </a:lnRef>
+          <a:fillRef idx="0">
+            <a:schemeClr val="dk1"/>
+          </a:fillRef>
+          <a:effectRef idx="0">
+            <a:schemeClr val="dk1"/>
+          </a:effectRef>
+          <a:fontRef idx="minor">
+            <a:schemeClr val="tx1"/>
+          </a:fontRef>
+        </p:style>
+      </p:cxnSp>
+      <p:cxnSp>
+        <p:nvCxnSpPr>
+          <p:cNvPr id="71" name="Conector reto 70"/>
+          <p:cNvCxnSpPr>
+            <a:stCxn id="43" idx="0"/>
+            <a:endCxn id="50" idx="2"/>
+          </p:cNvCxnSpPr>
+          <p:nvPr/>
+        </p:nvCxnSpPr>
+        <p:spPr>
+          <a:xfrm flipV="1">
+            <a:off x="8715271" y="3572142"/>
+            <a:ext cx="525708" cy="337263"/>
+          </a:xfrm>
+          <a:prstGeom prst="line">
+            <a:avLst/>
+          </a:prstGeom>
+        </p:spPr>
+        <p:style>
+          <a:lnRef idx="1">
+            <a:schemeClr val="dk1"/>
+          </a:lnRef>
+          <a:fillRef idx="0">
+            <a:schemeClr val="dk1"/>
+          </a:fillRef>
+          <a:effectRef idx="0">
+            <a:schemeClr val="dk1"/>
+          </a:effectRef>
+          <a:fontRef idx="minor">
+            <a:schemeClr val="tx1"/>
+          </a:fontRef>
+        </p:style>
+      </p:cxnSp>
+      <p:cxnSp>
+        <p:nvCxnSpPr>
+          <p:cNvPr id="74" name="Conector reto 73"/>
+          <p:cNvCxnSpPr>
+            <a:stCxn id="46" idx="0"/>
+            <a:endCxn id="50" idx="2"/>
+          </p:cNvCxnSpPr>
+          <p:nvPr/>
+        </p:nvCxnSpPr>
+        <p:spPr>
+          <a:xfrm flipH="1" flipV="1">
+            <a:off x="9240979" y="3572142"/>
+            <a:ext cx="627313" cy="348451"/>
+          </a:xfrm>
+          <a:prstGeom prst="line">
+            <a:avLst/>
+          </a:prstGeom>
+        </p:spPr>
+        <p:style>
+          <a:lnRef idx="1">
+            <a:schemeClr val="dk1"/>
+          </a:lnRef>
+          <a:fillRef idx="0">
+            <a:schemeClr val="dk1"/>
+          </a:fillRef>
+          <a:effectRef idx="0">
+            <a:schemeClr val="dk1"/>
+          </a:effectRef>
+          <a:fontRef idx="minor">
+            <a:schemeClr val="tx1"/>
+          </a:fontRef>
+        </p:style>
+      </p:cxnSp>
+      <p:cxnSp>
+        <p:nvCxnSpPr>
+          <p:cNvPr id="78" name="Conector reto 77"/>
+          <p:cNvCxnSpPr>
+            <a:stCxn id="48" idx="0"/>
+            <a:endCxn id="50" idx="2"/>
+          </p:cNvCxnSpPr>
+          <p:nvPr/>
+        </p:nvCxnSpPr>
+        <p:spPr>
+          <a:xfrm flipH="1" flipV="1">
+            <a:off x="9240979" y="3572142"/>
+            <a:ext cx="2049601" cy="348451"/>
+          </a:xfrm>
+          <a:prstGeom prst="line">
+            <a:avLst/>
+          </a:prstGeom>
+        </p:spPr>
+        <p:style>
+          <a:lnRef idx="1">
+            <a:schemeClr val="dk1"/>
+          </a:lnRef>
+          <a:fillRef idx="0">
+            <a:schemeClr val="dk1"/>
+          </a:fillRef>
+          <a:effectRef idx="0">
+            <a:schemeClr val="dk1"/>
+          </a:effectRef>
+          <a:fontRef idx="minor">
+            <a:schemeClr val="tx1"/>
+          </a:fontRef>
+        </p:style>
+      </p:cxnSp>
+      <p:cxnSp>
+        <p:nvCxnSpPr>
+          <p:cNvPr id="92" name="Conector reto 91"/>
+          <p:cNvCxnSpPr>
+            <a:stCxn id="76" idx="2"/>
+            <a:endCxn id="30" idx="0"/>
+          </p:cNvCxnSpPr>
+          <p:nvPr/>
+        </p:nvCxnSpPr>
+        <p:spPr>
+          <a:xfrm>
+            <a:off x="5176731" y="1632373"/>
+            <a:ext cx="1" cy="804480"/>
+          </a:xfrm>
+          <a:prstGeom prst="line">
+            <a:avLst/>
+          </a:prstGeom>
+        </p:spPr>
+        <p:style>
+          <a:lnRef idx="1">
+            <a:schemeClr val="dk1"/>
+          </a:lnRef>
+          <a:fillRef idx="0">
+            <a:schemeClr val="dk1"/>
+          </a:fillRef>
+          <a:effectRef idx="0">
+            <a:schemeClr val="dk1"/>
+          </a:effectRef>
+          <a:fontRef idx="minor">
+            <a:schemeClr val="tx1"/>
+          </a:fontRef>
+        </p:style>
+      </p:cxnSp>
+      <p:cxnSp>
+        <p:nvCxnSpPr>
+          <p:cNvPr id="95" name="Conector reto 94"/>
+          <p:cNvCxnSpPr>
+            <a:stCxn id="76" idx="2"/>
+            <a:endCxn id="19" idx="0"/>
+          </p:cNvCxnSpPr>
+          <p:nvPr/>
+        </p:nvCxnSpPr>
+        <p:spPr>
+          <a:xfrm flipH="1">
+            <a:off x="2459663" y="1632373"/>
+            <a:ext cx="2717068" cy="810429"/>
+          </a:xfrm>
+          <a:prstGeom prst="line">
+            <a:avLst/>
+          </a:prstGeom>
+        </p:spPr>
+        <p:style>
+          <a:lnRef idx="1">
+            <a:schemeClr val="dk1"/>
+          </a:lnRef>
+          <a:fillRef idx="0">
+            <a:schemeClr val="dk1"/>
+          </a:fillRef>
+          <a:effectRef idx="0">
+            <a:schemeClr val="dk1"/>
+          </a:effectRef>
+          <a:fontRef idx="minor">
+            <a:schemeClr val="tx1"/>
+          </a:fontRef>
+        </p:style>
+      </p:cxnSp>
+      <p:cxnSp>
+        <p:nvCxnSpPr>
+          <p:cNvPr id="98" name="Conector reto 97"/>
+          <p:cNvCxnSpPr>
+            <a:stCxn id="50" idx="0"/>
+            <a:endCxn id="76" idx="2"/>
+          </p:cNvCxnSpPr>
+          <p:nvPr/>
+        </p:nvCxnSpPr>
+        <p:spPr>
+          <a:xfrm flipH="1" flipV="1">
+            <a:off x="5176731" y="1632373"/>
+            <a:ext cx="4064248" cy="489886"/>
+          </a:xfrm>
+          <a:prstGeom prst="line">
+            <a:avLst/>
+          </a:prstGeom>
+        </p:spPr>
+        <p:style>
+          <a:lnRef idx="1">
+            <a:schemeClr val="dk1"/>
+          </a:lnRef>
+          <a:fillRef idx="0">
+            <a:schemeClr val="dk1"/>
+          </a:fillRef>
+          <a:effectRef idx="0">
+            <a:schemeClr val="dk1"/>
+          </a:effectRef>
+          <a:fontRef idx="minor">
+            <a:schemeClr val="tx1"/>
+          </a:fontRef>
+        </p:style>
+      </p:cxnSp>
     </p:spTree>
     <p:extLst>
       <p:ext uri="{BB962C8B-B14F-4D97-AF65-F5344CB8AC3E}">
@@ -4929,7 +4891,7 @@
         </p:blipFill>
         <p:spPr>
           <a:xfrm>
-            <a:off x="1398483" y="5982789"/>
+            <a:off x="2396610" y="5961290"/>
             <a:ext cx="786809" cy="817949"/>
           </a:xfrm>
           <a:prstGeom prst="rect">
@@ -4958,7 +4920,7 @@
         </p:blipFill>
         <p:spPr>
           <a:xfrm>
-            <a:off x="2614747" y="5936495"/>
+            <a:off x="1253360" y="5936495"/>
             <a:ext cx="586918" cy="864243"/>
           </a:xfrm>
           <a:prstGeom prst="rect">
@@ -4987,7 +4949,7 @@
         </p:blipFill>
         <p:spPr>
           <a:xfrm>
-            <a:off x="2013335" y="4454434"/>
+            <a:off x="1847689" y="4710191"/>
             <a:ext cx="894871" cy="966652"/>
           </a:xfrm>
           <a:prstGeom prst="rect">
@@ -5003,7 +4965,239 @@
         </p:nvSpPr>
         <p:spPr>
           <a:xfrm>
-            <a:off x="2247608" y="5587763"/>
+            <a:off x="1314248" y="4491521"/>
+            <a:ext cx="304823" cy="584775"/>
+          </a:xfrm>
+          <a:prstGeom prst="rect">
+            <a:avLst/>
+          </a:prstGeom>
+          <a:noFill/>
+        </p:spPr>
+        <p:txBody>
+          <a:bodyPr wrap="square" lIns="91440" tIns="45720" rIns="91440" bIns="45720">
+            <a:spAutoFit/>
+          </a:bodyPr>
+          <a:lstStyle/>
+          <a:p>
+            <a:pPr algn="ctr"/>
+            <a:r>
+              <a:rPr lang="pt-BR" sz="1600" b="0" cap="none" spc="0" dirty="0" smtClean="0">
+                <a:ln w="0"/>
+                <a:solidFill>
+                  <a:schemeClr val="tx1"/>
+                </a:solidFill>
+                <a:effectLst>
+                  <a:outerShdw blurRad="38100" dist="19050" dir="2700000" algn="tl" rotWithShape="0">
+                    <a:schemeClr val="dk1">
+                      <a:alpha val="40000"/>
+                    </a:schemeClr>
+                  </a:outerShdw>
+                </a:effectLst>
+              </a:rPr>
+              <a:t>-</a:t>
+            </a:r>
+          </a:p>
+          <a:p>
+            <a:pPr algn="ctr"/>
+            <a:endParaRPr lang="pt-BR" sz="1600" b="0" cap="none" spc="0" dirty="0">
+              <a:ln w="0"/>
+              <a:solidFill>
+                <a:schemeClr val="tx1"/>
+              </a:solidFill>
+              <a:effectLst>
+                <a:outerShdw blurRad="38100" dist="19050" dir="2700000" algn="tl" rotWithShape="0">
+                  <a:schemeClr val="dk1">
+                    <a:alpha val="40000"/>
+                  </a:schemeClr>
+                </a:outerShdw>
+              </a:effectLst>
+            </a:endParaRPr>
+          </a:p>
+        </p:txBody>
+      </p:sp>
+      <p:pic>
+        <p:nvPicPr>
+          <p:cNvPr id="17" name="Imagem 16"/>
+          <p:cNvPicPr>
+            <a:picLocks noChangeAspect="1"/>
+          </p:cNvPicPr>
+          <p:nvPr/>
+        </p:nvPicPr>
+        <p:blipFill rotWithShape="1">
+          <a:blip r:embed="rId2" cstate="print">
+            <a:extLst>
+              <a:ext uri="{28A0092B-C50C-407E-A947-70E740481C1C}">
+                <a14:useLocalDpi xmlns:a14="http://schemas.microsoft.com/office/drawing/2010/main" val="0"/>
+              </a:ext>
+            </a:extLst>
+          </a:blip>
+          <a:srcRect l="28231" t="9808" r="27448" b="11060"/>
+          <a:stretch/>
+        </p:blipFill>
+        <p:spPr>
+          <a:xfrm>
+            <a:off x="281289" y="4758717"/>
+            <a:ext cx="786809" cy="817949"/>
+          </a:xfrm>
+          <a:prstGeom prst="rect">
+            <a:avLst/>
+          </a:prstGeom>
+        </p:spPr>
+      </p:pic>
+      <p:sp>
+        <p:nvSpPr>
+          <p:cNvPr id="18" name="Retângulo 17"/>
+          <p:cNvSpPr/>
+          <p:nvPr/>
+        </p:nvSpPr>
+        <p:spPr>
+          <a:xfrm>
+            <a:off x="2101629" y="5705256"/>
+            <a:ext cx="304823" cy="584775"/>
+          </a:xfrm>
+          <a:prstGeom prst="rect">
+            <a:avLst/>
+          </a:prstGeom>
+          <a:noFill/>
+        </p:spPr>
+        <p:txBody>
+          <a:bodyPr wrap="square" lIns="91440" tIns="45720" rIns="91440" bIns="45720">
+            <a:spAutoFit/>
+          </a:bodyPr>
+          <a:lstStyle/>
+          <a:p>
+            <a:pPr algn="ctr"/>
+            <a:r>
+              <a:rPr lang="pt-BR" sz="1600" b="0" cap="none" spc="0" dirty="0" smtClean="0">
+                <a:ln w="0"/>
+                <a:solidFill>
+                  <a:schemeClr val="tx1"/>
+                </a:solidFill>
+                <a:effectLst>
+                  <a:outerShdw blurRad="38100" dist="19050" dir="2700000" algn="tl" rotWithShape="0">
+                    <a:schemeClr val="dk1">
+                      <a:alpha val="40000"/>
+                    </a:schemeClr>
+                  </a:outerShdw>
+                </a:effectLst>
+              </a:rPr>
+              <a:t>-</a:t>
+            </a:r>
+          </a:p>
+          <a:p>
+            <a:pPr algn="ctr"/>
+            <a:endParaRPr lang="pt-BR" sz="1600" b="0" cap="none" spc="0" dirty="0">
+              <a:ln w="0"/>
+              <a:solidFill>
+                <a:schemeClr val="tx1"/>
+              </a:solidFill>
+              <a:effectLst>
+                <a:outerShdw blurRad="38100" dist="19050" dir="2700000" algn="tl" rotWithShape="0">
+                  <a:schemeClr val="dk1">
+                    <a:alpha val="40000"/>
+                  </a:schemeClr>
+                </a:outerShdw>
+              </a:effectLst>
+            </a:endParaRPr>
+          </a:p>
+        </p:txBody>
+      </p:sp>
+      <p:pic>
+        <p:nvPicPr>
+          <p:cNvPr id="19" name="Imagem 18"/>
+          <p:cNvPicPr>
+            <a:picLocks noChangeAspect="1"/>
+          </p:cNvPicPr>
+          <p:nvPr/>
+        </p:nvPicPr>
+        <p:blipFill rotWithShape="1">
+          <a:blip r:embed="rId5">
+            <a:extLst>
+              <a:ext uri="{28A0092B-C50C-407E-A947-70E740481C1C}">
+                <a14:useLocalDpi xmlns:a14="http://schemas.microsoft.com/office/drawing/2010/main" val="0"/>
+              </a:ext>
+            </a:extLst>
+          </a:blip>
+          <a:srcRect l="40188" t="23197" r="33644" b="35476"/>
+          <a:stretch/>
+        </p:blipFill>
+        <p:spPr>
+          <a:xfrm>
+            <a:off x="921633" y="3487781"/>
+            <a:ext cx="1088158" cy="966652"/>
+          </a:xfrm>
+          <a:prstGeom prst="rect">
+            <a:avLst/>
+          </a:prstGeom>
+        </p:spPr>
+      </p:pic>
+      <p:pic>
+        <p:nvPicPr>
+          <p:cNvPr id="24" name="Imagem 23"/>
+          <p:cNvPicPr>
+            <a:picLocks noChangeAspect="1"/>
+          </p:cNvPicPr>
+          <p:nvPr/>
+        </p:nvPicPr>
+        <p:blipFill rotWithShape="1">
+          <a:blip r:embed="rId3" cstate="print">
+            <a:extLst>
+              <a:ext uri="{28A0092B-C50C-407E-A947-70E740481C1C}">
+                <a14:useLocalDpi xmlns:a14="http://schemas.microsoft.com/office/drawing/2010/main" val="0"/>
+              </a:ext>
+            </a:extLst>
+          </a:blip>
+          <a:srcRect l="28195" r="28506"/>
+          <a:stretch/>
+        </p:blipFill>
+        <p:spPr>
+          <a:xfrm>
+            <a:off x="2541613" y="3517207"/>
+            <a:ext cx="586918" cy="864243"/>
+          </a:xfrm>
+          <a:prstGeom prst="rect">
+            <a:avLst/>
+          </a:prstGeom>
+        </p:spPr>
+      </p:pic>
+      <p:pic>
+        <p:nvPicPr>
+          <p:cNvPr id="25" name="Imagem 24"/>
+          <p:cNvPicPr>
+            <a:picLocks noChangeAspect="1"/>
+          </p:cNvPicPr>
+          <p:nvPr/>
+        </p:nvPicPr>
+        <p:blipFill rotWithShape="1">
+          <a:blip r:embed="rId6" cstate="print">
+            <a:extLst>
+              <a:ext uri="{28A0092B-C50C-407E-A947-70E740481C1C}">
+                <a14:useLocalDpi xmlns:a14="http://schemas.microsoft.com/office/drawing/2010/main" val="0"/>
+              </a:ext>
+            </a:extLst>
+          </a:blip>
+          <a:srcRect l="34473" t="-1039" r="5463" b="10196"/>
+          <a:stretch/>
+        </p:blipFill>
+        <p:spPr>
+          <a:xfrm>
+            <a:off x="1632242" y="2305742"/>
+            <a:ext cx="1084217" cy="922387"/>
+          </a:xfrm>
+          <a:prstGeom prst="rect">
+            <a:avLst/>
+          </a:prstGeom>
+        </p:spPr>
+      </p:pic>
+      <p:sp>
+        <p:nvSpPr>
+          <p:cNvPr id="26" name="Retângulo 25"/>
+          <p:cNvSpPr/>
+          <p:nvPr/>
+        </p:nvSpPr>
+        <p:spPr>
+          <a:xfrm>
+            <a:off x="1990302" y="3229605"/>
             <a:ext cx="304823" cy="348732"/>
           </a:xfrm>
           <a:prstGeom prst="rect">
@@ -5050,117 +5244,588 @@
           </a:p>
         </p:txBody>
       </p:sp>
-      <p:cxnSp>
-        <p:nvCxnSpPr>
-          <p:cNvPr id="11" name="Conector de Seta Reta 10"/>
-          <p:cNvCxnSpPr>
-            <a:stCxn id="6" idx="0"/>
-            <a:endCxn id="8" idx="2"/>
-          </p:cNvCxnSpPr>
-          <p:nvPr/>
-        </p:nvCxnSpPr>
-        <p:spPr>
-          <a:xfrm flipV="1">
-            <a:off x="1791888" y="5421086"/>
-            <a:ext cx="668883" cy="561703"/>
-          </a:xfrm>
-          <a:prstGeom prst="straightConnector1">
-            <a:avLst/>
-          </a:prstGeom>
-          <a:ln>
-            <a:tailEnd type="triangle"/>
-          </a:ln>
-        </p:spPr>
-        <p:style>
-          <a:lnRef idx="1">
-            <a:schemeClr val="accent1"/>
-          </a:lnRef>
-          <a:fillRef idx="0">
-            <a:schemeClr val="accent1"/>
-          </a:fillRef>
-          <a:effectRef idx="0">
-            <a:schemeClr val="accent1"/>
-          </a:effectRef>
-          <a:fontRef idx="minor">
-            <a:schemeClr val="tx1"/>
-          </a:fontRef>
-        </p:style>
-      </p:cxnSp>
-      <p:cxnSp>
-        <p:nvCxnSpPr>
-          <p:cNvPr id="13" name="Conector de Seta Reta 12"/>
-          <p:cNvCxnSpPr>
-            <a:stCxn id="7" idx="0"/>
-            <a:endCxn id="8" idx="2"/>
-          </p:cNvCxnSpPr>
-          <p:nvPr/>
-        </p:nvCxnSpPr>
-        <p:spPr>
-          <a:xfrm flipH="1" flipV="1">
-            <a:off x="2460771" y="5421086"/>
-            <a:ext cx="447435" cy="515409"/>
-          </a:xfrm>
-          <a:prstGeom prst="straightConnector1">
-            <a:avLst/>
-          </a:prstGeom>
-          <a:ln>
-            <a:tailEnd type="triangle"/>
-          </a:ln>
-        </p:spPr>
-        <p:style>
-          <a:lnRef idx="1">
-            <a:schemeClr val="accent1"/>
-          </a:lnRef>
-          <a:fillRef idx="0">
-            <a:schemeClr val="accent1"/>
-          </a:fillRef>
-          <a:effectRef idx="0">
-            <a:schemeClr val="accent1"/>
-          </a:effectRef>
-          <a:fontRef idx="minor">
-            <a:schemeClr val="tx1"/>
-          </a:fontRef>
-        </p:style>
-      </p:cxnSp>
+      <p:sp>
+        <p:nvSpPr>
+          <p:cNvPr id="31" name="Retângulo 30"/>
+          <p:cNvSpPr/>
+          <p:nvPr/>
+        </p:nvSpPr>
+        <p:spPr>
+          <a:xfrm>
+            <a:off x="2664900" y="2963138"/>
+            <a:ext cx="457457" cy="338554"/>
+          </a:xfrm>
+          <a:prstGeom prst="rect">
+            <a:avLst/>
+          </a:prstGeom>
+          <a:noFill/>
+        </p:spPr>
+        <p:txBody>
+          <a:bodyPr wrap="square" lIns="91440" tIns="45720" rIns="91440" bIns="45720">
+            <a:spAutoFit/>
+          </a:bodyPr>
+          <a:lstStyle/>
+          <a:p>
+            <a:pPr algn="ctr"/>
+            <a:r>
+              <a:rPr lang="pt-BR" sz="1600" b="0" cap="none" spc="0" dirty="0" smtClean="0">
+                <a:ln w="0"/>
+                <a:solidFill>
+                  <a:schemeClr val="tx1"/>
+                </a:solidFill>
+                <a:effectLst>
+                  <a:outerShdw blurRad="38100" dist="19050" dir="2700000" algn="tl" rotWithShape="0">
+                    <a:schemeClr val="dk1">
+                      <a:alpha val="40000"/>
+                    </a:schemeClr>
+                  </a:outerShdw>
+                </a:effectLst>
+              </a:rPr>
+              <a:t>3x</a:t>
+            </a:r>
+            <a:endParaRPr lang="pt-BR" sz="1600" b="0" cap="none" spc="0" dirty="0">
+              <a:ln w="0"/>
+              <a:solidFill>
+                <a:schemeClr val="tx1"/>
+              </a:solidFill>
+              <a:effectLst>
+                <a:outerShdw blurRad="38100" dist="19050" dir="2700000" algn="tl" rotWithShape="0">
+                  <a:schemeClr val="dk1">
+                    <a:alpha val="40000"/>
+                  </a:schemeClr>
+                </a:outerShdw>
+              </a:effectLst>
+            </a:endParaRPr>
+          </a:p>
+        </p:txBody>
+      </p:sp>
       <p:pic>
         <p:nvPicPr>
-          <p:cNvPr id="17" name="Imagem 16"/>
+          <p:cNvPr id="32" name="Imagem 31"/>
           <p:cNvPicPr>
             <a:picLocks noChangeAspect="1"/>
           </p:cNvPicPr>
           <p:nvPr/>
         </p:nvPicPr>
         <p:blipFill rotWithShape="1">
-          <a:blip r:embed="rId2" cstate="print">
+          <a:blip r:embed="rId7" cstate="print">
             <a:extLst>
               <a:ext uri="{28A0092B-C50C-407E-A947-70E740481C1C}">
                 <a14:useLocalDpi xmlns:a14="http://schemas.microsoft.com/office/drawing/2010/main" val="0"/>
               </a:ext>
             </a:extLst>
           </a:blip>
-          <a:srcRect l="28231" t="9808" r="27448" b="11060"/>
+          <a:srcRect l="28175" t="11652" r="28644" b="13197"/>
           <a:stretch/>
         </p:blipFill>
         <p:spPr>
           <a:xfrm>
-            <a:off x="465147" y="4528785"/>
-            <a:ext cx="786809" cy="817949"/>
+            <a:off x="8711548" y="3578337"/>
+            <a:ext cx="916114" cy="896828"/>
           </a:xfrm>
           <a:prstGeom prst="rect">
             <a:avLst/>
           </a:prstGeom>
         </p:spPr>
       </p:pic>
-      <p:sp>
-        <p:nvSpPr>
-          <p:cNvPr id="18" name="Retângulo 17"/>
+      <p:pic>
+        <p:nvPicPr>
+          <p:cNvPr id="34" name="Imagem 33"/>
+          <p:cNvPicPr>
+            <a:picLocks noChangeAspect="1"/>
+          </p:cNvPicPr>
+          <p:nvPr/>
+        </p:nvPicPr>
+        <p:blipFill rotWithShape="1">
+          <a:blip r:embed="rId8" cstate="print">
+            <a:extLst>
+              <a:ext uri="{28A0092B-C50C-407E-A947-70E740481C1C}">
+                <a14:useLocalDpi xmlns:a14="http://schemas.microsoft.com/office/drawing/2010/main" val="0"/>
+              </a:ext>
+            </a:extLst>
+          </a:blip>
+          <a:srcRect l="17497" t="45771" r="37513" b="-18417"/>
+          <a:stretch/>
+        </p:blipFill>
+        <p:spPr>
+          <a:xfrm>
+            <a:off x="10392891" y="3658214"/>
+            <a:ext cx="1102319" cy="1001218"/>
+          </a:xfrm>
+          <a:prstGeom prst="rect">
+            <a:avLst/>
+          </a:prstGeom>
+        </p:spPr>
+      </p:pic>
+      <p:sp>
+        <p:nvSpPr>
+          <p:cNvPr id="35" name="Retângulo 34"/>
           <p:cNvSpPr/>
           <p:nvPr/>
         </p:nvSpPr>
         <p:spPr>
           <a:xfrm>
-            <a:off x="1487064" y="4162046"/>
-            <a:ext cx="304823" cy="584775"/>
+            <a:off x="11495210" y="4136611"/>
+            <a:ext cx="457457" cy="338554"/>
+          </a:xfrm>
+          <a:prstGeom prst="rect">
+            <a:avLst/>
+          </a:prstGeom>
+          <a:noFill/>
+        </p:spPr>
+        <p:txBody>
+          <a:bodyPr wrap="square" lIns="91440" tIns="45720" rIns="91440" bIns="45720">
+            <a:spAutoFit/>
+          </a:bodyPr>
+          <a:lstStyle/>
+          <a:p>
+            <a:pPr algn="ctr"/>
+            <a:r>
+              <a:rPr lang="pt-BR" sz="1600" dirty="0">
+                <a:ln w="0"/>
+                <a:effectLst>
+                  <a:outerShdw blurRad="38100" dist="19050" dir="2700000" algn="tl" rotWithShape="0">
+                    <a:schemeClr val="dk1">
+                      <a:alpha val="40000"/>
+                    </a:schemeClr>
+                  </a:outerShdw>
+                </a:effectLst>
+              </a:rPr>
+              <a:t>2</a:t>
+            </a:r>
+            <a:r>
+              <a:rPr lang="pt-BR" sz="1600" b="0" cap="none" spc="0" dirty="0" smtClean="0">
+                <a:ln w="0"/>
+                <a:solidFill>
+                  <a:schemeClr val="tx1"/>
+                </a:solidFill>
+                <a:effectLst>
+                  <a:outerShdw blurRad="38100" dist="19050" dir="2700000" algn="tl" rotWithShape="0">
+                    <a:schemeClr val="dk1">
+                      <a:alpha val="40000"/>
+                    </a:schemeClr>
+                  </a:outerShdw>
+                </a:effectLst>
+              </a:rPr>
+              <a:t>x</a:t>
+            </a:r>
+            <a:endParaRPr lang="pt-BR" sz="1600" b="0" cap="none" spc="0" dirty="0">
+              <a:ln w="0"/>
+              <a:solidFill>
+                <a:schemeClr val="tx1"/>
+              </a:solidFill>
+              <a:effectLst>
+                <a:outerShdw blurRad="38100" dist="19050" dir="2700000" algn="tl" rotWithShape="0">
+                  <a:schemeClr val="dk1">
+                    <a:alpha val="40000"/>
+                  </a:schemeClr>
+                </a:outerShdw>
+              </a:effectLst>
+            </a:endParaRPr>
+          </a:p>
+        </p:txBody>
+      </p:sp>
+      <p:sp>
+        <p:nvSpPr>
+          <p:cNvPr id="36" name="Retângulo 35"/>
+          <p:cNvSpPr/>
+          <p:nvPr/>
+        </p:nvSpPr>
+        <p:spPr>
+          <a:xfrm>
+            <a:off x="9547262" y="4185961"/>
+            <a:ext cx="479299" cy="338554"/>
+          </a:xfrm>
+          <a:prstGeom prst="rect">
+            <a:avLst/>
+          </a:prstGeom>
+          <a:noFill/>
+        </p:spPr>
+        <p:txBody>
+          <a:bodyPr wrap="square" lIns="91440" tIns="45720" rIns="91440" bIns="45720">
+            <a:spAutoFit/>
+          </a:bodyPr>
+          <a:lstStyle/>
+          <a:p>
+            <a:pPr algn="ctr"/>
+            <a:r>
+              <a:rPr lang="pt-BR" sz="1600" dirty="0">
+                <a:ln w="0"/>
+                <a:effectLst>
+                  <a:outerShdw blurRad="38100" dist="19050" dir="2700000" algn="tl" rotWithShape="0">
+                    <a:schemeClr val="dk1">
+                      <a:alpha val="40000"/>
+                    </a:schemeClr>
+                  </a:outerShdw>
+                </a:effectLst>
+              </a:rPr>
+              <a:t>2</a:t>
+            </a:r>
+            <a:r>
+              <a:rPr lang="pt-BR" sz="1600" b="0" cap="none" spc="0" dirty="0" smtClean="0">
+                <a:ln w="0"/>
+                <a:solidFill>
+                  <a:schemeClr val="tx1"/>
+                </a:solidFill>
+                <a:effectLst>
+                  <a:outerShdw blurRad="38100" dist="19050" dir="2700000" algn="tl" rotWithShape="0">
+                    <a:schemeClr val="dk1">
+                      <a:alpha val="40000"/>
+                    </a:schemeClr>
+                  </a:outerShdw>
+                </a:effectLst>
+              </a:rPr>
+              <a:t>x</a:t>
+            </a:r>
+            <a:endParaRPr lang="pt-BR" sz="1600" b="0" cap="none" spc="0" dirty="0">
+              <a:ln w="0"/>
+              <a:solidFill>
+                <a:schemeClr val="tx1"/>
+              </a:solidFill>
+              <a:effectLst>
+                <a:outerShdw blurRad="38100" dist="19050" dir="2700000" algn="tl" rotWithShape="0">
+                  <a:schemeClr val="dk1">
+                    <a:alpha val="40000"/>
+                  </a:schemeClr>
+                </a:outerShdw>
+              </a:effectLst>
+            </a:endParaRPr>
+          </a:p>
+        </p:txBody>
+      </p:sp>
+      <p:sp>
+        <p:nvSpPr>
+          <p:cNvPr id="37" name="Retângulo 36"/>
+          <p:cNvSpPr/>
+          <p:nvPr/>
+        </p:nvSpPr>
+        <p:spPr>
+          <a:xfrm>
+            <a:off x="9857865" y="3367862"/>
+            <a:ext cx="304823" cy="348732"/>
+          </a:xfrm>
+          <a:prstGeom prst="rect">
+            <a:avLst/>
+          </a:prstGeom>
+          <a:noFill/>
+        </p:spPr>
+        <p:txBody>
+          <a:bodyPr wrap="square" lIns="91440" tIns="45720" rIns="91440" bIns="45720">
+            <a:spAutoFit/>
+          </a:bodyPr>
+          <a:lstStyle/>
+          <a:p>
+            <a:pPr algn="ctr"/>
+            <a:r>
+              <a:rPr lang="pt-BR" sz="1600" b="0" cap="none" spc="0" dirty="0" smtClean="0">
+                <a:ln w="0"/>
+                <a:solidFill>
+                  <a:schemeClr val="tx1"/>
+                </a:solidFill>
+                <a:effectLst>
+                  <a:outerShdw blurRad="38100" dist="19050" dir="2700000" algn="tl" rotWithShape="0">
+                    <a:schemeClr val="dk1">
+                      <a:alpha val="40000"/>
+                    </a:schemeClr>
+                  </a:outerShdw>
+                </a:effectLst>
+              </a:rPr>
+              <a:t>U</a:t>
+            </a:r>
+            <a:endParaRPr lang="pt-BR" sz="1600" b="0" cap="none" spc="0" dirty="0">
+              <a:ln w="0"/>
+              <a:solidFill>
+                <a:schemeClr val="tx1"/>
+              </a:solidFill>
+              <a:effectLst>
+                <a:outerShdw blurRad="38100" dist="19050" dir="2700000" algn="tl" rotWithShape="0">
+                  <a:schemeClr val="dk1">
+                    <a:alpha val="40000"/>
+                  </a:schemeClr>
+                </a:outerShdw>
+              </a:effectLst>
+            </a:endParaRPr>
+          </a:p>
+        </p:txBody>
+      </p:sp>
+      <p:pic>
+        <p:nvPicPr>
+          <p:cNvPr id="38" name="Imagem 37"/>
+          <p:cNvPicPr>
+            <a:picLocks noChangeAspect="1"/>
+          </p:cNvPicPr>
+          <p:nvPr/>
+        </p:nvPicPr>
+        <p:blipFill rotWithShape="1">
+          <a:blip r:embed="rId9">
+            <a:extLst>
+              <a:ext uri="{28A0092B-C50C-407E-A947-70E740481C1C}">
+                <a14:useLocalDpi xmlns:a14="http://schemas.microsoft.com/office/drawing/2010/main" val="0"/>
+              </a:ext>
+            </a:extLst>
+          </a:blip>
+          <a:srcRect l="45771" r="38320" b="33745"/>
+          <a:stretch/>
+        </p:blipFill>
+        <p:spPr>
+          <a:xfrm>
+            <a:off x="9627661" y="2284311"/>
+            <a:ext cx="718914" cy="1071476"/>
+          </a:xfrm>
+          <a:prstGeom prst="rect">
+            <a:avLst/>
+          </a:prstGeom>
+        </p:spPr>
+      </p:pic>
+      <p:pic>
+        <p:nvPicPr>
+          <p:cNvPr id="45" name="Imagem 44"/>
+          <p:cNvPicPr>
+            <a:picLocks noChangeAspect="1"/>
+          </p:cNvPicPr>
+          <p:nvPr/>
+        </p:nvPicPr>
+        <p:blipFill rotWithShape="1">
+          <a:blip r:embed="rId7" cstate="print">
+            <a:extLst>
+              <a:ext uri="{28A0092B-C50C-407E-A947-70E740481C1C}">
+                <a14:useLocalDpi xmlns:a14="http://schemas.microsoft.com/office/drawing/2010/main" val="0"/>
+              </a:ext>
+            </a:extLst>
+          </a:blip>
+          <a:srcRect l="28175" t="11652" r="28644" b="13197"/>
+          <a:stretch/>
+        </p:blipFill>
+        <p:spPr>
+          <a:xfrm>
+            <a:off x="3524096" y="4783909"/>
+            <a:ext cx="813987" cy="796851"/>
+          </a:xfrm>
+          <a:prstGeom prst="rect">
+            <a:avLst/>
+          </a:prstGeom>
+        </p:spPr>
+      </p:pic>
+      <p:pic>
+        <p:nvPicPr>
+          <p:cNvPr id="55" name="Imagem 54"/>
+          <p:cNvPicPr>
+            <a:picLocks noChangeAspect="1"/>
+          </p:cNvPicPr>
+          <p:nvPr/>
+        </p:nvPicPr>
+        <p:blipFill rotWithShape="1">
+          <a:blip r:embed="rId8" cstate="print">
+            <a:extLst>
+              <a:ext uri="{28A0092B-C50C-407E-A947-70E740481C1C}">
+                <a14:useLocalDpi xmlns:a14="http://schemas.microsoft.com/office/drawing/2010/main" val="0"/>
+              </a:ext>
+            </a:extLst>
+          </a:blip>
+          <a:srcRect l="17497" t="45771" r="37513" b="-18417"/>
+          <a:stretch/>
+        </p:blipFill>
+        <p:spPr>
+          <a:xfrm>
+            <a:off x="4787052" y="4783909"/>
+            <a:ext cx="1102319" cy="1001218"/>
+          </a:xfrm>
+          <a:prstGeom prst="rect">
+            <a:avLst/>
+          </a:prstGeom>
+        </p:spPr>
+      </p:pic>
+      <p:sp>
+        <p:nvSpPr>
+          <p:cNvPr id="56" name="Retângulo 55"/>
+          <p:cNvSpPr/>
+          <p:nvPr/>
+        </p:nvSpPr>
+        <p:spPr>
+          <a:xfrm>
+            <a:off x="6012665" y="6462184"/>
+            <a:ext cx="457457" cy="338554"/>
+          </a:xfrm>
+          <a:prstGeom prst="rect">
+            <a:avLst/>
+          </a:prstGeom>
+          <a:noFill/>
+        </p:spPr>
+        <p:txBody>
+          <a:bodyPr wrap="square" lIns="91440" tIns="45720" rIns="91440" bIns="45720">
+            <a:spAutoFit/>
+          </a:bodyPr>
+          <a:lstStyle/>
+          <a:p>
+            <a:pPr algn="ctr"/>
+            <a:r>
+              <a:rPr lang="pt-BR" sz="1600" dirty="0">
+                <a:ln w="0"/>
+                <a:effectLst>
+                  <a:outerShdw blurRad="38100" dist="19050" dir="2700000" algn="tl" rotWithShape="0">
+                    <a:schemeClr val="dk1">
+                      <a:alpha val="40000"/>
+                    </a:schemeClr>
+                  </a:outerShdw>
+                </a:effectLst>
+              </a:rPr>
+              <a:t>2</a:t>
+            </a:r>
+            <a:r>
+              <a:rPr lang="pt-BR" sz="1600" b="0" cap="none" spc="0" dirty="0" smtClean="0">
+                <a:ln w="0"/>
+                <a:solidFill>
+                  <a:schemeClr val="tx1"/>
+                </a:solidFill>
+                <a:effectLst>
+                  <a:outerShdw blurRad="38100" dist="19050" dir="2700000" algn="tl" rotWithShape="0">
+                    <a:schemeClr val="dk1">
+                      <a:alpha val="40000"/>
+                    </a:schemeClr>
+                  </a:outerShdw>
+                </a:effectLst>
+              </a:rPr>
+              <a:t>x</a:t>
+            </a:r>
+            <a:endParaRPr lang="pt-BR" sz="1600" b="0" cap="none" spc="0" dirty="0">
+              <a:ln w="0"/>
+              <a:solidFill>
+                <a:schemeClr val="tx1"/>
+              </a:solidFill>
+              <a:effectLst>
+                <a:outerShdw blurRad="38100" dist="19050" dir="2700000" algn="tl" rotWithShape="0">
+                  <a:schemeClr val="dk1">
+                    <a:alpha val="40000"/>
+                  </a:schemeClr>
+                </a:outerShdw>
+              </a:effectLst>
+            </a:endParaRPr>
+          </a:p>
+        </p:txBody>
+      </p:sp>
+      <p:sp>
+        <p:nvSpPr>
+          <p:cNvPr id="57" name="Retângulo 56"/>
+          <p:cNvSpPr/>
+          <p:nvPr/>
+        </p:nvSpPr>
+        <p:spPr>
+          <a:xfrm>
+            <a:off x="4393396" y="4609543"/>
+            <a:ext cx="304823" cy="348732"/>
+          </a:xfrm>
+          <a:prstGeom prst="rect">
+            <a:avLst/>
+          </a:prstGeom>
+          <a:noFill/>
+        </p:spPr>
+        <p:txBody>
+          <a:bodyPr wrap="square" lIns="91440" tIns="45720" rIns="91440" bIns="45720">
+            <a:spAutoFit/>
+          </a:bodyPr>
+          <a:lstStyle/>
+          <a:p>
+            <a:pPr algn="ctr"/>
+            <a:r>
+              <a:rPr lang="pt-BR" sz="1600" b="0" cap="none" spc="0" dirty="0" smtClean="0">
+                <a:ln w="0"/>
+                <a:solidFill>
+                  <a:schemeClr val="tx1"/>
+                </a:solidFill>
+                <a:effectLst>
+                  <a:outerShdw blurRad="38100" dist="19050" dir="2700000" algn="tl" rotWithShape="0">
+                    <a:schemeClr val="dk1">
+                      <a:alpha val="40000"/>
+                    </a:schemeClr>
+                  </a:outerShdw>
+                </a:effectLst>
+              </a:rPr>
+              <a:t>U</a:t>
+            </a:r>
+            <a:endParaRPr lang="pt-BR" sz="1600" b="0" cap="none" spc="0" dirty="0">
+              <a:ln w="0"/>
+              <a:solidFill>
+                <a:schemeClr val="tx1"/>
+              </a:solidFill>
+              <a:effectLst>
+                <a:outerShdw blurRad="38100" dist="19050" dir="2700000" algn="tl" rotWithShape="0">
+                  <a:schemeClr val="dk1">
+                    <a:alpha val="40000"/>
+                  </a:schemeClr>
+                </a:outerShdw>
+              </a:effectLst>
+            </a:endParaRPr>
+          </a:p>
+        </p:txBody>
+      </p:sp>
+      <p:pic>
+        <p:nvPicPr>
+          <p:cNvPr id="58" name="Imagem 57"/>
+          <p:cNvPicPr>
+            <a:picLocks noChangeAspect="1"/>
+          </p:cNvPicPr>
+          <p:nvPr/>
+        </p:nvPicPr>
+        <p:blipFill rotWithShape="1">
+          <a:blip r:embed="rId10" cstate="print">
+            <a:extLst>
+              <a:ext uri="{28A0092B-C50C-407E-A947-70E740481C1C}">
+                <a14:useLocalDpi xmlns:a14="http://schemas.microsoft.com/office/drawing/2010/main" val="0"/>
+              </a:ext>
+            </a:extLst>
+          </a:blip>
+          <a:srcRect l="29083" t="-808" r="32540" b="15505"/>
+          <a:stretch/>
+        </p:blipFill>
+        <p:spPr>
+          <a:xfrm>
+            <a:off x="4154857" y="3517207"/>
+            <a:ext cx="781903" cy="977623"/>
+          </a:xfrm>
+          <a:prstGeom prst="rect">
+            <a:avLst/>
+          </a:prstGeom>
+        </p:spPr>
+      </p:pic>
+      <p:pic>
+        <p:nvPicPr>
+          <p:cNvPr id="63" name="Imagem 62"/>
+          <p:cNvPicPr>
+            <a:picLocks noChangeAspect="1"/>
+          </p:cNvPicPr>
+          <p:nvPr/>
+        </p:nvPicPr>
+        <p:blipFill rotWithShape="1">
+          <a:blip r:embed="rId7" cstate="print">
+            <a:extLst>
+              <a:ext uri="{28A0092B-C50C-407E-A947-70E740481C1C}">
+                <a14:useLocalDpi xmlns:a14="http://schemas.microsoft.com/office/drawing/2010/main" val="0"/>
+              </a:ext>
+            </a:extLst>
+          </a:blip>
+          <a:srcRect l="28175" t="11652" r="28644" b="13197"/>
+          <a:stretch/>
+        </p:blipFill>
+        <p:spPr>
+          <a:xfrm>
+            <a:off x="6475649" y="3557605"/>
+            <a:ext cx="916114" cy="896828"/>
+          </a:xfrm>
+          <a:prstGeom prst="rect">
+            <a:avLst/>
+          </a:prstGeom>
+        </p:spPr>
+      </p:pic>
+      <p:sp>
+        <p:nvSpPr>
+          <p:cNvPr id="65" name="Retângulo 64"/>
+          <p:cNvSpPr/>
+          <p:nvPr/>
+        </p:nvSpPr>
+        <p:spPr>
+          <a:xfrm>
+            <a:off x="5578428" y="3335133"/>
+            <a:ext cx="229801" cy="584775"/>
           </a:xfrm>
           <a:prstGeom prst="rect">
             <a:avLst/>
@@ -5211,173 +5876,43 @@
       </p:sp>
       <p:pic>
         <p:nvPicPr>
-          <p:cNvPr id="19" name="Imagem 18"/>
+          <p:cNvPr id="66" name="Imagem 65"/>
           <p:cNvPicPr>
             <a:picLocks noChangeAspect="1"/>
           </p:cNvPicPr>
           <p:nvPr/>
         </p:nvPicPr>
         <p:blipFill rotWithShape="1">
-          <a:blip r:embed="rId5">
+          <a:blip r:embed="rId11" cstate="print">
             <a:extLst>
               <a:ext uri="{28A0092B-C50C-407E-A947-70E740481C1C}">
                 <a14:useLocalDpi xmlns:a14="http://schemas.microsoft.com/office/drawing/2010/main" val="0"/>
               </a:ext>
             </a:extLst>
           </a:blip>
-          <a:srcRect l="40188" t="23197" r="33644" b="35476"/>
+          <a:srcRect l="31226" r="33969" b="16775"/>
           <a:stretch/>
         </p:blipFill>
         <p:spPr>
           <a:xfrm>
-            <a:off x="1159450" y="2986961"/>
-            <a:ext cx="1088158" cy="966652"/>
+            <a:off x="5260616" y="2197326"/>
+            <a:ext cx="861292" cy="1158461"/>
           </a:xfrm>
           <a:prstGeom prst="rect">
             <a:avLst/>
           </a:prstGeom>
         </p:spPr>
       </p:pic>
-      <p:cxnSp>
-        <p:nvCxnSpPr>
-          <p:cNvPr id="21" name="Conector de Seta Reta 20"/>
-          <p:cNvCxnSpPr>
-            <a:stCxn id="17" idx="0"/>
-            <a:endCxn id="19" idx="2"/>
-          </p:cNvCxnSpPr>
-          <p:nvPr/>
-        </p:nvCxnSpPr>
-        <p:spPr>
-          <a:xfrm flipV="1">
-            <a:off x="858552" y="3953613"/>
-            <a:ext cx="844977" cy="575172"/>
-          </a:xfrm>
-          <a:prstGeom prst="straightConnector1">
-            <a:avLst/>
-          </a:prstGeom>
-          <a:ln>
-            <a:tailEnd type="triangle"/>
-          </a:ln>
-        </p:spPr>
-        <p:style>
-          <a:lnRef idx="1">
-            <a:schemeClr val="accent1"/>
-          </a:lnRef>
-          <a:fillRef idx="0">
-            <a:schemeClr val="accent1"/>
-          </a:fillRef>
-          <a:effectRef idx="0">
-            <a:schemeClr val="accent1"/>
-          </a:effectRef>
-          <a:fontRef idx="minor">
-            <a:schemeClr val="tx1"/>
-          </a:fontRef>
-        </p:style>
-      </p:cxnSp>
-      <p:cxnSp>
-        <p:nvCxnSpPr>
-          <p:cNvPr id="23" name="Conector de Seta Reta 22"/>
-          <p:cNvCxnSpPr>
-            <a:stCxn id="8" idx="0"/>
-            <a:endCxn id="19" idx="2"/>
-          </p:cNvCxnSpPr>
-          <p:nvPr/>
-        </p:nvCxnSpPr>
-        <p:spPr>
-          <a:xfrm flipH="1" flipV="1">
-            <a:off x="1703529" y="3953613"/>
-            <a:ext cx="757242" cy="500821"/>
-          </a:xfrm>
-          <a:prstGeom prst="straightConnector1">
-            <a:avLst/>
-          </a:prstGeom>
-          <a:ln>
-            <a:tailEnd type="triangle"/>
-          </a:ln>
-        </p:spPr>
-        <p:style>
-          <a:lnRef idx="1">
-            <a:schemeClr val="accent1"/>
-          </a:lnRef>
-          <a:fillRef idx="0">
-            <a:schemeClr val="accent1"/>
-          </a:fillRef>
-          <a:effectRef idx="0">
-            <a:schemeClr val="accent1"/>
-          </a:effectRef>
-          <a:fontRef idx="minor">
-            <a:schemeClr val="tx1"/>
-          </a:fontRef>
-        </p:style>
-      </p:cxnSp>
-      <p:pic>
-        <p:nvPicPr>
-          <p:cNvPr id="24" name="Imagem 23"/>
-          <p:cNvPicPr>
-            <a:picLocks noChangeAspect="1"/>
-          </p:cNvPicPr>
-          <p:nvPr/>
-        </p:nvPicPr>
-        <p:blipFill rotWithShape="1">
-          <a:blip r:embed="rId3" cstate="print">
-            <a:extLst>
-              <a:ext uri="{28A0092B-C50C-407E-A947-70E740481C1C}">
-                <a14:useLocalDpi xmlns:a14="http://schemas.microsoft.com/office/drawing/2010/main" val="0"/>
-              </a:ext>
-            </a:extLst>
-          </a:blip>
-          <a:srcRect l="28195" r="28506"/>
-          <a:stretch/>
-        </p:blipFill>
-        <p:spPr>
-          <a:xfrm>
-            <a:off x="2823297" y="3028488"/>
-            <a:ext cx="586918" cy="864243"/>
-          </a:xfrm>
-          <a:prstGeom prst="rect">
-            <a:avLst/>
-          </a:prstGeom>
-        </p:spPr>
-      </p:pic>
-      <p:pic>
-        <p:nvPicPr>
-          <p:cNvPr id="25" name="Imagem 24"/>
-          <p:cNvPicPr>
-            <a:picLocks noChangeAspect="1"/>
-          </p:cNvPicPr>
-          <p:nvPr/>
-        </p:nvPicPr>
-        <p:blipFill rotWithShape="1">
-          <a:blip r:embed="rId6" cstate="print">
-            <a:extLst>
-              <a:ext uri="{28A0092B-C50C-407E-A947-70E740481C1C}">
-                <a14:useLocalDpi xmlns:a14="http://schemas.microsoft.com/office/drawing/2010/main" val="0"/>
-              </a:ext>
-            </a:extLst>
-          </a:blip>
-          <a:srcRect l="34473" t="-1039" r="5463" b="10196"/>
-          <a:stretch/>
-        </p:blipFill>
-        <p:spPr>
-          <a:xfrm>
-            <a:off x="2072638" y="1723895"/>
-            <a:ext cx="1084217" cy="922387"/>
-          </a:xfrm>
-          <a:prstGeom prst="rect">
-            <a:avLst/>
-          </a:prstGeom>
-        </p:spPr>
-      </p:pic>
-      <p:sp>
-        <p:nvSpPr>
-          <p:cNvPr id="26" name="Retângulo 25"/>
+      <p:sp>
+        <p:nvSpPr>
+          <p:cNvPr id="78" name="Retângulo 77"/>
           <p:cNvSpPr/>
           <p:nvPr/>
         </p:nvSpPr>
         <p:spPr>
           <a:xfrm>
-            <a:off x="2380675" y="2788460"/>
-            <a:ext cx="304823" cy="348732"/>
+            <a:off x="5657687" y="1848445"/>
+            <a:ext cx="432981" cy="338554"/>
           </a:xfrm>
           <a:prstGeom prst="rect">
             <a:avLst/>
@@ -5425,34 +5960,31 @@
       </p:sp>
       <p:cxnSp>
         <p:nvCxnSpPr>
-          <p:cNvPr id="28" name="Conector de Seta Reta 27"/>
+          <p:cNvPr id="112" name="Conector reto 111"/>
           <p:cNvCxnSpPr>
-            <a:stCxn id="19" idx="0"/>
-            <a:endCxn id="25" idx="2"/>
+            <a:stCxn id="6" idx="0"/>
+            <a:endCxn id="8" idx="2"/>
           </p:cNvCxnSpPr>
           <p:nvPr/>
         </p:nvCxnSpPr>
         <p:spPr>
-          <a:xfrm flipV="1">
-            <a:off x="1703529" y="2646282"/>
-            <a:ext cx="911218" cy="340679"/>
-          </a:xfrm>
-          <a:prstGeom prst="straightConnector1">
-            <a:avLst/>
-          </a:prstGeom>
-          <a:ln>
-            <a:tailEnd type="triangle"/>
-          </a:ln>
+          <a:xfrm flipH="1" flipV="1">
+            <a:off x="2295125" y="5676843"/>
+            <a:ext cx="494890" cy="284447"/>
+          </a:xfrm>
+          <a:prstGeom prst="line">
+            <a:avLst/>
+          </a:prstGeom>
         </p:spPr>
         <p:style>
           <a:lnRef idx="1">
-            <a:schemeClr val="accent1"/>
+            <a:schemeClr val="dk1"/>
           </a:lnRef>
           <a:fillRef idx="0">
-            <a:schemeClr val="accent1"/>
+            <a:schemeClr val="dk1"/>
           </a:fillRef>
           <a:effectRef idx="0">
-            <a:schemeClr val="accent1"/>
+            <a:schemeClr val="dk1"/>
           </a:effectRef>
           <a:fontRef idx="minor">
             <a:schemeClr val="tx1"/>
@@ -5461,162 +5993,475 @@
       </p:cxnSp>
       <p:cxnSp>
         <p:nvCxnSpPr>
-          <p:cNvPr id="30" name="Conector de Seta Reta 29"/>
+          <p:cNvPr id="114" name="Conector reto 113"/>
           <p:cNvCxnSpPr>
-            <a:stCxn id="24" idx="0"/>
-            <a:endCxn id="25" idx="2"/>
+            <a:stCxn id="7" idx="0"/>
+            <a:endCxn id="8" idx="2"/>
           </p:cNvCxnSpPr>
           <p:nvPr/>
         </p:nvCxnSpPr>
         <p:spPr>
-          <a:xfrm flipH="1" flipV="1">
-            <a:off x="2614747" y="2646282"/>
-            <a:ext cx="502009" cy="382206"/>
-          </a:xfrm>
-          <a:prstGeom prst="straightConnector1">
-            <a:avLst/>
-          </a:prstGeom>
-          <a:ln>
-            <a:tailEnd type="triangle"/>
-          </a:ln>
+          <a:xfrm flipV="1">
+            <a:off x="1546819" y="5676843"/>
+            <a:ext cx="748306" cy="259652"/>
+          </a:xfrm>
+          <a:prstGeom prst="line">
+            <a:avLst/>
+          </a:prstGeom>
         </p:spPr>
         <p:style>
           <a:lnRef idx="1">
-            <a:schemeClr val="accent1"/>
+            <a:schemeClr val="dk1"/>
           </a:lnRef>
           <a:fillRef idx="0">
-            <a:schemeClr val="accent1"/>
+            <a:schemeClr val="dk1"/>
           </a:fillRef>
           <a:effectRef idx="0">
-            <a:schemeClr val="accent1"/>
+            <a:schemeClr val="dk1"/>
           </a:effectRef>
           <a:fontRef idx="minor">
             <a:schemeClr val="tx1"/>
           </a:fontRef>
         </p:style>
       </p:cxnSp>
-      <p:sp>
-        <p:nvSpPr>
-          <p:cNvPr id="31" name="Retângulo 30"/>
+      <p:cxnSp>
+        <p:nvCxnSpPr>
+          <p:cNvPr id="117" name="Conector reto 116"/>
+          <p:cNvCxnSpPr>
+            <a:stCxn id="55" idx="0"/>
+            <a:endCxn id="58" idx="2"/>
+          </p:cNvCxnSpPr>
+          <p:nvPr/>
+        </p:nvCxnSpPr>
+        <p:spPr>
+          <a:xfrm flipH="1" flipV="1">
+            <a:off x="4545809" y="4494830"/>
+            <a:ext cx="792403" cy="289079"/>
+          </a:xfrm>
+          <a:prstGeom prst="line">
+            <a:avLst/>
+          </a:prstGeom>
+        </p:spPr>
+        <p:style>
+          <a:lnRef idx="1">
+            <a:schemeClr val="dk1"/>
+          </a:lnRef>
+          <a:fillRef idx="0">
+            <a:schemeClr val="dk1"/>
+          </a:fillRef>
+          <a:effectRef idx="0">
+            <a:schemeClr val="dk1"/>
+          </a:effectRef>
+          <a:fontRef idx="minor">
+            <a:schemeClr val="tx1"/>
+          </a:fontRef>
+        </p:style>
+      </p:cxnSp>
+      <p:cxnSp>
+        <p:nvCxnSpPr>
+          <p:cNvPr id="120" name="Conector reto 119"/>
+          <p:cNvCxnSpPr>
+            <a:stCxn id="45" idx="0"/>
+            <a:endCxn id="58" idx="2"/>
+          </p:cNvCxnSpPr>
+          <p:nvPr/>
+        </p:nvCxnSpPr>
+        <p:spPr>
+          <a:xfrm flipV="1">
+            <a:off x="3931090" y="4494830"/>
+            <a:ext cx="614719" cy="289079"/>
+          </a:xfrm>
+          <a:prstGeom prst="line">
+            <a:avLst/>
+          </a:prstGeom>
+        </p:spPr>
+        <p:style>
+          <a:lnRef idx="1">
+            <a:schemeClr val="dk1"/>
+          </a:lnRef>
+          <a:fillRef idx="0">
+            <a:schemeClr val="dk1"/>
+          </a:fillRef>
+          <a:effectRef idx="0">
+            <a:schemeClr val="dk1"/>
+          </a:effectRef>
+          <a:fontRef idx="minor">
+            <a:schemeClr val="tx1"/>
+          </a:fontRef>
+        </p:style>
+      </p:cxnSp>
+      <p:cxnSp>
+        <p:nvCxnSpPr>
+          <p:cNvPr id="124" name="Conector reto 123"/>
+          <p:cNvCxnSpPr>
+            <a:stCxn id="63" idx="0"/>
+            <a:endCxn id="66" idx="2"/>
+          </p:cNvCxnSpPr>
+          <p:nvPr/>
+        </p:nvCxnSpPr>
+        <p:spPr>
+          <a:xfrm flipH="1" flipV="1">
+            <a:off x="5691262" y="3355787"/>
+            <a:ext cx="1242444" cy="201818"/>
+          </a:xfrm>
+          <a:prstGeom prst="line">
+            <a:avLst/>
+          </a:prstGeom>
+        </p:spPr>
+        <p:style>
+          <a:lnRef idx="1">
+            <a:schemeClr val="dk1"/>
+          </a:lnRef>
+          <a:fillRef idx="0">
+            <a:schemeClr val="dk1"/>
+          </a:fillRef>
+          <a:effectRef idx="0">
+            <a:schemeClr val="dk1"/>
+          </a:effectRef>
+          <a:fontRef idx="minor">
+            <a:schemeClr val="tx1"/>
+          </a:fontRef>
+        </p:style>
+      </p:cxnSp>
+      <p:cxnSp>
+        <p:nvCxnSpPr>
+          <p:cNvPr id="127" name="Conector reto 126"/>
+          <p:cNvCxnSpPr>
+            <a:stCxn id="58" idx="0"/>
+            <a:endCxn id="66" idx="2"/>
+          </p:cNvCxnSpPr>
+          <p:nvPr/>
+        </p:nvCxnSpPr>
+        <p:spPr>
+          <a:xfrm flipV="1">
+            <a:off x="4545809" y="3355787"/>
+            <a:ext cx="1145453" cy="161420"/>
+          </a:xfrm>
+          <a:prstGeom prst="line">
+            <a:avLst/>
+          </a:prstGeom>
+        </p:spPr>
+        <p:style>
+          <a:lnRef idx="1">
+            <a:schemeClr val="dk1"/>
+          </a:lnRef>
+          <a:fillRef idx="0">
+            <a:schemeClr val="dk1"/>
+          </a:fillRef>
+          <a:effectRef idx="0">
+            <a:schemeClr val="dk1"/>
+          </a:effectRef>
+          <a:fontRef idx="minor">
+            <a:schemeClr val="tx1"/>
+          </a:fontRef>
+        </p:style>
+      </p:cxnSp>
+      <p:cxnSp>
+        <p:nvCxnSpPr>
+          <p:cNvPr id="130" name="Conector reto 129"/>
+          <p:cNvCxnSpPr>
+            <a:stCxn id="32" idx="0"/>
+            <a:endCxn id="38" idx="2"/>
+          </p:cNvCxnSpPr>
+          <p:nvPr/>
+        </p:nvCxnSpPr>
+        <p:spPr>
+          <a:xfrm flipV="1">
+            <a:off x="9169605" y="3355787"/>
+            <a:ext cx="817513" cy="222550"/>
+          </a:xfrm>
+          <a:prstGeom prst="line">
+            <a:avLst/>
+          </a:prstGeom>
+        </p:spPr>
+        <p:style>
+          <a:lnRef idx="1">
+            <a:schemeClr val="dk1"/>
+          </a:lnRef>
+          <a:fillRef idx="0">
+            <a:schemeClr val="dk1"/>
+          </a:fillRef>
+          <a:effectRef idx="0">
+            <a:schemeClr val="dk1"/>
+          </a:effectRef>
+          <a:fontRef idx="minor">
+            <a:schemeClr val="tx1"/>
+          </a:fontRef>
+        </p:style>
+      </p:cxnSp>
+      <p:cxnSp>
+        <p:nvCxnSpPr>
+          <p:cNvPr id="133" name="Conector reto 132"/>
+          <p:cNvCxnSpPr>
+            <a:stCxn id="34" idx="0"/>
+            <a:endCxn id="38" idx="2"/>
+          </p:cNvCxnSpPr>
+          <p:nvPr/>
+        </p:nvCxnSpPr>
+        <p:spPr>
+          <a:xfrm flipH="1" flipV="1">
+            <a:off x="9987118" y="3355787"/>
+            <a:ext cx="956933" cy="302427"/>
+          </a:xfrm>
+          <a:prstGeom prst="line">
+            <a:avLst/>
+          </a:prstGeom>
+        </p:spPr>
+        <p:style>
+          <a:lnRef idx="1">
+            <a:schemeClr val="dk1"/>
+          </a:lnRef>
+          <a:fillRef idx="0">
+            <a:schemeClr val="dk1"/>
+          </a:fillRef>
+          <a:effectRef idx="0">
+            <a:schemeClr val="dk1"/>
+          </a:effectRef>
+          <a:fontRef idx="minor">
+            <a:schemeClr val="tx1"/>
+          </a:fontRef>
+        </p:style>
+      </p:cxnSp>
+      <p:cxnSp>
+        <p:nvCxnSpPr>
+          <p:cNvPr id="136" name="Conector reto 135"/>
+          <p:cNvCxnSpPr>
+            <a:stCxn id="24" idx="0"/>
+            <a:endCxn id="25" idx="2"/>
+          </p:cNvCxnSpPr>
+          <p:nvPr/>
+        </p:nvCxnSpPr>
+        <p:spPr>
+          <a:xfrm flipH="1" flipV="1">
+            <a:off x="2174351" y="3228129"/>
+            <a:ext cx="660721" cy="289078"/>
+          </a:xfrm>
+          <a:prstGeom prst="line">
+            <a:avLst/>
+          </a:prstGeom>
+        </p:spPr>
+        <p:style>
+          <a:lnRef idx="1">
+            <a:schemeClr val="dk1"/>
+          </a:lnRef>
+          <a:fillRef idx="0">
+            <a:schemeClr val="dk1"/>
+          </a:fillRef>
+          <a:effectRef idx="0">
+            <a:schemeClr val="dk1"/>
+          </a:effectRef>
+          <a:fontRef idx="minor">
+            <a:schemeClr val="tx1"/>
+          </a:fontRef>
+        </p:style>
+      </p:cxnSp>
+      <p:cxnSp>
+        <p:nvCxnSpPr>
+          <p:cNvPr id="145" name="Conector reto 144"/>
+          <p:cNvCxnSpPr>
+            <a:stCxn id="25" idx="2"/>
+            <a:endCxn id="19" idx="0"/>
+          </p:cNvCxnSpPr>
+          <p:nvPr/>
+        </p:nvCxnSpPr>
+        <p:spPr>
+          <a:xfrm flipH="1">
+            <a:off x="1465712" y="3228129"/>
+            <a:ext cx="708639" cy="259652"/>
+          </a:xfrm>
+          <a:prstGeom prst="line">
+            <a:avLst/>
+          </a:prstGeom>
+        </p:spPr>
+        <p:style>
+          <a:lnRef idx="1">
+            <a:schemeClr val="dk1"/>
+          </a:lnRef>
+          <a:fillRef idx="0">
+            <a:schemeClr val="dk1"/>
+          </a:fillRef>
+          <a:effectRef idx="0">
+            <a:schemeClr val="dk1"/>
+          </a:effectRef>
+          <a:fontRef idx="minor">
+            <a:schemeClr val="tx1"/>
+          </a:fontRef>
+        </p:style>
+      </p:cxnSp>
+      <p:cxnSp>
+        <p:nvCxnSpPr>
+          <p:cNvPr id="148" name="Conector reto 147"/>
+          <p:cNvCxnSpPr>
+            <a:stCxn id="19" idx="2"/>
+            <a:endCxn id="8" idx="0"/>
+          </p:cNvCxnSpPr>
+          <p:nvPr/>
+        </p:nvCxnSpPr>
+        <p:spPr>
+          <a:xfrm>
+            <a:off x="1465712" y="4454433"/>
+            <a:ext cx="829413" cy="255758"/>
+          </a:xfrm>
+          <a:prstGeom prst="line">
+            <a:avLst/>
+          </a:prstGeom>
+        </p:spPr>
+        <p:style>
+          <a:lnRef idx="1">
+            <a:schemeClr val="dk1"/>
+          </a:lnRef>
+          <a:fillRef idx="0">
+            <a:schemeClr val="dk1"/>
+          </a:fillRef>
+          <a:effectRef idx="0">
+            <a:schemeClr val="dk1"/>
+          </a:effectRef>
+          <a:fontRef idx="minor">
+            <a:schemeClr val="tx1"/>
+          </a:fontRef>
+        </p:style>
+      </p:cxnSp>
+      <p:cxnSp>
+        <p:nvCxnSpPr>
+          <p:cNvPr id="151" name="Conector reto 150"/>
+          <p:cNvCxnSpPr>
+            <a:stCxn id="17" idx="0"/>
+            <a:endCxn id="19" idx="2"/>
+          </p:cNvCxnSpPr>
+          <p:nvPr/>
+        </p:nvCxnSpPr>
+        <p:spPr>
+          <a:xfrm flipV="1">
+            <a:off x="674694" y="4454433"/>
+            <a:ext cx="791018" cy="304284"/>
+          </a:xfrm>
+          <a:prstGeom prst="line">
+            <a:avLst/>
+          </a:prstGeom>
+        </p:spPr>
+        <p:style>
+          <a:lnRef idx="1">
+            <a:schemeClr val="dk1"/>
+          </a:lnRef>
+          <a:fillRef idx="0">
+            <a:schemeClr val="dk1"/>
+          </a:fillRef>
+          <a:effectRef idx="0">
+            <a:schemeClr val="dk1"/>
+          </a:effectRef>
+          <a:fontRef idx="minor">
+            <a:schemeClr val="tx1"/>
+          </a:fontRef>
+        </p:style>
+      </p:cxnSp>
+      <p:cxnSp>
+        <p:nvCxnSpPr>
+          <p:cNvPr id="156" name="Conector reto 155"/>
+          <p:cNvCxnSpPr>
+            <a:stCxn id="25" idx="0"/>
+            <a:endCxn id="184" idx="2"/>
+          </p:cNvCxnSpPr>
+          <p:nvPr/>
+        </p:nvCxnSpPr>
+        <p:spPr>
+          <a:xfrm flipV="1">
+            <a:off x="2174351" y="1816138"/>
+            <a:ext cx="3516911" cy="489604"/>
+          </a:xfrm>
+          <a:prstGeom prst="line">
+            <a:avLst/>
+          </a:prstGeom>
+        </p:spPr>
+        <p:style>
+          <a:lnRef idx="1">
+            <a:schemeClr val="dk1"/>
+          </a:lnRef>
+          <a:fillRef idx="0">
+            <a:schemeClr val="dk1"/>
+          </a:fillRef>
+          <a:effectRef idx="0">
+            <a:schemeClr val="dk1"/>
+          </a:effectRef>
+          <a:fontRef idx="minor">
+            <a:schemeClr val="tx1"/>
+          </a:fontRef>
+        </p:style>
+      </p:cxnSp>
+      <p:cxnSp>
+        <p:nvCxnSpPr>
+          <p:cNvPr id="159" name="Conector reto 158"/>
+          <p:cNvCxnSpPr>
+            <a:stCxn id="38" idx="0"/>
+            <a:endCxn id="184" idx="2"/>
+          </p:cNvCxnSpPr>
+          <p:nvPr/>
+        </p:nvCxnSpPr>
+        <p:spPr>
+          <a:xfrm flipH="1" flipV="1">
+            <a:off x="5691262" y="1816138"/>
+            <a:ext cx="4295856" cy="468173"/>
+          </a:xfrm>
+          <a:prstGeom prst="line">
+            <a:avLst/>
+          </a:prstGeom>
+        </p:spPr>
+        <p:style>
+          <a:lnRef idx="1">
+            <a:schemeClr val="dk1"/>
+          </a:lnRef>
+          <a:fillRef idx="0">
+            <a:schemeClr val="dk1"/>
+          </a:fillRef>
+          <a:effectRef idx="0">
+            <a:schemeClr val="dk1"/>
+          </a:effectRef>
+          <a:fontRef idx="minor">
+            <a:schemeClr val="tx1"/>
+          </a:fontRef>
+        </p:style>
+      </p:cxnSp>
+      <p:cxnSp>
+        <p:nvCxnSpPr>
+          <p:cNvPr id="162" name="Conector reto 161"/>
+          <p:cNvCxnSpPr>
+            <a:stCxn id="66" idx="0"/>
+            <a:endCxn id="184" idx="2"/>
+          </p:cNvCxnSpPr>
+          <p:nvPr/>
+        </p:nvCxnSpPr>
+        <p:spPr>
+          <a:xfrm flipV="1">
+            <a:off x="5691262" y="1816138"/>
+            <a:ext cx="0" cy="381188"/>
+          </a:xfrm>
+          <a:prstGeom prst="line">
+            <a:avLst/>
+          </a:prstGeom>
+        </p:spPr>
+        <p:style>
+          <a:lnRef idx="1">
+            <a:schemeClr val="dk1"/>
+          </a:lnRef>
+          <a:fillRef idx="0">
+            <a:schemeClr val="dk1"/>
+          </a:fillRef>
+          <a:effectRef idx="0">
+            <a:schemeClr val="dk1"/>
+          </a:effectRef>
+          <a:fontRef idx="minor">
+            <a:schemeClr val="tx1"/>
+          </a:fontRef>
+        </p:style>
+      </p:cxnSp>
+      <p:sp>
+        <p:nvSpPr>
+          <p:cNvPr id="177" name="Retângulo 176"/>
           <p:cNvSpPr/>
           <p:nvPr/>
         </p:nvSpPr>
         <p:spPr>
           <a:xfrm>
-            <a:off x="1487064" y="2050579"/>
-            <a:ext cx="457457" cy="338554"/>
-          </a:xfrm>
-          <a:prstGeom prst="rect">
-            <a:avLst/>
-          </a:prstGeom>
-          <a:noFill/>
-        </p:spPr>
-        <p:txBody>
-          <a:bodyPr wrap="square" lIns="91440" tIns="45720" rIns="91440" bIns="45720">
-            <a:spAutoFit/>
-          </a:bodyPr>
-          <a:lstStyle/>
-          <a:p>
-            <a:pPr algn="ctr"/>
-            <a:r>
-              <a:rPr lang="pt-BR" sz="1600" b="0" cap="none" spc="0" dirty="0" smtClean="0">
-                <a:ln w="0"/>
-                <a:solidFill>
-                  <a:schemeClr val="tx1"/>
-                </a:solidFill>
-                <a:effectLst>
-                  <a:outerShdw blurRad="38100" dist="19050" dir="2700000" algn="tl" rotWithShape="0">
-                    <a:schemeClr val="dk1">
-                      <a:alpha val="40000"/>
-                    </a:schemeClr>
-                  </a:outerShdw>
-                </a:effectLst>
-              </a:rPr>
-              <a:t>3x</a:t>
-            </a:r>
-            <a:endParaRPr lang="pt-BR" sz="1600" b="0" cap="none" spc="0" dirty="0">
-              <a:ln w="0"/>
-              <a:solidFill>
-                <a:schemeClr val="tx1"/>
-              </a:solidFill>
-              <a:effectLst>
-                <a:outerShdw blurRad="38100" dist="19050" dir="2700000" algn="tl" rotWithShape="0">
-                  <a:schemeClr val="dk1">
-                    <a:alpha val="40000"/>
-                  </a:schemeClr>
-                </a:outerShdw>
-              </a:effectLst>
-            </a:endParaRPr>
-          </a:p>
-        </p:txBody>
-      </p:sp>
-      <p:pic>
-        <p:nvPicPr>
-          <p:cNvPr id="32" name="Imagem 31"/>
-          <p:cNvPicPr>
-            <a:picLocks noChangeAspect="1"/>
-          </p:cNvPicPr>
-          <p:nvPr/>
-        </p:nvPicPr>
-        <p:blipFill rotWithShape="1">
-          <a:blip r:embed="rId7" cstate="print">
-            <a:extLst>
-              <a:ext uri="{28A0092B-C50C-407E-A947-70E740481C1C}">
-                <a14:useLocalDpi xmlns:a14="http://schemas.microsoft.com/office/drawing/2010/main" val="0"/>
-              </a:ext>
-            </a:extLst>
-          </a:blip>
-          <a:srcRect l="28175" t="11652" r="28644" b="13197"/>
-          <a:stretch/>
-        </p:blipFill>
-        <p:spPr>
-          <a:xfrm>
-            <a:off x="9084512" y="5847343"/>
-            <a:ext cx="916114" cy="896828"/>
-          </a:xfrm>
-          <a:prstGeom prst="rect">
-            <a:avLst/>
-          </a:prstGeom>
-        </p:spPr>
-      </p:pic>
-      <p:pic>
-        <p:nvPicPr>
-          <p:cNvPr id="34" name="Imagem 33"/>
-          <p:cNvPicPr>
-            <a:picLocks noChangeAspect="1"/>
-          </p:cNvPicPr>
-          <p:nvPr/>
-        </p:nvPicPr>
-        <p:blipFill rotWithShape="1">
-          <a:blip r:embed="rId8" cstate="print">
-            <a:extLst>
-              <a:ext uri="{28A0092B-C50C-407E-A947-70E740481C1C}">
-                <a14:useLocalDpi xmlns:a14="http://schemas.microsoft.com/office/drawing/2010/main" val="0"/>
-              </a:ext>
-            </a:extLst>
-          </a:blip>
-          <a:srcRect l="17497" t="45771" r="37513" b="-18417"/>
-          <a:stretch/>
-        </p:blipFill>
-        <p:spPr>
-          <a:xfrm>
-            <a:off x="10392097" y="5897307"/>
-            <a:ext cx="1102319" cy="1001218"/>
-          </a:xfrm>
-          <a:prstGeom prst="rect">
-            <a:avLst/>
-          </a:prstGeom>
-        </p:spPr>
-      </p:pic>
-      <p:sp>
-        <p:nvSpPr>
-          <p:cNvPr id="35" name="Retângulo 34"/>
-          <p:cNvSpPr/>
-          <p:nvPr/>
-        </p:nvSpPr>
-        <p:spPr>
-          <a:xfrm>
-            <a:off x="11428430" y="6176444"/>
+            <a:off x="10291941" y="3097943"/>
             <a:ext cx="457457" cy="338554"/>
           </a:xfrm>
           <a:prstGeom prst="rect">
@@ -5676,703 +6521,9 @@
           </a:p>
         </p:txBody>
       </p:sp>
-      <p:sp>
-        <p:nvSpPr>
-          <p:cNvPr id="36" name="Retângulo 35"/>
-          <p:cNvSpPr/>
-          <p:nvPr/>
-        </p:nvSpPr>
-        <p:spPr>
-          <a:xfrm>
-            <a:off x="10021868" y="6137037"/>
-            <a:ext cx="479299" cy="338554"/>
-          </a:xfrm>
-          <a:prstGeom prst="rect">
-            <a:avLst/>
-          </a:prstGeom>
-          <a:noFill/>
-        </p:spPr>
-        <p:txBody>
-          <a:bodyPr wrap="square" lIns="91440" tIns="45720" rIns="91440" bIns="45720">
-            <a:spAutoFit/>
-          </a:bodyPr>
-          <a:lstStyle/>
-          <a:p>
-            <a:pPr algn="ctr"/>
-            <a:r>
-              <a:rPr lang="pt-BR" sz="1600" dirty="0">
-                <a:ln w="0"/>
-                <a:effectLst>
-                  <a:outerShdw blurRad="38100" dist="19050" dir="2700000" algn="tl" rotWithShape="0">
-                    <a:schemeClr val="dk1">
-                      <a:alpha val="40000"/>
-                    </a:schemeClr>
-                  </a:outerShdw>
-                </a:effectLst>
-              </a:rPr>
-              <a:t>2</a:t>
-            </a:r>
-            <a:r>
-              <a:rPr lang="pt-BR" sz="1600" b="0" cap="none" spc="0" dirty="0" smtClean="0">
-                <a:ln w="0"/>
-                <a:solidFill>
-                  <a:schemeClr val="tx1"/>
-                </a:solidFill>
-                <a:effectLst>
-                  <a:outerShdw blurRad="38100" dist="19050" dir="2700000" algn="tl" rotWithShape="0">
-                    <a:schemeClr val="dk1">
-                      <a:alpha val="40000"/>
-                    </a:schemeClr>
-                  </a:outerShdw>
-                </a:effectLst>
-              </a:rPr>
-              <a:t>x</a:t>
-            </a:r>
-            <a:endParaRPr lang="pt-BR" sz="1600" b="0" cap="none" spc="0" dirty="0">
-              <a:ln w="0"/>
-              <a:solidFill>
-                <a:schemeClr val="tx1"/>
-              </a:solidFill>
-              <a:effectLst>
-                <a:outerShdw blurRad="38100" dist="19050" dir="2700000" algn="tl" rotWithShape="0">
-                  <a:schemeClr val="dk1">
-                    <a:alpha val="40000"/>
-                  </a:schemeClr>
-                </a:outerShdw>
-              </a:effectLst>
-            </a:endParaRPr>
-          </a:p>
-        </p:txBody>
-      </p:sp>
-      <p:sp>
-        <p:nvSpPr>
-          <p:cNvPr id="37" name="Retângulo 36"/>
-          <p:cNvSpPr/>
-          <p:nvPr/>
-        </p:nvSpPr>
-        <p:spPr>
-          <a:xfrm>
-            <a:off x="10109105" y="5365371"/>
-            <a:ext cx="304823" cy="348732"/>
-          </a:xfrm>
-          <a:prstGeom prst="rect">
-            <a:avLst/>
-          </a:prstGeom>
-          <a:noFill/>
-        </p:spPr>
-        <p:txBody>
-          <a:bodyPr wrap="square" lIns="91440" tIns="45720" rIns="91440" bIns="45720">
-            <a:spAutoFit/>
-          </a:bodyPr>
-          <a:lstStyle/>
-          <a:p>
-            <a:pPr algn="ctr"/>
-            <a:r>
-              <a:rPr lang="pt-BR" sz="1600" b="0" cap="none" spc="0" dirty="0" smtClean="0">
-                <a:ln w="0"/>
-                <a:solidFill>
-                  <a:schemeClr val="tx1"/>
-                </a:solidFill>
-                <a:effectLst>
-                  <a:outerShdw blurRad="38100" dist="19050" dir="2700000" algn="tl" rotWithShape="0">
-                    <a:schemeClr val="dk1">
-                      <a:alpha val="40000"/>
-                    </a:schemeClr>
-                  </a:outerShdw>
-                </a:effectLst>
-              </a:rPr>
-              <a:t>U</a:t>
-            </a:r>
-            <a:endParaRPr lang="pt-BR" sz="1600" b="0" cap="none" spc="0" dirty="0">
-              <a:ln w="0"/>
-              <a:solidFill>
-                <a:schemeClr val="tx1"/>
-              </a:solidFill>
-              <a:effectLst>
-                <a:outerShdw blurRad="38100" dist="19050" dir="2700000" algn="tl" rotWithShape="0">
-                  <a:schemeClr val="dk1">
-                    <a:alpha val="40000"/>
-                  </a:schemeClr>
-                </a:outerShdw>
-              </a:effectLst>
-            </a:endParaRPr>
-          </a:p>
-        </p:txBody>
-      </p:sp>
       <p:pic>
         <p:nvPicPr>
-          <p:cNvPr id="38" name="Imagem 37"/>
-          <p:cNvPicPr>
-            <a:picLocks noChangeAspect="1"/>
-          </p:cNvPicPr>
-          <p:nvPr/>
-        </p:nvPicPr>
-        <p:blipFill rotWithShape="1">
-          <a:blip r:embed="rId9">
-            <a:extLst>
-              <a:ext uri="{28A0092B-C50C-407E-A947-70E740481C1C}">
-                <a14:useLocalDpi xmlns:a14="http://schemas.microsoft.com/office/drawing/2010/main" val="0"/>
-              </a:ext>
-            </a:extLst>
-          </a:blip>
-          <a:srcRect l="45771" r="38320" b="33745"/>
-          <a:stretch/>
-        </p:blipFill>
-        <p:spPr>
-          <a:xfrm>
-            <a:off x="9902059" y="3416988"/>
-            <a:ext cx="718914" cy="1684121"/>
-          </a:xfrm>
-          <a:prstGeom prst="rect">
-            <a:avLst/>
-          </a:prstGeom>
-        </p:spPr>
-      </p:pic>
-      <p:cxnSp>
-        <p:nvCxnSpPr>
-          <p:cNvPr id="40" name="Conector de Seta Reta 39"/>
-          <p:cNvCxnSpPr>
-            <a:stCxn id="32" idx="0"/>
-            <a:endCxn id="38" idx="2"/>
-          </p:cNvCxnSpPr>
-          <p:nvPr/>
-        </p:nvCxnSpPr>
-        <p:spPr>
-          <a:xfrm flipV="1">
-            <a:off x="9542569" y="5101109"/>
-            <a:ext cx="718947" cy="746234"/>
-          </a:xfrm>
-          <a:prstGeom prst="straightConnector1">
-            <a:avLst/>
-          </a:prstGeom>
-          <a:ln>
-            <a:tailEnd type="triangle"/>
-          </a:ln>
-        </p:spPr>
-        <p:style>
-          <a:lnRef idx="1">
-            <a:schemeClr val="accent1"/>
-          </a:lnRef>
-          <a:fillRef idx="0">
-            <a:schemeClr val="accent1"/>
-          </a:fillRef>
-          <a:effectRef idx="0">
-            <a:schemeClr val="accent1"/>
-          </a:effectRef>
-          <a:fontRef idx="minor">
-            <a:schemeClr val="tx1"/>
-          </a:fontRef>
-        </p:style>
-      </p:cxnSp>
-      <p:cxnSp>
-        <p:nvCxnSpPr>
-          <p:cNvPr id="42" name="Conector de Seta Reta 41"/>
-          <p:cNvCxnSpPr>
-            <a:stCxn id="34" idx="0"/>
-            <a:endCxn id="38" idx="2"/>
-          </p:cNvCxnSpPr>
-          <p:nvPr/>
-        </p:nvCxnSpPr>
-        <p:spPr>
-          <a:xfrm flipH="1" flipV="1">
-            <a:off x="10261516" y="5101109"/>
-            <a:ext cx="681741" cy="796198"/>
-          </a:xfrm>
-          <a:prstGeom prst="straightConnector1">
-            <a:avLst/>
-          </a:prstGeom>
-          <a:ln>
-            <a:tailEnd type="triangle"/>
-          </a:ln>
-        </p:spPr>
-        <p:style>
-          <a:lnRef idx="1">
-            <a:schemeClr val="accent1"/>
-          </a:lnRef>
-          <a:fillRef idx="0">
-            <a:schemeClr val="accent1"/>
-          </a:fillRef>
-          <a:effectRef idx="0">
-            <a:schemeClr val="accent1"/>
-          </a:effectRef>
-          <a:fontRef idx="minor">
-            <a:schemeClr val="tx1"/>
-          </a:fontRef>
-        </p:style>
-      </p:cxnSp>
-      <p:pic>
-        <p:nvPicPr>
-          <p:cNvPr id="45" name="Imagem 44"/>
-          <p:cNvPicPr>
-            <a:picLocks noChangeAspect="1"/>
-          </p:cNvPicPr>
-          <p:nvPr/>
-        </p:nvPicPr>
-        <p:blipFill rotWithShape="1">
-          <a:blip r:embed="rId7" cstate="print">
-            <a:extLst>
-              <a:ext uri="{28A0092B-C50C-407E-A947-70E740481C1C}">
-                <a14:useLocalDpi xmlns:a14="http://schemas.microsoft.com/office/drawing/2010/main" val="0"/>
-              </a:ext>
-            </a:extLst>
-          </a:blip>
-          <a:srcRect l="28175" t="11652" r="28644" b="13197"/>
-          <a:stretch/>
-        </p:blipFill>
-        <p:spPr>
-          <a:xfrm>
-            <a:off x="3748153" y="5926411"/>
-            <a:ext cx="916114" cy="896828"/>
-          </a:xfrm>
-          <a:prstGeom prst="rect">
-            <a:avLst/>
-          </a:prstGeom>
-        </p:spPr>
-      </p:pic>
-      <p:pic>
-        <p:nvPicPr>
-          <p:cNvPr id="55" name="Imagem 54"/>
-          <p:cNvPicPr>
-            <a:picLocks noChangeAspect="1"/>
-          </p:cNvPicPr>
-          <p:nvPr/>
-        </p:nvPicPr>
-        <p:blipFill rotWithShape="1">
-          <a:blip r:embed="rId8" cstate="print">
-            <a:extLst>
-              <a:ext uri="{28A0092B-C50C-407E-A947-70E740481C1C}">
-                <a14:useLocalDpi xmlns:a14="http://schemas.microsoft.com/office/drawing/2010/main" val="0"/>
-              </a:ext>
-            </a:extLst>
-          </a:blip>
-          <a:srcRect l="17497" t="45771" r="37513" b="-18417"/>
-          <a:stretch/>
-        </p:blipFill>
-        <p:spPr>
-          <a:xfrm>
-            <a:off x="5063736" y="5926411"/>
-            <a:ext cx="1102319" cy="1001218"/>
-          </a:xfrm>
-          <a:prstGeom prst="rect">
-            <a:avLst/>
-          </a:prstGeom>
-        </p:spPr>
-      </p:pic>
-      <p:sp>
-        <p:nvSpPr>
-          <p:cNvPr id="56" name="Retângulo 55"/>
-          <p:cNvSpPr/>
-          <p:nvPr/>
-        </p:nvSpPr>
-        <p:spPr>
-          <a:xfrm>
-            <a:off x="6100069" y="6205548"/>
-            <a:ext cx="457457" cy="338554"/>
-          </a:xfrm>
-          <a:prstGeom prst="rect">
-            <a:avLst/>
-          </a:prstGeom>
-          <a:noFill/>
-        </p:spPr>
-        <p:txBody>
-          <a:bodyPr wrap="square" lIns="91440" tIns="45720" rIns="91440" bIns="45720">
-            <a:spAutoFit/>
-          </a:bodyPr>
-          <a:lstStyle/>
-          <a:p>
-            <a:pPr algn="ctr"/>
-            <a:r>
-              <a:rPr lang="pt-BR" sz="1600" dirty="0">
-                <a:ln w="0"/>
-                <a:effectLst>
-                  <a:outerShdw blurRad="38100" dist="19050" dir="2700000" algn="tl" rotWithShape="0">
-                    <a:schemeClr val="dk1">
-                      <a:alpha val="40000"/>
-                    </a:schemeClr>
-                  </a:outerShdw>
-                </a:effectLst>
-              </a:rPr>
-              <a:t>2</a:t>
-            </a:r>
-            <a:r>
-              <a:rPr lang="pt-BR" sz="1600" b="0" cap="none" spc="0" dirty="0" smtClean="0">
-                <a:ln w="0"/>
-                <a:solidFill>
-                  <a:schemeClr val="tx1"/>
-                </a:solidFill>
-                <a:effectLst>
-                  <a:outerShdw blurRad="38100" dist="19050" dir="2700000" algn="tl" rotWithShape="0">
-                    <a:schemeClr val="dk1">
-                      <a:alpha val="40000"/>
-                    </a:schemeClr>
-                  </a:outerShdw>
-                </a:effectLst>
-              </a:rPr>
-              <a:t>x</a:t>
-            </a:r>
-            <a:endParaRPr lang="pt-BR" sz="1600" b="0" cap="none" spc="0" dirty="0">
-              <a:ln w="0"/>
-              <a:solidFill>
-                <a:schemeClr val="tx1"/>
-              </a:solidFill>
-              <a:effectLst>
-                <a:outerShdw blurRad="38100" dist="19050" dir="2700000" algn="tl" rotWithShape="0">
-                  <a:schemeClr val="dk1">
-                    <a:alpha val="40000"/>
-                  </a:schemeClr>
-                </a:outerShdw>
-              </a:effectLst>
-            </a:endParaRPr>
-          </a:p>
-        </p:txBody>
-      </p:sp>
-      <p:sp>
-        <p:nvSpPr>
-          <p:cNvPr id="57" name="Retângulo 56"/>
-          <p:cNvSpPr/>
-          <p:nvPr/>
-        </p:nvSpPr>
-        <p:spPr>
-          <a:xfrm>
-            <a:off x="4685736" y="5498611"/>
-            <a:ext cx="304823" cy="348732"/>
-          </a:xfrm>
-          <a:prstGeom prst="rect">
-            <a:avLst/>
-          </a:prstGeom>
-          <a:noFill/>
-        </p:spPr>
-        <p:txBody>
-          <a:bodyPr wrap="square" lIns="91440" tIns="45720" rIns="91440" bIns="45720">
-            <a:spAutoFit/>
-          </a:bodyPr>
-          <a:lstStyle/>
-          <a:p>
-            <a:pPr algn="ctr"/>
-            <a:r>
-              <a:rPr lang="pt-BR" sz="1600" b="0" cap="none" spc="0" dirty="0" smtClean="0">
-                <a:ln w="0"/>
-                <a:solidFill>
-                  <a:schemeClr val="tx1"/>
-                </a:solidFill>
-                <a:effectLst>
-                  <a:outerShdw blurRad="38100" dist="19050" dir="2700000" algn="tl" rotWithShape="0">
-                    <a:schemeClr val="dk1">
-                      <a:alpha val="40000"/>
-                    </a:schemeClr>
-                  </a:outerShdw>
-                </a:effectLst>
-              </a:rPr>
-              <a:t>U</a:t>
-            </a:r>
-            <a:endParaRPr lang="pt-BR" sz="1600" b="0" cap="none" spc="0" dirty="0">
-              <a:ln w="0"/>
-              <a:solidFill>
-                <a:schemeClr val="tx1"/>
-              </a:solidFill>
-              <a:effectLst>
-                <a:outerShdw blurRad="38100" dist="19050" dir="2700000" algn="tl" rotWithShape="0">
-                  <a:schemeClr val="dk1">
-                    <a:alpha val="40000"/>
-                  </a:schemeClr>
-                </a:outerShdw>
-              </a:effectLst>
-            </a:endParaRPr>
-          </a:p>
-        </p:txBody>
-      </p:sp>
-      <p:pic>
-        <p:nvPicPr>
-          <p:cNvPr id="58" name="Imagem 57"/>
-          <p:cNvPicPr>
-            <a:picLocks noChangeAspect="1"/>
-          </p:cNvPicPr>
-          <p:nvPr/>
-        </p:nvPicPr>
-        <p:blipFill rotWithShape="1">
-          <a:blip r:embed="rId10" cstate="print">
-            <a:extLst>
-              <a:ext uri="{28A0092B-C50C-407E-A947-70E740481C1C}">
-                <a14:useLocalDpi xmlns:a14="http://schemas.microsoft.com/office/drawing/2010/main" val="0"/>
-              </a:ext>
-            </a:extLst>
-          </a:blip>
-          <a:srcRect l="29083" t="-808" r="32540" b="15505"/>
-          <a:stretch/>
-        </p:blipFill>
-        <p:spPr>
-          <a:xfrm>
-            <a:off x="4281173" y="3892731"/>
-            <a:ext cx="1143000" cy="1429107"/>
-          </a:xfrm>
-          <a:prstGeom prst="rect">
-            <a:avLst/>
-          </a:prstGeom>
-        </p:spPr>
-      </p:pic>
-      <p:cxnSp>
-        <p:nvCxnSpPr>
-          <p:cNvPr id="60" name="Conector de Seta Reta 59"/>
-          <p:cNvCxnSpPr>
-            <a:stCxn id="45" idx="0"/>
-            <a:endCxn id="58" idx="2"/>
-          </p:cNvCxnSpPr>
-          <p:nvPr/>
-        </p:nvCxnSpPr>
-        <p:spPr>
-          <a:xfrm flipV="1">
-            <a:off x="4206210" y="5321838"/>
-            <a:ext cx="646463" cy="604573"/>
-          </a:xfrm>
-          <a:prstGeom prst="straightConnector1">
-            <a:avLst/>
-          </a:prstGeom>
-          <a:ln>
-            <a:tailEnd type="triangle"/>
-          </a:ln>
-        </p:spPr>
-        <p:style>
-          <a:lnRef idx="1">
-            <a:schemeClr val="accent1"/>
-          </a:lnRef>
-          <a:fillRef idx="0">
-            <a:schemeClr val="accent1"/>
-          </a:fillRef>
-          <a:effectRef idx="0">
-            <a:schemeClr val="accent1"/>
-          </a:effectRef>
-          <a:fontRef idx="minor">
-            <a:schemeClr val="tx1"/>
-          </a:fontRef>
-        </p:style>
-      </p:cxnSp>
-      <p:cxnSp>
-        <p:nvCxnSpPr>
-          <p:cNvPr id="62" name="Conector de Seta Reta 61"/>
-          <p:cNvCxnSpPr>
-            <a:stCxn id="55" idx="0"/>
-            <a:endCxn id="58" idx="2"/>
-          </p:cNvCxnSpPr>
-          <p:nvPr/>
-        </p:nvCxnSpPr>
-        <p:spPr>
-          <a:xfrm flipH="1" flipV="1">
-            <a:off x="4852673" y="5321838"/>
-            <a:ext cx="762223" cy="604573"/>
-          </a:xfrm>
-          <a:prstGeom prst="straightConnector1">
-            <a:avLst/>
-          </a:prstGeom>
-          <a:ln>
-            <a:tailEnd type="triangle"/>
-          </a:ln>
-        </p:spPr>
-        <p:style>
-          <a:lnRef idx="1">
-            <a:schemeClr val="accent1"/>
-          </a:lnRef>
-          <a:fillRef idx="0">
-            <a:schemeClr val="accent1"/>
-          </a:fillRef>
-          <a:effectRef idx="0">
-            <a:schemeClr val="accent1"/>
-          </a:effectRef>
-          <a:fontRef idx="minor">
-            <a:schemeClr val="tx1"/>
-          </a:fontRef>
-        </p:style>
-      </p:cxnSp>
-      <p:pic>
-        <p:nvPicPr>
-          <p:cNvPr id="63" name="Imagem 62"/>
-          <p:cNvPicPr>
-            <a:picLocks noChangeAspect="1"/>
-          </p:cNvPicPr>
-          <p:nvPr/>
-        </p:nvPicPr>
-        <p:blipFill rotWithShape="1">
-          <a:blip r:embed="rId7" cstate="print">
-            <a:extLst>
-              <a:ext uri="{28A0092B-C50C-407E-A947-70E740481C1C}">
-                <a14:useLocalDpi xmlns:a14="http://schemas.microsoft.com/office/drawing/2010/main" val="0"/>
-              </a:ext>
-            </a:extLst>
-          </a:blip>
-          <a:srcRect l="28175" t="11652" r="28644" b="13197"/>
-          <a:stretch/>
-        </p:blipFill>
-        <p:spPr>
-          <a:xfrm>
-            <a:off x="6109200" y="4080371"/>
-            <a:ext cx="916114" cy="896828"/>
-          </a:xfrm>
-          <a:prstGeom prst="rect">
-            <a:avLst/>
-          </a:prstGeom>
-        </p:spPr>
-      </p:pic>
-      <p:sp>
-        <p:nvSpPr>
-          <p:cNvPr id="65" name="Retângulo 64"/>
-          <p:cNvSpPr/>
-          <p:nvPr/>
-        </p:nvSpPr>
-        <p:spPr>
-          <a:xfrm>
-            <a:off x="5565630" y="3491164"/>
-            <a:ext cx="304823" cy="584775"/>
-          </a:xfrm>
-          <a:prstGeom prst="rect">
-            <a:avLst/>
-          </a:prstGeom>
-          <a:noFill/>
-        </p:spPr>
-        <p:txBody>
-          <a:bodyPr wrap="square" lIns="91440" tIns="45720" rIns="91440" bIns="45720">
-            <a:spAutoFit/>
-          </a:bodyPr>
-          <a:lstStyle/>
-          <a:p>
-            <a:pPr algn="ctr"/>
-            <a:r>
-              <a:rPr lang="pt-BR" sz="1600" b="0" cap="none" spc="0" dirty="0" smtClean="0">
-                <a:ln w="0"/>
-                <a:solidFill>
-                  <a:schemeClr val="tx1"/>
-                </a:solidFill>
-                <a:effectLst>
-                  <a:outerShdw blurRad="38100" dist="19050" dir="2700000" algn="tl" rotWithShape="0">
-                    <a:schemeClr val="dk1">
-                      <a:alpha val="40000"/>
-                    </a:schemeClr>
-                  </a:outerShdw>
-                </a:effectLst>
-              </a:rPr>
-              <a:t>-</a:t>
-            </a:r>
-          </a:p>
-          <a:p>
-            <a:pPr algn="ctr"/>
-            <a:endParaRPr lang="pt-BR" sz="1600" b="0" cap="none" spc="0" dirty="0">
-              <a:ln w="0"/>
-              <a:solidFill>
-                <a:schemeClr val="tx1"/>
-              </a:solidFill>
-              <a:effectLst>
-                <a:outerShdw blurRad="38100" dist="19050" dir="2700000" algn="tl" rotWithShape="0">
-                  <a:schemeClr val="dk1">
-                    <a:alpha val="40000"/>
-                  </a:schemeClr>
-                </a:outerShdw>
-              </a:effectLst>
-            </a:endParaRPr>
-          </a:p>
-        </p:txBody>
-      </p:sp>
-      <p:pic>
-        <p:nvPicPr>
-          <p:cNvPr id="66" name="Imagem 65"/>
-          <p:cNvPicPr>
-            <a:picLocks noChangeAspect="1"/>
-          </p:cNvPicPr>
-          <p:nvPr/>
-        </p:nvPicPr>
-        <p:blipFill rotWithShape="1">
-          <a:blip r:embed="rId11" cstate="print">
-            <a:extLst>
-              <a:ext uri="{28A0092B-C50C-407E-A947-70E740481C1C}">
-                <a14:useLocalDpi xmlns:a14="http://schemas.microsoft.com/office/drawing/2010/main" val="0"/>
-              </a:ext>
-            </a:extLst>
-          </a:blip>
-          <a:srcRect l="31226" r="33969" b="16775"/>
-          <a:stretch/>
-        </p:blipFill>
-        <p:spPr>
-          <a:xfrm>
-            <a:off x="5240686" y="2004047"/>
-            <a:ext cx="954710" cy="1284111"/>
-          </a:xfrm>
-          <a:prstGeom prst="rect">
-            <a:avLst/>
-          </a:prstGeom>
-        </p:spPr>
-      </p:pic>
-      <p:cxnSp>
-        <p:nvCxnSpPr>
-          <p:cNvPr id="68" name="Conector de Seta Reta 67"/>
-          <p:cNvCxnSpPr>
-            <a:stCxn id="58" idx="0"/>
-            <a:endCxn id="66" idx="2"/>
-          </p:cNvCxnSpPr>
-          <p:nvPr/>
-        </p:nvCxnSpPr>
-        <p:spPr>
-          <a:xfrm flipV="1">
-            <a:off x="4852673" y="3288158"/>
-            <a:ext cx="865368" cy="604573"/>
-          </a:xfrm>
-          <a:prstGeom prst="straightConnector1">
-            <a:avLst/>
-          </a:prstGeom>
-          <a:ln>
-            <a:tailEnd type="triangle"/>
-          </a:ln>
-        </p:spPr>
-        <p:style>
-          <a:lnRef idx="1">
-            <a:schemeClr val="accent1"/>
-          </a:lnRef>
-          <a:fillRef idx="0">
-            <a:schemeClr val="accent1"/>
-          </a:fillRef>
-          <a:effectRef idx="0">
-            <a:schemeClr val="accent1"/>
-          </a:effectRef>
-          <a:fontRef idx="minor">
-            <a:schemeClr val="tx1"/>
-          </a:fontRef>
-        </p:style>
-      </p:cxnSp>
-      <p:cxnSp>
-        <p:nvCxnSpPr>
-          <p:cNvPr id="70" name="Conector de Seta Reta 69"/>
-          <p:cNvCxnSpPr>
-            <a:stCxn id="63" idx="0"/>
-            <a:endCxn id="66" idx="2"/>
-          </p:cNvCxnSpPr>
-          <p:nvPr/>
-        </p:nvCxnSpPr>
-        <p:spPr>
-          <a:xfrm flipH="1" flipV="1">
-            <a:off x="5718041" y="3288158"/>
-            <a:ext cx="849216" cy="792213"/>
-          </a:xfrm>
-          <a:prstGeom prst="straightConnector1">
-            <a:avLst/>
-          </a:prstGeom>
-          <a:ln>
-            <a:tailEnd type="triangle"/>
-          </a:ln>
-        </p:spPr>
-        <p:style>
-          <a:lnRef idx="1">
-            <a:schemeClr val="accent1"/>
-          </a:lnRef>
-          <a:fillRef idx="0">
-            <a:schemeClr val="accent1"/>
-          </a:fillRef>
-          <a:effectRef idx="0">
-            <a:schemeClr val="accent1"/>
-          </a:effectRef>
-          <a:fontRef idx="minor">
-            <a:schemeClr val="tx1"/>
-          </a:fontRef>
-        </p:style>
-      </p:cxnSp>
-      <p:pic>
-        <p:nvPicPr>
-          <p:cNvPr id="71" name="Imagem 70"/>
+          <p:cNvPr id="184" name="Imagem 183"/>
           <p:cNvPicPr>
             <a:picLocks noChangeAspect="1"/>
           </p:cNvPicPr>
@@ -6386,182 +6537,19 @@
               </a:ext>
             </a:extLst>
           </a:blip>
-          <a:srcRect l="45902" t="27235" r="40137" b="39287"/>
+          <a:srcRect l="73419" t="5309" r="4607" b="43709"/>
           <a:stretch/>
         </p:blipFill>
         <p:spPr>
           <a:xfrm>
-            <a:off x="7491548" y="653142"/>
-            <a:ext cx="1404257" cy="1894115"/>
+            <a:off x="4977928" y="92116"/>
+            <a:ext cx="1426668" cy="1724022"/>
           </a:xfrm>
           <a:prstGeom prst="rect">
             <a:avLst/>
           </a:prstGeom>
         </p:spPr>
       </p:pic>
-      <p:cxnSp>
-        <p:nvCxnSpPr>
-          <p:cNvPr id="73" name="Conector de Seta Reta 72"/>
-          <p:cNvCxnSpPr>
-            <a:stCxn id="25" idx="3"/>
-            <a:endCxn id="71" idx="1"/>
-          </p:cNvCxnSpPr>
-          <p:nvPr/>
-        </p:nvCxnSpPr>
-        <p:spPr>
-          <a:xfrm flipV="1">
-            <a:off x="3156855" y="1600200"/>
-            <a:ext cx="4334693" cy="584889"/>
-          </a:xfrm>
-          <a:prstGeom prst="straightConnector1">
-            <a:avLst/>
-          </a:prstGeom>
-          <a:ln>
-            <a:tailEnd type="triangle"/>
-          </a:ln>
-        </p:spPr>
-        <p:style>
-          <a:lnRef idx="1">
-            <a:schemeClr val="accent1"/>
-          </a:lnRef>
-          <a:fillRef idx="0">
-            <a:schemeClr val="accent1"/>
-          </a:fillRef>
-          <a:effectRef idx="0">
-            <a:schemeClr val="accent1"/>
-          </a:effectRef>
-          <a:fontRef idx="minor">
-            <a:schemeClr val="tx1"/>
-          </a:fontRef>
-        </p:style>
-      </p:cxnSp>
-      <p:cxnSp>
-        <p:nvCxnSpPr>
-          <p:cNvPr id="75" name="Conector de Seta Reta 74"/>
-          <p:cNvCxnSpPr>
-            <a:stCxn id="66" idx="3"/>
-            <a:endCxn id="71" idx="1"/>
-          </p:cNvCxnSpPr>
-          <p:nvPr/>
-        </p:nvCxnSpPr>
-        <p:spPr>
-          <a:xfrm flipV="1">
-            <a:off x="6195396" y="1600200"/>
-            <a:ext cx="1296152" cy="1045903"/>
-          </a:xfrm>
-          <a:prstGeom prst="straightConnector1">
-            <a:avLst/>
-          </a:prstGeom>
-          <a:ln>
-            <a:tailEnd type="triangle"/>
-          </a:ln>
-        </p:spPr>
-        <p:style>
-          <a:lnRef idx="1">
-            <a:schemeClr val="accent1"/>
-          </a:lnRef>
-          <a:fillRef idx="0">
-            <a:schemeClr val="accent1"/>
-          </a:fillRef>
-          <a:effectRef idx="0">
-            <a:schemeClr val="accent1"/>
-          </a:effectRef>
-          <a:fontRef idx="minor">
-            <a:schemeClr val="tx1"/>
-          </a:fontRef>
-        </p:style>
-      </p:cxnSp>
-      <p:cxnSp>
-        <p:nvCxnSpPr>
-          <p:cNvPr id="77" name="Conector de Seta Reta 76"/>
-          <p:cNvCxnSpPr>
-            <a:stCxn id="38" idx="0"/>
-            <a:endCxn id="71" idx="3"/>
-          </p:cNvCxnSpPr>
-          <p:nvPr/>
-        </p:nvCxnSpPr>
-        <p:spPr>
-          <a:xfrm flipH="1" flipV="1">
-            <a:off x="8895805" y="1600200"/>
-            <a:ext cx="1365711" cy="1816788"/>
-          </a:xfrm>
-          <a:prstGeom prst="straightConnector1">
-            <a:avLst/>
-          </a:prstGeom>
-          <a:ln>
-            <a:tailEnd type="triangle"/>
-          </a:ln>
-        </p:spPr>
-        <p:style>
-          <a:lnRef idx="1">
-            <a:schemeClr val="accent1"/>
-          </a:lnRef>
-          <a:fillRef idx="0">
-            <a:schemeClr val="accent1"/>
-          </a:fillRef>
-          <a:effectRef idx="0">
-            <a:schemeClr val="accent1"/>
-          </a:effectRef>
-          <a:fontRef idx="minor">
-            <a:schemeClr val="tx1"/>
-          </a:fontRef>
-        </p:style>
-      </p:cxnSp>
-      <p:sp>
-        <p:nvSpPr>
-          <p:cNvPr id="78" name="Retângulo 77"/>
-          <p:cNvSpPr/>
-          <p:nvPr/>
-        </p:nvSpPr>
-        <p:spPr>
-          <a:xfrm>
-            <a:off x="8026282" y="2786010"/>
-            <a:ext cx="304823" cy="348732"/>
-          </a:xfrm>
-          <a:prstGeom prst="rect">
-            <a:avLst/>
-          </a:prstGeom>
-          <a:noFill/>
-        </p:spPr>
-        <p:txBody>
-          <a:bodyPr wrap="square" lIns="91440" tIns="45720" rIns="91440" bIns="45720">
-            <a:spAutoFit/>
-          </a:bodyPr>
-          <a:lstStyle/>
-          <a:p>
-            <a:pPr algn="ctr"/>
-            <a:r>
-              <a:rPr lang="pt-BR" sz="1600" b="0" cap="none" spc="0" dirty="0" smtClean="0">
-                <a:ln w="0"/>
-                <a:solidFill>
-                  <a:schemeClr val="tx1"/>
-                </a:solidFill>
-                <a:effectLst>
-                  <a:outerShdw blurRad="38100" dist="19050" dir="2700000" algn="tl" rotWithShape="0">
-                    <a:schemeClr val="dk1">
-                      <a:alpha val="40000"/>
-                    </a:schemeClr>
-                  </a:outerShdw>
-                </a:effectLst>
-              </a:rPr>
-              <a:t>U</a:t>
-            </a:r>
-            <a:endParaRPr lang="pt-BR" sz="1600" b="0" cap="none" spc="0" dirty="0">
-              <a:ln w="0"/>
-              <a:solidFill>
-                <a:schemeClr val="tx1"/>
-              </a:solidFill>
-              <a:effectLst>
-                <a:outerShdw blurRad="38100" dist="19050" dir="2700000" algn="tl" rotWithShape="0">
-                  <a:schemeClr val="dk1">
-                    <a:alpha val="40000"/>
-                  </a:schemeClr>
-                </a:outerShdw>
-              </a:effectLst>
-            </a:endParaRPr>
-          </a:p>
-        </p:txBody>
-      </p:sp>
     </p:spTree>
     <p:extLst>
       <p:ext uri="{BB962C8B-B14F-4D97-AF65-F5344CB8AC3E}">

</xml_diff>